<commit_message>
updated ppt presentation, also updated coreys notebook with .corr
</commit_message>
<xml_diff>
--- a/Corey/Group Project.pptx
+++ b/Corey/Group Project.pptx
@@ -4,32 +4,37 @@
   <p:sldMasterIdLst>
     <p:sldMasterId id="2147483648" r:id="rId1"/>
   </p:sldMasterIdLst>
+  <p:notesMasterIdLst>
+    <p:notesMasterId r:id="rId29"/>
+  </p:notesMasterIdLst>
   <p:sldIdLst>
     <p:sldId id="256" r:id="rId2"/>
     <p:sldId id="268" r:id="rId3"/>
-    <p:sldId id="269" r:id="rId4"/>
-    <p:sldId id="270" r:id="rId5"/>
-    <p:sldId id="271" r:id="rId6"/>
-    <p:sldId id="277" r:id="rId7"/>
-    <p:sldId id="281" r:id="rId8"/>
-    <p:sldId id="280" r:id="rId9"/>
-    <p:sldId id="278" r:id="rId10"/>
-    <p:sldId id="274" r:id="rId11"/>
-    <p:sldId id="272" r:id="rId12"/>
-    <p:sldId id="257" r:id="rId13"/>
-    <p:sldId id="258" r:id="rId14"/>
-    <p:sldId id="259" r:id="rId15"/>
-    <p:sldId id="260" r:id="rId16"/>
-    <p:sldId id="261" r:id="rId17"/>
-    <p:sldId id="262" r:id="rId18"/>
-    <p:sldId id="263" r:id="rId19"/>
-    <p:sldId id="265" r:id="rId20"/>
-    <p:sldId id="264" r:id="rId21"/>
-    <p:sldId id="273" r:id="rId22"/>
-    <p:sldId id="275" r:id="rId23"/>
-    <p:sldId id="276" r:id="rId24"/>
-    <p:sldId id="279" r:id="rId25"/>
-    <p:sldId id="267" r:id="rId26"/>
+    <p:sldId id="282" r:id="rId4"/>
+    <p:sldId id="283" r:id="rId5"/>
+    <p:sldId id="269" r:id="rId6"/>
+    <p:sldId id="270" r:id="rId7"/>
+    <p:sldId id="271" r:id="rId8"/>
+    <p:sldId id="277" r:id="rId9"/>
+    <p:sldId id="281" r:id="rId10"/>
+    <p:sldId id="280" r:id="rId11"/>
+    <p:sldId id="278" r:id="rId12"/>
+    <p:sldId id="274" r:id="rId13"/>
+    <p:sldId id="272" r:id="rId14"/>
+    <p:sldId id="257" r:id="rId15"/>
+    <p:sldId id="258" r:id="rId16"/>
+    <p:sldId id="259" r:id="rId17"/>
+    <p:sldId id="260" r:id="rId18"/>
+    <p:sldId id="261" r:id="rId19"/>
+    <p:sldId id="262" r:id="rId20"/>
+    <p:sldId id="263" r:id="rId21"/>
+    <p:sldId id="265" r:id="rId22"/>
+    <p:sldId id="264" r:id="rId23"/>
+    <p:sldId id="273" r:id="rId24"/>
+    <p:sldId id="275" r:id="rId25"/>
+    <p:sldId id="276" r:id="rId26"/>
+    <p:sldId id="279" r:id="rId27"/>
+    <p:sldId id="267" r:id="rId28"/>
   </p:sldIdLst>
   <p:sldSz cx="12192000" cy="6858000"/>
   <p:notesSz cx="6858000" cy="9144000"/>
@@ -140,6 +145,7 @@
 <p1510:revInfo xmlns:a="http://schemas.openxmlformats.org/drawingml/2006/main" xmlns:r="http://schemas.openxmlformats.org/officeDocument/2006/relationships" xmlns:p1510="http://schemas.microsoft.com/office/powerpoint/2015/10/main">
   <p1510:revLst>
     <p1510:client id="{BB9CCC36-FE4F-4974-A4FB-35164B2E3531}" v="1" dt="2024-08-31T18:22:36.510"/>
+    <p1510:client id="{C951E7E2-DF73-498A-9B5C-67E1A1DDAFBB}" v="11" dt="2024-08-31T23:35:18.768"/>
     <p1510:client id="{EBC5146E-18C7-45C9-82A7-CCF297C2A46B}" v="1" dt="2024-08-31T16:15:22.215"/>
   </p1510:revLst>
 </p1510:revInfo>
@@ -551,6 +557,265 @@
     </pc:docChg>
   </pc:docChgLst>
   <pc:docChgLst>
+    <pc:chgData name="Corey Holton" userId="dfccdeabb580c92e" providerId="LiveId" clId="{C951E7E2-DF73-498A-9B5C-67E1A1DDAFBB}"/>
+    <pc:docChg chg="undo custSel addSld delSld modSld">
+      <pc:chgData name="Corey Holton" userId="dfccdeabb580c92e" providerId="LiveId" clId="{C951E7E2-DF73-498A-9B5C-67E1A1DDAFBB}" dt="2024-09-01T00:06:46.150" v="3483" actId="20577"/>
+      <pc:docMkLst>
+        <pc:docMk/>
+      </pc:docMkLst>
+      <pc:sldChg chg="modSp add del mod">
+        <pc:chgData name="Corey Holton" userId="dfccdeabb580c92e" providerId="LiveId" clId="{C951E7E2-DF73-498A-9B5C-67E1A1DDAFBB}" dt="2024-08-31T23:37:19.138" v="1037" actId="20577"/>
+        <pc:sldMkLst>
+          <pc:docMk/>
+          <pc:sldMk cId="4059096339" sldId="267"/>
+        </pc:sldMkLst>
+        <pc:spChg chg="mod">
+          <ac:chgData name="Corey Holton" userId="dfccdeabb580c92e" providerId="LiveId" clId="{C951E7E2-DF73-498A-9B5C-67E1A1DDAFBB}" dt="2024-08-31T23:37:19.138" v="1037" actId="20577"/>
+          <ac:spMkLst>
+            <pc:docMk/>
+            <pc:sldMk cId="4059096339" sldId="267"/>
+            <ac:spMk id="2" creationId="{560158CA-AF9D-02D9-3AAE-7B1B2C68BC5B}"/>
+          </ac:spMkLst>
+        </pc:spChg>
+      </pc:sldChg>
+      <pc:sldChg chg="modSp mod">
+        <pc:chgData name="Corey Holton" userId="dfccdeabb580c92e" providerId="LiveId" clId="{C951E7E2-DF73-498A-9B5C-67E1A1DDAFBB}" dt="2024-09-01T00:02:46.555" v="3199" actId="13926"/>
+        <pc:sldMkLst>
+          <pc:docMk/>
+          <pc:sldMk cId="793010627" sldId="271"/>
+        </pc:sldMkLst>
+        <pc:spChg chg="mod">
+          <ac:chgData name="Corey Holton" userId="dfccdeabb580c92e" providerId="LiveId" clId="{C951E7E2-DF73-498A-9B5C-67E1A1DDAFBB}" dt="2024-09-01T00:02:46.555" v="3199" actId="13926"/>
+          <ac:spMkLst>
+            <pc:docMk/>
+            <pc:sldMk cId="793010627" sldId="271"/>
+            <ac:spMk id="3" creationId="{6B010F1D-F98F-0145-BA31-DD922551682E}"/>
+          </ac:spMkLst>
+        </pc:spChg>
+      </pc:sldChg>
+      <pc:sldChg chg="addSp delSp modSp mod setBg">
+        <pc:chgData name="Corey Holton" userId="dfccdeabb580c92e" providerId="LiveId" clId="{C951E7E2-DF73-498A-9B5C-67E1A1DDAFBB}" dt="2024-08-31T23:38:20.499" v="1043" actId="255"/>
+        <pc:sldMkLst>
+          <pc:docMk/>
+          <pc:sldMk cId="243150552" sldId="279"/>
+        </pc:sldMkLst>
+        <pc:spChg chg="mod">
+          <ac:chgData name="Corey Holton" userId="dfccdeabb580c92e" providerId="LiveId" clId="{C951E7E2-DF73-498A-9B5C-67E1A1DDAFBB}" dt="2024-08-31T23:38:20.499" v="1043" actId="255"/>
+          <ac:spMkLst>
+            <pc:docMk/>
+            <pc:sldMk cId="243150552" sldId="279"/>
+            <ac:spMk id="2" creationId="{330766FE-F8B8-777B-2219-9940145F8FA9}"/>
+          </ac:spMkLst>
+        </pc:spChg>
+        <pc:spChg chg="mod ord">
+          <ac:chgData name="Corey Holton" userId="dfccdeabb580c92e" providerId="LiveId" clId="{C951E7E2-DF73-498A-9B5C-67E1A1DDAFBB}" dt="2024-08-31T23:34:47.738" v="971" actId="26606"/>
+          <ac:spMkLst>
+            <pc:docMk/>
+            <pc:sldMk cId="243150552" sldId="279"/>
+            <ac:spMk id="3" creationId="{827A2BFE-FADC-18E7-01C0-305BD9A9B7D8}"/>
+          </ac:spMkLst>
+        </pc:spChg>
+        <pc:spChg chg="add del">
+          <ac:chgData name="Corey Holton" userId="dfccdeabb580c92e" providerId="LiveId" clId="{C951E7E2-DF73-498A-9B5C-67E1A1DDAFBB}" dt="2024-08-31T23:34:00.684" v="967" actId="26606"/>
+          <ac:spMkLst>
+            <pc:docMk/>
+            <pc:sldMk cId="243150552" sldId="279"/>
+            <ac:spMk id="9" creationId="{7FF47CB7-972F-479F-A36D-9E72D26EC8DA}"/>
+          </ac:spMkLst>
+        </pc:spChg>
+        <pc:spChg chg="add">
+          <ac:chgData name="Corey Holton" userId="dfccdeabb580c92e" providerId="LiveId" clId="{C951E7E2-DF73-498A-9B5C-67E1A1DDAFBB}" dt="2024-08-31T23:34:47.738" v="971" actId="26606"/>
+          <ac:spMkLst>
+            <pc:docMk/>
+            <pc:sldMk cId="243150552" sldId="279"/>
+            <ac:spMk id="10" creationId="{74B0B678-CD10-4371-96E5-2706F4579FAD}"/>
+          </ac:spMkLst>
+        </pc:spChg>
+        <pc:spChg chg="add del">
+          <ac:chgData name="Corey Holton" userId="dfccdeabb580c92e" providerId="LiveId" clId="{C951E7E2-DF73-498A-9B5C-67E1A1DDAFBB}" dt="2024-08-31T23:34:00.684" v="967" actId="26606"/>
+          <ac:spMkLst>
+            <pc:docMk/>
+            <pc:sldMk cId="243150552" sldId="279"/>
+            <ac:spMk id="11" creationId="{0D153B68-5844-490D-8E67-F616D6D721CA}"/>
+          </ac:spMkLst>
+        </pc:spChg>
+        <pc:spChg chg="add mod">
+          <ac:chgData name="Corey Holton" userId="dfccdeabb580c92e" providerId="LiveId" clId="{C951E7E2-DF73-498A-9B5C-67E1A1DDAFBB}" dt="2024-08-31T23:35:42.167" v="977" actId="1076"/>
+          <ac:spMkLst>
+            <pc:docMk/>
+            <pc:sldMk cId="243150552" sldId="279"/>
+            <ac:spMk id="12" creationId="{BABD0260-2875-430A-1395-F36DE310EE8B}"/>
+          </ac:spMkLst>
+        </pc:spChg>
+        <pc:spChg chg="add del">
+          <ac:chgData name="Corey Holton" userId="dfccdeabb580c92e" providerId="LiveId" clId="{C951E7E2-DF73-498A-9B5C-67E1A1DDAFBB}" dt="2024-08-31T23:34:00.684" v="967" actId="26606"/>
+          <ac:spMkLst>
+            <pc:docMk/>
+            <pc:sldMk cId="243150552" sldId="279"/>
+            <ac:spMk id="13" creationId="{9A0D773F-7A7D-4DBB-9DEA-86BB8B8F4BC8}"/>
+          </ac:spMkLst>
+        </pc:spChg>
+        <pc:spChg chg="add">
+          <ac:chgData name="Corey Holton" userId="dfccdeabb580c92e" providerId="LiveId" clId="{C951E7E2-DF73-498A-9B5C-67E1A1DDAFBB}" dt="2024-08-31T23:34:47.738" v="971" actId="26606"/>
+          <ac:spMkLst>
+            <pc:docMk/>
+            <pc:sldMk cId="243150552" sldId="279"/>
+            <ac:spMk id="19" creationId="{CBC4F608-B4B8-48C3-9572-C0F061B1CD99}"/>
+          </ac:spMkLst>
+        </pc:spChg>
+        <pc:spChg chg="add">
+          <ac:chgData name="Corey Holton" userId="dfccdeabb580c92e" providerId="LiveId" clId="{C951E7E2-DF73-498A-9B5C-67E1A1DDAFBB}" dt="2024-08-31T23:34:47.738" v="971" actId="26606"/>
+          <ac:spMkLst>
+            <pc:docMk/>
+            <pc:sldMk cId="243150552" sldId="279"/>
+            <ac:spMk id="21" creationId="{1382A32C-5B0C-4B1C-A074-76C6DBCC9F87}"/>
+          </ac:spMkLst>
+        </pc:spChg>
+        <pc:grpChg chg="add">
+          <ac:chgData name="Corey Holton" userId="dfccdeabb580c92e" providerId="LiveId" clId="{C951E7E2-DF73-498A-9B5C-67E1A1DDAFBB}" dt="2024-08-31T23:34:47.738" v="971" actId="26606"/>
+          <ac:grpSpMkLst>
+            <pc:docMk/>
+            <pc:sldMk cId="243150552" sldId="279"/>
+            <ac:grpSpMk id="15" creationId="{A9270323-9616-4384-857D-E86B78272EFE}"/>
+          </ac:grpSpMkLst>
+        </pc:grpChg>
+        <pc:graphicFrameChg chg="add del mod modGraphic">
+          <ac:chgData name="Corey Holton" userId="dfccdeabb580c92e" providerId="LiveId" clId="{C951E7E2-DF73-498A-9B5C-67E1A1DDAFBB}" dt="2024-08-31T23:33:59.361" v="966" actId="27309"/>
+          <ac:graphicFrameMkLst>
+            <pc:docMk/>
+            <pc:sldMk cId="243150552" sldId="279"/>
+            <ac:graphicFrameMk id="6" creationId="{84163CB3-B3AB-0EB6-3410-2D6455CBDEB1}"/>
+          </ac:graphicFrameMkLst>
+        </pc:graphicFrameChg>
+        <pc:picChg chg="add mod">
+          <ac:chgData name="Corey Holton" userId="dfccdeabb580c92e" providerId="LiveId" clId="{C951E7E2-DF73-498A-9B5C-67E1A1DDAFBB}" dt="2024-08-31T23:34:07.121" v="968" actId="1076"/>
+          <ac:picMkLst>
+            <pc:docMk/>
+            <pc:sldMk cId="243150552" sldId="279"/>
+            <ac:picMk id="4" creationId="{7B7F1D6E-AE2F-A093-6046-45F6E4A88615}"/>
+          </ac:picMkLst>
+        </pc:picChg>
+        <pc:picChg chg="add mod">
+          <ac:chgData name="Corey Holton" userId="dfccdeabb580c92e" providerId="LiveId" clId="{C951E7E2-DF73-498A-9B5C-67E1A1DDAFBB}" dt="2024-08-31T23:34:47.738" v="971" actId="26606"/>
+          <ac:picMkLst>
+            <pc:docMk/>
+            <pc:sldMk cId="243150552" sldId="279"/>
+            <ac:picMk id="7" creationId="{DBD22DD2-1143-E726-DD96-8A6B4C0A74B9}"/>
+          </ac:picMkLst>
+        </pc:picChg>
+        <pc:picChg chg="add mod">
+          <ac:chgData name="Corey Holton" userId="dfccdeabb580c92e" providerId="LiveId" clId="{C951E7E2-DF73-498A-9B5C-67E1A1DDAFBB}" dt="2024-08-31T23:34:47.738" v="971" actId="26606"/>
+          <ac:picMkLst>
+            <pc:docMk/>
+            <pc:sldMk cId="243150552" sldId="279"/>
+            <ac:picMk id="8" creationId="{C73A8913-1944-F302-E275-02CAA66D00EA}"/>
+          </ac:picMkLst>
+        </pc:picChg>
+      </pc:sldChg>
+      <pc:sldChg chg="addSp delSp modSp new add del mod">
+        <pc:chgData name="Corey Holton" userId="dfccdeabb580c92e" providerId="LiveId" clId="{C951E7E2-DF73-498A-9B5C-67E1A1DDAFBB}" dt="2024-08-31T23:36:52.645" v="982" actId="47"/>
+        <pc:sldMkLst>
+          <pc:docMk/>
+          <pc:sldMk cId="512834816" sldId="282"/>
+        </pc:sldMkLst>
+        <pc:spChg chg="mod">
+          <ac:chgData name="Corey Holton" userId="dfccdeabb580c92e" providerId="LiveId" clId="{C951E7E2-DF73-498A-9B5C-67E1A1DDAFBB}" dt="2024-08-31T23:04:40.493" v="12" actId="20577"/>
+          <ac:spMkLst>
+            <pc:docMk/>
+            <pc:sldMk cId="512834816" sldId="282"/>
+            <ac:spMk id="2" creationId="{470F4ED9-8402-DD78-F761-6C641B9D5AFF}"/>
+          </ac:spMkLst>
+        </pc:spChg>
+        <pc:spChg chg="add del mod">
+          <ac:chgData name="Corey Holton" userId="dfccdeabb580c92e" providerId="LiveId" clId="{C951E7E2-DF73-498A-9B5C-67E1A1DDAFBB}" dt="2024-08-31T23:08:11.374" v="233" actId="20577"/>
+          <ac:spMkLst>
+            <pc:docMk/>
+            <pc:sldMk cId="512834816" sldId="282"/>
+            <ac:spMk id="3" creationId="{3BF07CC9-3677-A5DD-1024-20FEBB1CB834}"/>
+          </ac:spMkLst>
+        </pc:spChg>
+        <pc:spChg chg="add mod">
+          <ac:chgData name="Corey Holton" userId="dfccdeabb580c92e" providerId="LiveId" clId="{C951E7E2-DF73-498A-9B5C-67E1A1DDAFBB}" dt="2024-08-31T23:05:15.129" v="14"/>
+          <ac:spMkLst>
+            <pc:docMk/>
+            <pc:sldMk cId="512834816" sldId="282"/>
+            <ac:spMk id="6" creationId="{CEC2A486-D70F-ED6D-0AAA-141B9FAF9E1E}"/>
+          </ac:spMkLst>
+        </pc:spChg>
+        <pc:spChg chg="add mod">
+          <ac:chgData name="Corey Holton" userId="dfccdeabb580c92e" providerId="LiveId" clId="{C951E7E2-DF73-498A-9B5C-67E1A1DDAFBB}" dt="2024-08-31T23:05:35.368" v="17"/>
+          <ac:spMkLst>
+            <pc:docMk/>
+            <pc:sldMk cId="512834816" sldId="282"/>
+            <ac:spMk id="7" creationId="{648F225C-D190-29E8-21C3-392B14AF107E}"/>
+          </ac:spMkLst>
+        </pc:spChg>
+        <pc:spChg chg="add del">
+          <ac:chgData name="Corey Holton" userId="dfccdeabb580c92e" providerId="LiveId" clId="{C951E7E2-DF73-498A-9B5C-67E1A1DDAFBB}" dt="2024-08-31T23:06:25.213" v="26" actId="478"/>
+          <ac:spMkLst>
+            <pc:docMk/>
+            <pc:sldMk cId="512834816" sldId="282"/>
+            <ac:spMk id="8" creationId="{193FAD5E-1D00-1541-F94F-8DDE9A663C9C}"/>
+          </ac:spMkLst>
+        </pc:spChg>
+        <pc:picChg chg="add mod">
+          <ac:chgData name="Corey Holton" userId="dfccdeabb580c92e" providerId="LiveId" clId="{C951E7E2-DF73-498A-9B5C-67E1A1DDAFBB}" dt="2024-08-31T23:06:49.438" v="28" actId="1076"/>
+          <ac:picMkLst>
+            <pc:docMk/>
+            <pc:sldMk cId="512834816" sldId="282"/>
+            <ac:picMk id="5" creationId="{C1B2244C-F766-1E4F-C355-9F6E464A41FC}"/>
+          </ac:picMkLst>
+        </pc:picChg>
+      </pc:sldChg>
+      <pc:sldChg chg="modSp new mod">
+        <pc:chgData name="Corey Holton" userId="dfccdeabb580c92e" providerId="LiveId" clId="{C951E7E2-DF73-498A-9B5C-67E1A1DDAFBB}" dt="2024-08-31T23:53:16.652" v="2481" actId="20577"/>
+        <pc:sldMkLst>
+          <pc:docMk/>
+          <pc:sldMk cId="2077041568" sldId="282"/>
+        </pc:sldMkLst>
+        <pc:spChg chg="mod">
+          <ac:chgData name="Corey Holton" userId="dfccdeabb580c92e" providerId="LiveId" clId="{C951E7E2-DF73-498A-9B5C-67E1A1DDAFBB}" dt="2024-08-31T23:40:49.414" v="1047" actId="27636"/>
+          <ac:spMkLst>
+            <pc:docMk/>
+            <pc:sldMk cId="2077041568" sldId="282"/>
+            <ac:spMk id="2" creationId="{729CFCDA-656E-17F2-BA1D-BF7A93638159}"/>
+          </ac:spMkLst>
+        </pc:spChg>
+        <pc:spChg chg="mod">
+          <ac:chgData name="Corey Holton" userId="dfccdeabb580c92e" providerId="LiveId" clId="{C951E7E2-DF73-498A-9B5C-67E1A1DDAFBB}" dt="2024-08-31T23:53:16.652" v="2481" actId="20577"/>
+          <ac:spMkLst>
+            <pc:docMk/>
+            <pc:sldMk cId="2077041568" sldId="282"/>
+            <ac:spMk id="3" creationId="{3A194D55-8F49-301D-DFF4-5CEDF97D8DBB}"/>
+          </ac:spMkLst>
+        </pc:spChg>
+      </pc:sldChg>
+      <pc:sldChg chg="modSp new mod">
+        <pc:chgData name="Corey Holton" userId="dfccdeabb580c92e" providerId="LiveId" clId="{C951E7E2-DF73-498A-9B5C-67E1A1DDAFBB}" dt="2024-09-01T00:06:46.150" v="3483" actId="20577"/>
+        <pc:sldMkLst>
+          <pc:docMk/>
+          <pc:sldMk cId="3233134659" sldId="283"/>
+        </pc:sldMkLst>
+        <pc:spChg chg="mod">
+          <ac:chgData name="Corey Holton" userId="dfccdeabb580c92e" providerId="LiveId" clId="{C951E7E2-DF73-498A-9B5C-67E1A1DDAFBB}" dt="2024-08-31T23:54:31.105" v="2485" actId="27636"/>
+          <ac:spMkLst>
+            <pc:docMk/>
+            <pc:sldMk cId="3233134659" sldId="283"/>
+            <ac:spMk id="2" creationId="{FD705E39-A393-C435-2034-D48922C906E7}"/>
+          </ac:spMkLst>
+        </pc:spChg>
+        <pc:spChg chg="mod">
+          <ac:chgData name="Corey Holton" userId="dfccdeabb580c92e" providerId="LiveId" clId="{C951E7E2-DF73-498A-9B5C-67E1A1DDAFBB}" dt="2024-09-01T00:06:46.150" v="3483" actId="20577"/>
+          <ac:spMkLst>
+            <pc:docMk/>
+            <pc:sldMk cId="3233134659" sldId="283"/>
+            <ac:spMk id="3" creationId="{A8F6E35D-7CEA-237F-4230-668FE833C23D}"/>
+          </ac:spMkLst>
+        </pc:spChg>
+      </pc:sldChg>
+    </pc:docChg>
+  </pc:docChgLst>
+  <pc:docChgLst>
     <pc:chgData name="Corey Holton" userId="dfccdeabb580c92e" providerId="LiveId" clId="{BB9CCC36-FE4F-4974-A4FB-35164B2E3531}"/>
     <pc:docChg chg="custSel addSld modSld sldOrd">
       <pc:chgData name="Corey Holton" userId="dfccdeabb580c92e" providerId="LiveId" clId="{BB9CCC36-FE4F-4974-A4FB-35164B2E3531}" dt="2024-08-31T18:24:39.649" v="40"/>
@@ -696,6 +961,439 @@
     </pc:docChg>
   </pc:docChgLst>
 </pc:chgInfo>
+</file>
+
+<file path=ppt/notesMasters/notesMaster1.xml><?xml version="1.0" encoding="utf-8"?>
+<p:notesMaster xmlns:a="http://schemas.openxmlformats.org/drawingml/2006/main" xmlns:r="http://schemas.openxmlformats.org/officeDocument/2006/relationships" xmlns:p="http://schemas.openxmlformats.org/presentationml/2006/main">
+  <p:cSld>
+    <p:bg>
+      <p:bgRef idx="1001">
+        <a:schemeClr val="bg1"/>
+      </p:bgRef>
+    </p:bg>
+    <p:spTree>
+      <p:nvGrpSpPr>
+        <p:cNvPr id="1" name=""/>
+        <p:cNvGrpSpPr/>
+        <p:nvPr/>
+      </p:nvGrpSpPr>
+      <p:grpSpPr>
+        <a:xfrm>
+          <a:off x="0" y="0"/>
+          <a:ext cx="0" cy="0"/>
+          <a:chOff x="0" y="0"/>
+          <a:chExt cx="0" cy="0"/>
+        </a:xfrm>
+      </p:grpSpPr>
+      <p:sp>
+        <p:nvSpPr>
+          <p:cNvPr id="2" name="Header Placeholder 1"/>
+          <p:cNvSpPr>
+            <a:spLocks noGrp="1"/>
+          </p:cNvSpPr>
+          <p:nvPr>
+            <p:ph type="hdr" sz="quarter"/>
+          </p:nvPr>
+        </p:nvSpPr>
+        <p:spPr>
+          <a:xfrm>
+            <a:off x="0" y="0"/>
+            <a:ext cx="2971800" cy="458788"/>
+          </a:xfrm>
+          <a:prstGeom prst="rect">
+            <a:avLst/>
+          </a:prstGeom>
+        </p:spPr>
+        <p:txBody>
+          <a:bodyPr vert="horz" lIns="91440" tIns="45720" rIns="91440" bIns="45720" rtlCol="0"/>
+          <a:lstStyle>
+            <a:lvl1pPr algn="l">
+              <a:defRPr sz="1200"/>
+            </a:lvl1pPr>
+          </a:lstStyle>
+          <a:p>
+            <a:endParaRPr lang="en-US"/>
+          </a:p>
+        </p:txBody>
+      </p:sp>
+      <p:sp>
+        <p:nvSpPr>
+          <p:cNvPr id="3" name="Date Placeholder 2"/>
+          <p:cNvSpPr>
+            <a:spLocks noGrp="1"/>
+          </p:cNvSpPr>
+          <p:nvPr>
+            <p:ph type="dt" idx="1"/>
+          </p:nvPr>
+        </p:nvSpPr>
+        <p:spPr>
+          <a:xfrm>
+            <a:off x="3884613" y="0"/>
+            <a:ext cx="2971800" cy="458788"/>
+          </a:xfrm>
+          <a:prstGeom prst="rect">
+            <a:avLst/>
+          </a:prstGeom>
+        </p:spPr>
+        <p:txBody>
+          <a:bodyPr vert="horz" lIns="91440" tIns="45720" rIns="91440" bIns="45720" rtlCol="0"/>
+          <a:lstStyle>
+            <a:lvl1pPr algn="r">
+              <a:defRPr sz="1200"/>
+            </a:lvl1pPr>
+          </a:lstStyle>
+          <a:p>
+            <a:fld id="{77C4E0A2-C800-41DD-86B8-E5E35F0791B6}" type="datetimeFigureOut">
+              <a:rPr lang="en-US" smtClean="0"/>
+              <a:t>8/31/2024</a:t>
+            </a:fld>
+            <a:endParaRPr lang="en-US"/>
+          </a:p>
+        </p:txBody>
+      </p:sp>
+      <p:sp>
+        <p:nvSpPr>
+          <p:cNvPr id="4" name="Slide Image Placeholder 3"/>
+          <p:cNvSpPr>
+            <a:spLocks noGrp="1" noRot="1" noChangeAspect="1"/>
+          </p:cNvSpPr>
+          <p:nvPr>
+            <p:ph type="sldImg" idx="2"/>
+          </p:nvPr>
+        </p:nvSpPr>
+        <p:spPr>
+          <a:xfrm>
+            <a:off x="685800" y="1143000"/>
+            <a:ext cx="5486400" cy="3086100"/>
+          </a:xfrm>
+          <a:prstGeom prst="rect">
+            <a:avLst/>
+          </a:prstGeom>
+          <a:noFill/>
+          <a:ln w="12700">
+            <a:solidFill>
+              <a:prstClr val="black"/>
+            </a:solidFill>
+          </a:ln>
+        </p:spPr>
+        <p:txBody>
+          <a:bodyPr vert="horz" lIns="91440" tIns="45720" rIns="91440" bIns="45720" rtlCol="0" anchor="ctr"/>
+          <a:lstStyle/>
+          <a:p>
+            <a:endParaRPr lang="en-US"/>
+          </a:p>
+        </p:txBody>
+      </p:sp>
+      <p:sp>
+        <p:nvSpPr>
+          <p:cNvPr id="5" name="Notes Placeholder 4"/>
+          <p:cNvSpPr>
+            <a:spLocks noGrp="1"/>
+          </p:cNvSpPr>
+          <p:nvPr>
+            <p:ph type="body" sz="quarter" idx="3"/>
+          </p:nvPr>
+        </p:nvSpPr>
+        <p:spPr>
+          <a:xfrm>
+            <a:off x="685800" y="4400550"/>
+            <a:ext cx="5486400" cy="3600450"/>
+          </a:xfrm>
+          <a:prstGeom prst="rect">
+            <a:avLst/>
+          </a:prstGeom>
+        </p:spPr>
+        <p:txBody>
+          <a:bodyPr vert="horz" lIns="91440" tIns="45720" rIns="91440" bIns="45720" rtlCol="0"/>
+          <a:lstStyle/>
+          <a:p>
+            <a:pPr lvl="0"/>
+            <a:r>
+              <a:rPr lang="en-US"/>
+              <a:t>Click to edit Master text styles</a:t>
+            </a:r>
+          </a:p>
+          <a:p>
+            <a:pPr lvl="1"/>
+            <a:r>
+              <a:rPr lang="en-US"/>
+              <a:t>Second level</a:t>
+            </a:r>
+          </a:p>
+          <a:p>
+            <a:pPr lvl="2"/>
+            <a:r>
+              <a:rPr lang="en-US"/>
+              <a:t>Third level</a:t>
+            </a:r>
+          </a:p>
+          <a:p>
+            <a:pPr lvl="3"/>
+            <a:r>
+              <a:rPr lang="en-US"/>
+              <a:t>Fourth level</a:t>
+            </a:r>
+          </a:p>
+          <a:p>
+            <a:pPr lvl="4"/>
+            <a:r>
+              <a:rPr lang="en-US"/>
+              <a:t>Fifth level</a:t>
+            </a:r>
+          </a:p>
+        </p:txBody>
+      </p:sp>
+      <p:sp>
+        <p:nvSpPr>
+          <p:cNvPr id="6" name="Footer Placeholder 5"/>
+          <p:cNvSpPr>
+            <a:spLocks noGrp="1"/>
+          </p:cNvSpPr>
+          <p:nvPr>
+            <p:ph type="ftr" sz="quarter" idx="4"/>
+          </p:nvPr>
+        </p:nvSpPr>
+        <p:spPr>
+          <a:xfrm>
+            <a:off x="0" y="8685213"/>
+            <a:ext cx="2971800" cy="458787"/>
+          </a:xfrm>
+          <a:prstGeom prst="rect">
+            <a:avLst/>
+          </a:prstGeom>
+        </p:spPr>
+        <p:txBody>
+          <a:bodyPr vert="horz" lIns="91440" tIns="45720" rIns="91440" bIns="45720" rtlCol="0" anchor="b"/>
+          <a:lstStyle>
+            <a:lvl1pPr algn="l">
+              <a:defRPr sz="1200"/>
+            </a:lvl1pPr>
+          </a:lstStyle>
+          <a:p>
+            <a:endParaRPr lang="en-US"/>
+          </a:p>
+        </p:txBody>
+      </p:sp>
+      <p:sp>
+        <p:nvSpPr>
+          <p:cNvPr id="7" name="Slide Number Placeholder 6"/>
+          <p:cNvSpPr>
+            <a:spLocks noGrp="1"/>
+          </p:cNvSpPr>
+          <p:nvPr>
+            <p:ph type="sldNum" sz="quarter" idx="5"/>
+          </p:nvPr>
+        </p:nvSpPr>
+        <p:spPr>
+          <a:xfrm>
+            <a:off x="3884613" y="8685213"/>
+            <a:ext cx="2971800" cy="458787"/>
+          </a:xfrm>
+          <a:prstGeom prst="rect">
+            <a:avLst/>
+          </a:prstGeom>
+        </p:spPr>
+        <p:txBody>
+          <a:bodyPr vert="horz" lIns="91440" tIns="45720" rIns="91440" bIns="45720" rtlCol="0" anchor="b"/>
+          <a:lstStyle>
+            <a:lvl1pPr algn="r">
+              <a:defRPr sz="1200"/>
+            </a:lvl1pPr>
+          </a:lstStyle>
+          <a:p>
+            <a:fld id="{A9913AE1-12D8-4A6A-BC07-0250BEB83E81}" type="slidenum">
+              <a:rPr lang="en-US" smtClean="0"/>
+              <a:t>‹#›</a:t>
+            </a:fld>
+            <a:endParaRPr lang="en-US"/>
+          </a:p>
+        </p:txBody>
+      </p:sp>
+    </p:spTree>
+    <p:extLst>
+      <p:ext uri="{BB962C8B-B14F-4D97-AF65-F5344CB8AC3E}">
+        <p14:creationId xmlns:p14="http://schemas.microsoft.com/office/powerpoint/2010/main" val="2185915373"/>
+      </p:ext>
+    </p:extLst>
+  </p:cSld>
+  <p:clrMap bg1="lt1" tx1="dk1" bg2="lt2" tx2="dk2" accent1="accent1" accent2="accent2" accent3="accent3" accent4="accent4" accent5="accent5" accent6="accent6" hlink="hlink" folHlink="folHlink"/>
+  <p:notesStyle>
+    <a:lvl1pPr marL="0" algn="l" defTabSz="914400" rtl="0" eaLnBrk="1" latinLnBrk="0" hangingPunct="1">
+      <a:defRPr sz="1200" kern="1200">
+        <a:solidFill>
+          <a:schemeClr val="tx1"/>
+        </a:solidFill>
+        <a:latin typeface="+mn-lt"/>
+        <a:ea typeface="+mn-ea"/>
+        <a:cs typeface="+mn-cs"/>
+      </a:defRPr>
+    </a:lvl1pPr>
+    <a:lvl2pPr marL="457200" algn="l" defTabSz="914400" rtl="0" eaLnBrk="1" latinLnBrk="0" hangingPunct="1">
+      <a:defRPr sz="1200" kern="1200">
+        <a:solidFill>
+          <a:schemeClr val="tx1"/>
+        </a:solidFill>
+        <a:latin typeface="+mn-lt"/>
+        <a:ea typeface="+mn-ea"/>
+        <a:cs typeface="+mn-cs"/>
+      </a:defRPr>
+    </a:lvl2pPr>
+    <a:lvl3pPr marL="914400" algn="l" defTabSz="914400" rtl="0" eaLnBrk="1" latinLnBrk="0" hangingPunct="1">
+      <a:defRPr sz="1200" kern="1200">
+        <a:solidFill>
+          <a:schemeClr val="tx1"/>
+        </a:solidFill>
+        <a:latin typeface="+mn-lt"/>
+        <a:ea typeface="+mn-ea"/>
+        <a:cs typeface="+mn-cs"/>
+      </a:defRPr>
+    </a:lvl3pPr>
+    <a:lvl4pPr marL="1371600" algn="l" defTabSz="914400" rtl="0" eaLnBrk="1" latinLnBrk="0" hangingPunct="1">
+      <a:defRPr sz="1200" kern="1200">
+        <a:solidFill>
+          <a:schemeClr val="tx1"/>
+        </a:solidFill>
+        <a:latin typeface="+mn-lt"/>
+        <a:ea typeface="+mn-ea"/>
+        <a:cs typeface="+mn-cs"/>
+      </a:defRPr>
+    </a:lvl4pPr>
+    <a:lvl5pPr marL="1828800" algn="l" defTabSz="914400" rtl="0" eaLnBrk="1" latinLnBrk="0" hangingPunct="1">
+      <a:defRPr sz="1200" kern="1200">
+        <a:solidFill>
+          <a:schemeClr val="tx1"/>
+        </a:solidFill>
+        <a:latin typeface="+mn-lt"/>
+        <a:ea typeface="+mn-ea"/>
+        <a:cs typeface="+mn-cs"/>
+      </a:defRPr>
+    </a:lvl5pPr>
+    <a:lvl6pPr marL="2286000" algn="l" defTabSz="914400" rtl="0" eaLnBrk="1" latinLnBrk="0" hangingPunct="1">
+      <a:defRPr sz="1200" kern="1200">
+        <a:solidFill>
+          <a:schemeClr val="tx1"/>
+        </a:solidFill>
+        <a:latin typeface="+mn-lt"/>
+        <a:ea typeface="+mn-ea"/>
+        <a:cs typeface="+mn-cs"/>
+      </a:defRPr>
+    </a:lvl6pPr>
+    <a:lvl7pPr marL="2743200" algn="l" defTabSz="914400" rtl="0" eaLnBrk="1" latinLnBrk="0" hangingPunct="1">
+      <a:defRPr sz="1200" kern="1200">
+        <a:solidFill>
+          <a:schemeClr val="tx1"/>
+        </a:solidFill>
+        <a:latin typeface="+mn-lt"/>
+        <a:ea typeface="+mn-ea"/>
+        <a:cs typeface="+mn-cs"/>
+      </a:defRPr>
+    </a:lvl7pPr>
+    <a:lvl8pPr marL="3200400" algn="l" defTabSz="914400" rtl="0" eaLnBrk="1" latinLnBrk="0" hangingPunct="1">
+      <a:defRPr sz="1200" kern="1200">
+        <a:solidFill>
+          <a:schemeClr val="tx1"/>
+        </a:solidFill>
+        <a:latin typeface="+mn-lt"/>
+        <a:ea typeface="+mn-ea"/>
+        <a:cs typeface="+mn-cs"/>
+      </a:defRPr>
+    </a:lvl8pPr>
+    <a:lvl9pPr marL="3657600" algn="l" defTabSz="914400" rtl="0" eaLnBrk="1" latinLnBrk="0" hangingPunct="1">
+      <a:defRPr sz="1200" kern="1200">
+        <a:solidFill>
+          <a:schemeClr val="tx1"/>
+        </a:solidFill>
+        <a:latin typeface="+mn-lt"/>
+        <a:ea typeface="+mn-ea"/>
+        <a:cs typeface="+mn-cs"/>
+      </a:defRPr>
+    </a:lvl9pPr>
+  </p:notesStyle>
+</p:notesMaster>
+</file>
+
+<file path=ppt/notesSlides/notesSlide1.xml><?xml version="1.0" encoding="utf-8"?>
+<p:notes xmlns:a="http://schemas.openxmlformats.org/drawingml/2006/main" xmlns:r="http://schemas.openxmlformats.org/officeDocument/2006/relationships" xmlns:p="http://schemas.openxmlformats.org/presentationml/2006/main">
+  <p:cSld>
+    <p:spTree>
+      <p:nvGrpSpPr>
+        <p:cNvPr id="1" name=""/>
+        <p:cNvGrpSpPr/>
+        <p:nvPr/>
+      </p:nvGrpSpPr>
+      <p:grpSpPr>
+        <a:xfrm>
+          <a:off x="0" y="0"/>
+          <a:ext cx="0" cy="0"/>
+          <a:chOff x="0" y="0"/>
+          <a:chExt cx="0" cy="0"/>
+        </a:xfrm>
+      </p:grpSpPr>
+      <p:sp>
+        <p:nvSpPr>
+          <p:cNvPr id="2" name="Slide Image Placeholder 1"/>
+          <p:cNvSpPr>
+            <a:spLocks noGrp="1" noRot="1" noChangeAspect="1"/>
+          </p:cNvSpPr>
+          <p:nvPr>
+            <p:ph type="sldImg"/>
+          </p:nvPr>
+        </p:nvSpPr>
+        <p:spPr/>
+      </p:sp>
+      <p:sp>
+        <p:nvSpPr>
+          <p:cNvPr id="3" name="Notes Placeholder 2"/>
+          <p:cNvSpPr>
+            <a:spLocks noGrp="1"/>
+          </p:cNvSpPr>
+          <p:nvPr>
+            <p:ph type="body" idx="1"/>
+          </p:nvPr>
+        </p:nvSpPr>
+        <p:spPr/>
+        <p:txBody>
+          <a:bodyPr/>
+          <a:lstStyle/>
+          <a:p>
+            <a:endParaRPr lang="en-US" dirty="0"/>
+          </a:p>
+        </p:txBody>
+      </p:sp>
+      <p:sp>
+        <p:nvSpPr>
+          <p:cNvPr id="4" name="Slide Number Placeholder 3"/>
+          <p:cNvSpPr>
+            <a:spLocks noGrp="1"/>
+          </p:cNvSpPr>
+          <p:nvPr>
+            <p:ph type="sldNum" sz="quarter" idx="5"/>
+          </p:nvPr>
+        </p:nvSpPr>
+        <p:spPr/>
+        <p:txBody>
+          <a:bodyPr/>
+          <a:lstStyle/>
+          <a:p>
+            <a:fld id="{A9913AE1-12D8-4A6A-BC07-0250BEB83E81}" type="slidenum">
+              <a:rPr lang="en-US" smtClean="0"/>
+              <a:t>26</a:t>
+            </a:fld>
+            <a:endParaRPr lang="en-US"/>
+          </a:p>
+        </p:txBody>
+      </p:sp>
+    </p:spTree>
+    <p:extLst>
+      <p:ext uri="{BB962C8B-B14F-4D97-AF65-F5344CB8AC3E}">
+        <p14:creationId xmlns:p14="http://schemas.microsoft.com/office/powerpoint/2010/main" val="568645138"/>
+      </p:ext>
+    </p:extLst>
+  </p:cSld>
+  <p:clrMapOvr>
+    <a:masterClrMapping/>
+  </p:clrMapOvr>
+</p:notes>
 </file>
 
 <file path=ppt/slideLayouts/slideLayout1.xml><?xml version="1.0" encoding="utf-8"?>
@@ -4080,6 +4778,195 @@
           <p:cNvPr id="2" name="Title 1">
             <a:extLst>
               <a:ext uri="{FF2B5EF4-FFF2-40B4-BE49-F238E27FC236}">
+                <a16:creationId xmlns:a16="http://schemas.microsoft.com/office/drawing/2014/main" id="{A7CD5B46-7A47-B00C-F0D6-4A92111125D1}"/>
+              </a:ext>
+            </a:extLst>
+          </p:cNvPr>
+          <p:cNvSpPr>
+            <a:spLocks noGrp="1"/>
+          </p:cNvSpPr>
+          <p:nvPr>
+            <p:ph type="title"/>
+          </p:nvPr>
+        </p:nvSpPr>
+        <p:spPr/>
+        <p:txBody>
+          <a:bodyPr/>
+          <a:lstStyle/>
+          <a:p>
+            <a:endParaRPr lang="en-US"/>
+          </a:p>
+        </p:txBody>
+      </p:sp>
+      <p:pic>
+        <p:nvPicPr>
+          <p:cNvPr id="5" name="Content Placeholder 4">
+            <a:extLst>
+              <a:ext uri="{FF2B5EF4-FFF2-40B4-BE49-F238E27FC236}">
+                <a16:creationId xmlns:a16="http://schemas.microsoft.com/office/drawing/2014/main" id="{614F5800-CD03-5016-1B47-99594F19D684}"/>
+              </a:ext>
+            </a:extLst>
+          </p:cNvPr>
+          <p:cNvPicPr>
+            <a:picLocks noGrp="1" noChangeAspect="1"/>
+          </p:cNvPicPr>
+          <p:nvPr>
+            <p:ph idx="1"/>
+          </p:nvPr>
+        </p:nvPicPr>
+        <p:blipFill>
+          <a:blip r:embed="rId2"/>
+          <a:stretch>
+            <a:fillRect/>
+          </a:stretch>
+        </p:blipFill>
+        <p:spPr>
+          <a:xfrm>
+            <a:off x="2360584" y="1825625"/>
+            <a:ext cx="7470831" cy="4351338"/>
+          </a:xfrm>
+        </p:spPr>
+      </p:pic>
+    </p:spTree>
+    <p:extLst>
+      <p:ext uri="{BB962C8B-B14F-4D97-AF65-F5344CB8AC3E}">
+        <p14:creationId xmlns:p14="http://schemas.microsoft.com/office/powerpoint/2010/main" val="3043303598"/>
+      </p:ext>
+    </p:extLst>
+  </p:cSld>
+  <p:clrMapOvr>
+    <a:masterClrMapping/>
+  </p:clrMapOvr>
+</p:sld>
+</file>
+
+<file path=ppt/slides/slide11.xml><?xml version="1.0" encoding="utf-8"?>
+<p:sld xmlns:a="http://schemas.openxmlformats.org/drawingml/2006/main" xmlns:r="http://schemas.openxmlformats.org/officeDocument/2006/relationships" xmlns:p="http://schemas.openxmlformats.org/presentationml/2006/main">
+  <p:cSld>
+    <p:spTree>
+      <p:nvGrpSpPr>
+        <p:cNvPr id="1" name=""/>
+        <p:cNvGrpSpPr/>
+        <p:nvPr/>
+      </p:nvGrpSpPr>
+      <p:grpSpPr>
+        <a:xfrm>
+          <a:off x="0" y="0"/>
+          <a:ext cx="0" cy="0"/>
+          <a:chOff x="0" y="0"/>
+          <a:chExt cx="0" cy="0"/>
+        </a:xfrm>
+      </p:grpSpPr>
+      <p:sp>
+        <p:nvSpPr>
+          <p:cNvPr id="2" name="Title 1">
+            <a:extLst>
+              <a:ext uri="{FF2B5EF4-FFF2-40B4-BE49-F238E27FC236}">
+                <a16:creationId xmlns:a16="http://schemas.microsoft.com/office/drawing/2014/main" id="{539EAE2D-6F05-29FC-24CF-F2FDCCA541CB}"/>
+              </a:ext>
+            </a:extLst>
+          </p:cNvPr>
+          <p:cNvSpPr>
+            <a:spLocks noGrp="1"/>
+          </p:cNvSpPr>
+          <p:nvPr>
+            <p:ph type="title"/>
+          </p:nvPr>
+        </p:nvSpPr>
+        <p:spPr/>
+        <p:txBody>
+          <a:bodyPr>
+            <a:normAutofit fontScale="90000"/>
+          </a:bodyPr>
+          <a:lstStyle/>
+          <a:p>
+            <a:r>
+              <a:rPr lang="en-US" sz="4400" b="0" i="0" dirty="0">
+                <a:solidFill>
+                  <a:srgbClr val="1D1C1D"/>
+                </a:solidFill>
+                <a:effectLst/>
+                <a:latin typeface="Roboto" panose="02000000000000000000" pitchFamily="2" charset="0"/>
+                <a:ea typeface="Roboto" panose="02000000000000000000" pitchFamily="2" charset="0"/>
+                <a:cs typeface="Roboto" panose="02000000000000000000" pitchFamily="2" charset="0"/>
+              </a:rPr>
+              <a:t>How does agricultural production vary across different countries and continents?</a:t>
+            </a:r>
+            <a:br>
+              <a:rPr lang="en-US" sz="4400" b="0" i="0" dirty="0">
+                <a:solidFill>
+                  <a:srgbClr val="1D1C1D"/>
+                </a:solidFill>
+                <a:effectLst/>
+                <a:latin typeface="Roboto" panose="02000000000000000000" pitchFamily="2" charset="0"/>
+                <a:ea typeface="Roboto" panose="02000000000000000000" pitchFamily="2" charset="0"/>
+                <a:cs typeface="Roboto" panose="02000000000000000000" pitchFamily="2" charset="0"/>
+              </a:rPr>
+            </a:br>
+            <a:endParaRPr lang="en-US" dirty="0"/>
+          </a:p>
+        </p:txBody>
+      </p:sp>
+      <p:sp>
+        <p:nvSpPr>
+          <p:cNvPr id="3" name="Content Placeholder 2">
+            <a:extLst>
+              <a:ext uri="{FF2B5EF4-FFF2-40B4-BE49-F238E27FC236}">
+                <a16:creationId xmlns:a16="http://schemas.microsoft.com/office/drawing/2014/main" id="{D6F543D4-D6C9-E508-8342-FD2252C206E0}"/>
+              </a:ext>
+            </a:extLst>
+          </p:cNvPr>
+          <p:cNvSpPr>
+            <a:spLocks noGrp="1"/>
+          </p:cNvSpPr>
+          <p:nvPr>
+            <p:ph idx="1"/>
+          </p:nvPr>
+        </p:nvSpPr>
+        <p:spPr/>
+        <p:txBody>
+          <a:bodyPr/>
+          <a:lstStyle/>
+          <a:p>
+            <a:endParaRPr lang="en-US"/>
+          </a:p>
+        </p:txBody>
+      </p:sp>
+    </p:spTree>
+    <p:extLst>
+      <p:ext uri="{BB962C8B-B14F-4D97-AF65-F5344CB8AC3E}">
+        <p14:creationId xmlns:p14="http://schemas.microsoft.com/office/powerpoint/2010/main" val="2083879834"/>
+      </p:ext>
+    </p:extLst>
+  </p:cSld>
+  <p:clrMapOvr>
+    <a:masterClrMapping/>
+  </p:clrMapOvr>
+</p:sld>
+</file>
+
+<file path=ppt/slides/slide12.xml><?xml version="1.0" encoding="utf-8"?>
+<p:sld xmlns:a="http://schemas.openxmlformats.org/drawingml/2006/main" xmlns:r="http://schemas.openxmlformats.org/officeDocument/2006/relationships" xmlns:p="http://schemas.openxmlformats.org/presentationml/2006/main">
+  <p:cSld>
+    <p:spTree>
+      <p:nvGrpSpPr>
+        <p:cNvPr id="1" name=""/>
+        <p:cNvGrpSpPr/>
+        <p:nvPr/>
+      </p:nvGrpSpPr>
+      <p:grpSpPr>
+        <a:xfrm>
+          <a:off x="0" y="0"/>
+          <a:ext cx="0" cy="0"/>
+          <a:chOff x="0" y="0"/>
+          <a:chExt cx="0" cy="0"/>
+        </a:xfrm>
+      </p:grpSpPr>
+      <p:sp>
+        <p:nvSpPr>
+          <p:cNvPr id="2" name="Title 1">
+            <a:extLst>
+              <a:ext uri="{FF2B5EF4-FFF2-40B4-BE49-F238E27FC236}">
                 <a16:creationId xmlns:a16="http://schemas.microsoft.com/office/drawing/2014/main" id="{55EF5CC9-D0D6-41DF-CECC-8DE17AF83308}"/>
               </a:ext>
             </a:extLst>
@@ -4145,7 +5032,7 @@
 </p:sld>
 </file>
 
-<file path=ppt/slides/slide11.xml><?xml version="1.0" encoding="utf-8"?>
+<file path=ppt/slides/slide13.xml><?xml version="1.0" encoding="utf-8"?>
 <p:sld xmlns:a="http://schemas.openxmlformats.org/drawingml/2006/main" xmlns:r="http://schemas.openxmlformats.org/officeDocument/2006/relationships" xmlns:p="http://schemas.openxmlformats.org/presentationml/2006/main">
   <p:cSld>
     <p:spTree>
@@ -4314,7 +5201,7 @@
 </p:sld>
 </file>
 
-<file path=ppt/slides/slide12.xml><?xml version="1.0" encoding="utf-8"?>
+<file path=ppt/slides/slide14.xml><?xml version="1.0" encoding="utf-8"?>
 <p:sld xmlns:a="http://schemas.openxmlformats.org/drawingml/2006/main" xmlns:r="http://schemas.openxmlformats.org/officeDocument/2006/relationships" xmlns:p="http://schemas.openxmlformats.org/presentationml/2006/main">
   <p:cSld>
     <p:spTree>
@@ -4477,7 +5364,7 @@
 </p:sld>
 </file>
 
-<file path=ppt/slides/slide13.xml><?xml version="1.0" encoding="utf-8"?>
+<file path=ppt/slides/slide15.xml><?xml version="1.0" encoding="utf-8"?>
 <p:sld xmlns:a="http://schemas.openxmlformats.org/drawingml/2006/main" xmlns:r="http://schemas.openxmlformats.org/officeDocument/2006/relationships" xmlns:p="http://schemas.openxmlformats.org/presentationml/2006/main">
   <p:cSld>
     <p:spTree>
@@ -4640,7 +5527,7 @@
 </p:sld>
 </file>
 
-<file path=ppt/slides/slide14.xml><?xml version="1.0" encoding="utf-8"?>
+<file path=ppt/slides/slide16.xml><?xml version="1.0" encoding="utf-8"?>
 <p:sld xmlns:a="http://schemas.openxmlformats.org/drawingml/2006/main" xmlns:r="http://schemas.openxmlformats.org/officeDocument/2006/relationships" xmlns:p="http://schemas.openxmlformats.org/presentationml/2006/main">
   <p:cSld>
     <p:spTree>
@@ -4803,7 +5690,7 @@
 </p:sld>
 </file>
 
-<file path=ppt/slides/slide15.xml><?xml version="1.0" encoding="utf-8"?>
+<file path=ppt/slides/slide17.xml><?xml version="1.0" encoding="utf-8"?>
 <p:sld xmlns:a="http://schemas.openxmlformats.org/drawingml/2006/main" xmlns:r="http://schemas.openxmlformats.org/officeDocument/2006/relationships" xmlns:p="http://schemas.openxmlformats.org/presentationml/2006/main">
   <p:cSld>
     <p:spTree>
@@ -4966,7 +5853,7 @@
 </p:sld>
 </file>
 
-<file path=ppt/slides/slide16.xml><?xml version="1.0" encoding="utf-8"?>
+<file path=ppt/slides/slide18.xml><?xml version="1.0" encoding="utf-8"?>
 <p:sld xmlns:a="http://schemas.openxmlformats.org/drawingml/2006/main" xmlns:r="http://schemas.openxmlformats.org/officeDocument/2006/relationships" xmlns:p="http://schemas.openxmlformats.org/presentationml/2006/main">
   <p:cSld>
     <p:spTree>
@@ -5129,7 +6016,7 @@
 </p:sld>
 </file>
 
-<file path=ppt/slides/slide17.xml><?xml version="1.0" encoding="utf-8"?>
+<file path=ppt/slides/slide19.xml><?xml version="1.0" encoding="utf-8"?>
 <p:sld xmlns:a="http://schemas.openxmlformats.org/drawingml/2006/main" xmlns:r="http://schemas.openxmlformats.org/officeDocument/2006/relationships" xmlns:p="http://schemas.openxmlformats.org/presentationml/2006/main">
   <p:cSld>
     <p:spTree>
@@ -5283,332 +6170,6 @@
     <p:extLst>
       <p:ext uri="{BB962C8B-B14F-4D97-AF65-F5344CB8AC3E}">
         <p14:creationId xmlns:p14="http://schemas.microsoft.com/office/powerpoint/2010/main" val="815862350"/>
-      </p:ext>
-    </p:extLst>
-  </p:cSld>
-  <p:clrMapOvr>
-    <a:masterClrMapping/>
-  </p:clrMapOvr>
-</p:sld>
-</file>
-
-<file path=ppt/slides/slide18.xml><?xml version="1.0" encoding="utf-8"?>
-<p:sld xmlns:a="http://schemas.openxmlformats.org/drawingml/2006/main" xmlns:r="http://schemas.openxmlformats.org/officeDocument/2006/relationships" xmlns:p="http://schemas.openxmlformats.org/presentationml/2006/main">
-  <p:cSld>
-    <p:spTree>
-      <p:nvGrpSpPr>
-        <p:cNvPr id="1" name=""/>
-        <p:cNvGrpSpPr/>
-        <p:nvPr/>
-      </p:nvGrpSpPr>
-      <p:grpSpPr>
-        <a:xfrm>
-          <a:off x="0" y="0"/>
-          <a:ext cx="0" cy="0"/>
-          <a:chOff x="0" y="0"/>
-          <a:chExt cx="0" cy="0"/>
-        </a:xfrm>
-      </p:grpSpPr>
-      <p:sp>
-        <p:nvSpPr>
-          <p:cNvPr id="2" name="Title 1">
-            <a:extLst>
-              <a:ext uri="{FF2B5EF4-FFF2-40B4-BE49-F238E27FC236}">
-                <a16:creationId xmlns:a16="http://schemas.microsoft.com/office/drawing/2014/main" id="{B492B1C8-0764-DA79-1EBA-E5F3C143C9C3}"/>
-              </a:ext>
-            </a:extLst>
-          </p:cNvPr>
-          <p:cNvSpPr>
-            <a:spLocks noGrp="1"/>
-          </p:cNvSpPr>
-          <p:nvPr>
-            <p:ph type="title"/>
-          </p:nvPr>
-        </p:nvSpPr>
-        <p:spPr/>
-        <p:txBody>
-          <a:bodyPr/>
-          <a:lstStyle/>
-          <a:p>
-            <a:endParaRPr lang="en-US"/>
-          </a:p>
-        </p:txBody>
-      </p:sp>
-      <p:sp>
-        <p:nvSpPr>
-          <p:cNvPr id="3" name="Text Placeholder 2">
-            <a:extLst>
-              <a:ext uri="{FF2B5EF4-FFF2-40B4-BE49-F238E27FC236}">
-                <a16:creationId xmlns:a16="http://schemas.microsoft.com/office/drawing/2014/main" id="{CC2B7FE6-0EE5-9DC6-FF68-39267F2AA686}"/>
-              </a:ext>
-            </a:extLst>
-          </p:cNvPr>
-          <p:cNvSpPr>
-            <a:spLocks noGrp="1"/>
-          </p:cNvSpPr>
-          <p:nvPr>
-            <p:ph type="body" idx="1"/>
-          </p:nvPr>
-        </p:nvSpPr>
-        <p:spPr/>
-        <p:txBody>
-          <a:bodyPr/>
-          <a:lstStyle/>
-          <a:p>
-            <a:endParaRPr lang="en-US"/>
-          </a:p>
-        </p:txBody>
-      </p:sp>
-      <p:sp>
-        <p:nvSpPr>
-          <p:cNvPr id="5" name="Text Placeholder 4">
-            <a:extLst>
-              <a:ext uri="{FF2B5EF4-FFF2-40B4-BE49-F238E27FC236}">
-                <a16:creationId xmlns:a16="http://schemas.microsoft.com/office/drawing/2014/main" id="{09243543-9934-5955-9327-94346A526408}"/>
-              </a:ext>
-            </a:extLst>
-          </p:cNvPr>
-          <p:cNvSpPr>
-            <a:spLocks noGrp="1"/>
-          </p:cNvSpPr>
-          <p:nvPr>
-            <p:ph type="body" sz="quarter" idx="3"/>
-          </p:nvPr>
-        </p:nvSpPr>
-        <p:spPr/>
-        <p:txBody>
-          <a:bodyPr/>
-          <a:lstStyle/>
-          <a:p>
-            <a:endParaRPr lang="en-US"/>
-          </a:p>
-        </p:txBody>
-      </p:sp>
-      <p:pic>
-        <p:nvPicPr>
-          <p:cNvPr id="10" name="Content Placeholder 9">
-            <a:extLst>
-              <a:ext uri="{FF2B5EF4-FFF2-40B4-BE49-F238E27FC236}">
-                <a16:creationId xmlns:a16="http://schemas.microsoft.com/office/drawing/2014/main" id="{45728895-7085-6F73-9740-C651FFDB0F80}"/>
-              </a:ext>
-            </a:extLst>
-          </p:cNvPr>
-          <p:cNvPicPr>
-            <a:picLocks noGrp="1" noChangeAspect="1"/>
-          </p:cNvPicPr>
-          <p:nvPr>
-            <p:ph sz="quarter" idx="4"/>
-          </p:nvPr>
-        </p:nvPicPr>
-        <p:blipFill>
-          <a:blip r:embed="rId2"/>
-          <a:stretch>
-            <a:fillRect/>
-          </a:stretch>
-        </p:blipFill>
-        <p:spPr>
-          <a:xfrm>
-            <a:off x="6172200" y="2895470"/>
-            <a:ext cx="5183188" cy="2903797"/>
-          </a:xfrm>
-        </p:spPr>
-      </p:pic>
-      <p:pic>
-        <p:nvPicPr>
-          <p:cNvPr id="7" name="Content Placeholder 6">
-            <a:extLst>
-              <a:ext uri="{FF2B5EF4-FFF2-40B4-BE49-F238E27FC236}">
-                <a16:creationId xmlns:a16="http://schemas.microsoft.com/office/drawing/2014/main" id="{0FE01603-670F-23CA-ADB4-3312CEDD5EBF}"/>
-              </a:ext>
-            </a:extLst>
-          </p:cNvPr>
-          <p:cNvPicPr>
-            <a:picLocks noGrp="1" noChangeAspect="1"/>
-          </p:cNvPicPr>
-          <p:nvPr>
-            <p:ph sz="half" idx="2"/>
-          </p:nvPr>
-        </p:nvPicPr>
-        <p:blipFill>
-          <a:blip r:embed="rId3"/>
-          <a:stretch>
-            <a:fillRect/>
-          </a:stretch>
-        </p:blipFill>
-        <p:spPr>
-          <a:xfrm>
-            <a:off x="839788" y="2889864"/>
-            <a:ext cx="5157787" cy="2915009"/>
-          </a:xfrm>
-        </p:spPr>
-      </p:pic>
-    </p:spTree>
-    <p:extLst>
-      <p:ext uri="{BB962C8B-B14F-4D97-AF65-F5344CB8AC3E}">
-        <p14:creationId xmlns:p14="http://schemas.microsoft.com/office/powerpoint/2010/main" val="1657729727"/>
-      </p:ext>
-    </p:extLst>
-  </p:cSld>
-  <p:clrMapOvr>
-    <a:masterClrMapping/>
-  </p:clrMapOvr>
-</p:sld>
-</file>
-
-<file path=ppt/slides/slide19.xml><?xml version="1.0" encoding="utf-8"?>
-<p:sld xmlns:a="http://schemas.openxmlformats.org/drawingml/2006/main" xmlns:r="http://schemas.openxmlformats.org/officeDocument/2006/relationships" xmlns:p="http://schemas.openxmlformats.org/presentationml/2006/main">
-  <p:cSld>
-    <p:spTree>
-      <p:nvGrpSpPr>
-        <p:cNvPr id="1" name=""/>
-        <p:cNvGrpSpPr/>
-        <p:nvPr/>
-      </p:nvGrpSpPr>
-      <p:grpSpPr>
-        <a:xfrm>
-          <a:off x="0" y="0"/>
-          <a:ext cx="0" cy="0"/>
-          <a:chOff x="0" y="0"/>
-          <a:chExt cx="0" cy="0"/>
-        </a:xfrm>
-      </p:grpSpPr>
-      <p:sp>
-        <p:nvSpPr>
-          <p:cNvPr id="2" name="Title 1">
-            <a:extLst>
-              <a:ext uri="{FF2B5EF4-FFF2-40B4-BE49-F238E27FC236}">
-                <a16:creationId xmlns:a16="http://schemas.microsoft.com/office/drawing/2014/main" id="{B492B1C8-0764-DA79-1EBA-E5F3C143C9C3}"/>
-              </a:ext>
-            </a:extLst>
-          </p:cNvPr>
-          <p:cNvSpPr>
-            <a:spLocks noGrp="1"/>
-          </p:cNvSpPr>
-          <p:nvPr>
-            <p:ph type="title"/>
-          </p:nvPr>
-        </p:nvSpPr>
-        <p:spPr/>
-        <p:txBody>
-          <a:bodyPr/>
-          <a:lstStyle/>
-          <a:p>
-            <a:endParaRPr lang="en-US"/>
-          </a:p>
-        </p:txBody>
-      </p:sp>
-      <p:sp>
-        <p:nvSpPr>
-          <p:cNvPr id="3" name="Text Placeholder 2">
-            <a:extLst>
-              <a:ext uri="{FF2B5EF4-FFF2-40B4-BE49-F238E27FC236}">
-                <a16:creationId xmlns:a16="http://schemas.microsoft.com/office/drawing/2014/main" id="{CC2B7FE6-0EE5-9DC6-FF68-39267F2AA686}"/>
-              </a:ext>
-            </a:extLst>
-          </p:cNvPr>
-          <p:cNvSpPr>
-            <a:spLocks noGrp="1"/>
-          </p:cNvSpPr>
-          <p:nvPr>
-            <p:ph type="body" idx="1"/>
-          </p:nvPr>
-        </p:nvSpPr>
-        <p:spPr/>
-        <p:txBody>
-          <a:bodyPr/>
-          <a:lstStyle/>
-          <a:p>
-            <a:endParaRPr lang="en-US"/>
-          </a:p>
-        </p:txBody>
-      </p:sp>
-      <p:sp>
-        <p:nvSpPr>
-          <p:cNvPr id="5" name="Text Placeholder 4">
-            <a:extLst>
-              <a:ext uri="{FF2B5EF4-FFF2-40B4-BE49-F238E27FC236}">
-                <a16:creationId xmlns:a16="http://schemas.microsoft.com/office/drawing/2014/main" id="{09243543-9934-5955-9327-94346A526408}"/>
-              </a:ext>
-            </a:extLst>
-          </p:cNvPr>
-          <p:cNvSpPr>
-            <a:spLocks noGrp="1"/>
-          </p:cNvSpPr>
-          <p:nvPr>
-            <p:ph type="body" sz="quarter" idx="3"/>
-          </p:nvPr>
-        </p:nvSpPr>
-        <p:spPr/>
-        <p:txBody>
-          <a:bodyPr/>
-          <a:lstStyle/>
-          <a:p>
-            <a:endParaRPr lang="en-US"/>
-          </a:p>
-        </p:txBody>
-      </p:sp>
-      <p:pic>
-        <p:nvPicPr>
-          <p:cNvPr id="10" name="Content Placeholder 9">
-            <a:extLst>
-              <a:ext uri="{FF2B5EF4-FFF2-40B4-BE49-F238E27FC236}">
-                <a16:creationId xmlns:a16="http://schemas.microsoft.com/office/drawing/2014/main" id="{45728895-7085-6F73-9740-C651FFDB0F80}"/>
-              </a:ext>
-            </a:extLst>
-          </p:cNvPr>
-          <p:cNvPicPr>
-            <a:picLocks noGrp="1" noChangeAspect="1"/>
-          </p:cNvPicPr>
-          <p:nvPr>
-            <p:ph sz="quarter" idx="4"/>
-          </p:nvPr>
-        </p:nvPicPr>
-        <p:blipFill>
-          <a:blip r:embed="rId2"/>
-          <a:stretch>
-            <a:fillRect/>
-          </a:stretch>
-        </p:blipFill>
-        <p:spPr>
-          <a:xfrm>
-            <a:off x="6172200" y="2895470"/>
-            <a:ext cx="5183188" cy="2903797"/>
-          </a:xfrm>
-        </p:spPr>
-      </p:pic>
-      <p:pic>
-        <p:nvPicPr>
-          <p:cNvPr id="7" name="Content Placeholder 6">
-            <a:extLst>
-              <a:ext uri="{FF2B5EF4-FFF2-40B4-BE49-F238E27FC236}">
-                <a16:creationId xmlns:a16="http://schemas.microsoft.com/office/drawing/2014/main" id="{20AFB9B5-00C1-E4F8-4427-DC41C167333C}"/>
-              </a:ext>
-            </a:extLst>
-          </p:cNvPr>
-          <p:cNvPicPr>
-            <a:picLocks noGrp="1" noChangeAspect="1"/>
-          </p:cNvPicPr>
-          <p:nvPr>
-            <p:ph sz="half" idx="2"/>
-          </p:nvPr>
-        </p:nvPicPr>
-        <p:blipFill>
-          <a:blip r:embed="rId3"/>
-          <a:stretch>
-            <a:fillRect/>
-          </a:stretch>
-        </p:blipFill>
-        <p:spPr>
-          <a:xfrm>
-            <a:off x="839788" y="2887050"/>
-            <a:ext cx="5157787" cy="2920638"/>
-          </a:xfrm>
-        </p:spPr>
-      </p:pic>
-    </p:spTree>
-    <p:extLst>
-      <p:ext uri="{BB962C8B-B14F-4D97-AF65-F5344CB8AC3E}">
-        <p14:creationId xmlns:p14="http://schemas.microsoft.com/office/powerpoint/2010/main" val="1044104072"/>
       </p:ext>
     </p:extLst>
   </p:cSld>
@@ -6082,6 +6643,332 @@
           <p:cNvPr id="7" name="Content Placeholder 6">
             <a:extLst>
               <a:ext uri="{FF2B5EF4-FFF2-40B4-BE49-F238E27FC236}">
+                <a16:creationId xmlns:a16="http://schemas.microsoft.com/office/drawing/2014/main" id="{0FE01603-670F-23CA-ADB4-3312CEDD5EBF}"/>
+              </a:ext>
+            </a:extLst>
+          </p:cNvPr>
+          <p:cNvPicPr>
+            <a:picLocks noGrp="1" noChangeAspect="1"/>
+          </p:cNvPicPr>
+          <p:nvPr>
+            <p:ph sz="half" idx="2"/>
+          </p:nvPr>
+        </p:nvPicPr>
+        <p:blipFill>
+          <a:blip r:embed="rId3"/>
+          <a:stretch>
+            <a:fillRect/>
+          </a:stretch>
+        </p:blipFill>
+        <p:spPr>
+          <a:xfrm>
+            <a:off x="839788" y="2889864"/>
+            <a:ext cx="5157787" cy="2915009"/>
+          </a:xfrm>
+        </p:spPr>
+      </p:pic>
+    </p:spTree>
+    <p:extLst>
+      <p:ext uri="{BB962C8B-B14F-4D97-AF65-F5344CB8AC3E}">
+        <p14:creationId xmlns:p14="http://schemas.microsoft.com/office/powerpoint/2010/main" val="1657729727"/>
+      </p:ext>
+    </p:extLst>
+  </p:cSld>
+  <p:clrMapOvr>
+    <a:masterClrMapping/>
+  </p:clrMapOvr>
+</p:sld>
+</file>
+
+<file path=ppt/slides/slide21.xml><?xml version="1.0" encoding="utf-8"?>
+<p:sld xmlns:a="http://schemas.openxmlformats.org/drawingml/2006/main" xmlns:r="http://schemas.openxmlformats.org/officeDocument/2006/relationships" xmlns:p="http://schemas.openxmlformats.org/presentationml/2006/main">
+  <p:cSld>
+    <p:spTree>
+      <p:nvGrpSpPr>
+        <p:cNvPr id="1" name=""/>
+        <p:cNvGrpSpPr/>
+        <p:nvPr/>
+      </p:nvGrpSpPr>
+      <p:grpSpPr>
+        <a:xfrm>
+          <a:off x="0" y="0"/>
+          <a:ext cx="0" cy="0"/>
+          <a:chOff x="0" y="0"/>
+          <a:chExt cx="0" cy="0"/>
+        </a:xfrm>
+      </p:grpSpPr>
+      <p:sp>
+        <p:nvSpPr>
+          <p:cNvPr id="2" name="Title 1">
+            <a:extLst>
+              <a:ext uri="{FF2B5EF4-FFF2-40B4-BE49-F238E27FC236}">
+                <a16:creationId xmlns:a16="http://schemas.microsoft.com/office/drawing/2014/main" id="{B492B1C8-0764-DA79-1EBA-E5F3C143C9C3}"/>
+              </a:ext>
+            </a:extLst>
+          </p:cNvPr>
+          <p:cNvSpPr>
+            <a:spLocks noGrp="1"/>
+          </p:cNvSpPr>
+          <p:nvPr>
+            <p:ph type="title"/>
+          </p:nvPr>
+        </p:nvSpPr>
+        <p:spPr/>
+        <p:txBody>
+          <a:bodyPr/>
+          <a:lstStyle/>
+          <a:p>
+            <a:endParaRPr lang="en-US"/>
+          </a:p>
+        </p:txBody>
+      </p:sp>
+      <p:sp>
+        <p:nvSpPr>
+          <p:cNvPr id="3" name="Text Placeholder 2">
+            <a:extLst>
+              <a:ext uri="{FF2B5EF4-FFF2-40B4-BE49-F238E27FC236}">
+                <a16:creationId xmlns:a16="http://schemas.microsoft.com/office/drawing/2014/main" id="{CC2B7FE6-0EE5-9DC6-FF68-39267F2AA686}"/>
+              </a:ext>
+            </a:extLst>
+          </p:cNvPr>
+          <p:cNvSpPr>
+            <a:spLocks noGrp="1"/>
+          </p:cNvSpPr>
+          <p:nvPr>
+            <p:ph type="body" idx="1"/>
+          </p:nvPr>
+        </p:nvSpPr>
+        <p:spPr/>
+        <p:txBody>
+          <a:bodyPr/>
+          <a:lstStyle/>
+          <a:p>
+            <a:endParaRPr lang="en-US"/>
+          </a:p>
+        </p:txBody>
+      </p:sp>
+      <p:sp>
+        <p:nvSpPr>
+          <p:cNvPr id="5" name="Text Placeholder 4">
+            <a:extLst>
+              <a:ext uri="{FF2B5EF4-FFF2-40B4-BE49-F238E27FC236}">
+                <a16:creationId xmlns:a16="http://schemas.microsoft.com/office/drawing/2014/main" id="{09243543-9934-5955-9327-94346A526408}"/>
+              </a:ext>
+            </a:extLst>
+          </p:cNvPr>
+          <p:cNvSpPr>
+            <a:spLocks noGrp="1"/>
+          </p:cNvSpPr>
+          <p:nvPr>
+            <p:ph type="body" sz="quarter" idx="3"/>
+          </p:nvPr>
+        </p:nvSpPr>
+        <p:spPr/>
+        <p:txBody>
+          <a:bodyPr/>
+          <a:lstStyle/>
+          <a:p>
+            <a:endParaRPr lang="en-US"/>
+          </a:p>
+        </p:txBody>
+      </p:sp>
+      <p:pic>
+        <p:nvPicPr>
+          <p:cNvPr id="10" name="Content Placeholder 9">
+            <a:extLst>
+              <a:ext uri="{FF2B5EF4-FFF2-40B4-BE49-F238E27FC236}">
+                <a16:creationId xmlns:a16="http://schemas.microsoft.com/office/drawing/2014/main" id="{45728895-7085-6F73-9740-C651FFDB0F80}"/>
+              </a:ext>
+            </a:extLst>
+          </p:cNvPr>
+          <p:cNvPicPr>
+            <a:picLocks noGrp="1" noChangeAspect="1"/>
+          </p:cNvPicPr>
+          <p:nvPr>
+            <p:ph sz="quarter" idx="4"/>
+          </p:nvPr>
+        </p:nvPicPr>
+        <p:blipFill>
+          <a:blip r:embed="rId2"/>
+          <a:stretch>
+            <a:fillRect/>
+          </a:stretch>
+        </p:blipFill>
+        <p:spPr>
+          <a:xfrm>
+            <a:off x="6172200" y="2895470"/>
+            <a:ext cx="5183188" cy="2903797"/>
+          </a:xfrm>
+        </p:spPr>
+      </p:pic>
+      <p:pic>
+        <p:nvPicPr>
+          <p:cNvPr id="7" name="Content Placeholder 6">
+            <a:extLst>
+              <a:ext uri="{FF2B5EF4-FFF2-40B4-BE49-F238E27FC236}">
+                <a16:creationId xmlns:a16="http://schemas.microsoft.com/office/drawing/2014/main" id="{20AFB9B5-00C1-E4F8-4427-DC41C167333C}"/>
+              </a:ext>
+            </a:extLst>
+          </p:cNvPr>
+          <p:cNvPicPr>
+            <a:picLocks noGrp="1" noChangeAspect="1"/>
+          </p:cNvPicPr>
+          <p:nvPr>
+            <p:ph sz="half" idx="2"/>
+          </p:nvPr>
+        </p:nvPicPr>
+        <p:blipFill>
+          <a:blip r:embed="rId3"/>
+          <a:stretch>
+            <a:fillRect/>
+          </a:stretch>
+        </p:blipFill>
+        <p:spPr>
+          <a:xfrm>
+            <a:off x="839788" y="2887050"/>
+            <a:ext cx="5157787" cy="2920638"/>
+          </a:xfrm>
+        </p:spPr>
+      </p:pic>
+    </p:spTree>
+    <p:extLst>
+      <p:ext uri="{BB962C8B-B14F-4D97-AF65-F5344CB8AC3E}">
+        <p14:creationId xmlns:p14="http://schemas.microsoft.com/office/powerpoint/2010/main" val="1044104072"/>
+      </p:ext>
+    </p:extLst>
+  </p:cSld>
+  <p:clrMapOvr>
+    <a:masterClrMapping/>
+  </p:clrMapOvr>
+</p:sld>
+</file>
+
+<file path=ppt/slides/slide22.xml><?xml version="1.0" encoding="utf-8"?>
+<p:sld xmlns:a="http://schemas.openxmlformats.org/drawingml/2006/main" xmlns:r="http://schemas.openxmlformats.org/officeDocument/2006/relationships" xmlns:p="http://schemas.openxmlformats.org/presentationml/2006/main">
+  <p:cSld>
+    <p:spTree>
+      <p:nvGrpSpPr>
+        <p:cNvPr id="1" name=""/>
+        <p:cNvGrpSpPr/>
+        <p:nvPr/>
+      </p:nvGrpSpPr>
+      <p:grpSpPr>
+        <a:xfrm>
+          <a:off x="0" y="0"/>
+          <a:ext cx="0" cy="0"/>
+          <a:chOff x="0" y="0"/>
+          <a:chExt cx="0" cy="0"/>
+        </a:xfrm>
+      </p:grpSpPr>
+      <p:sp>
+        <p:nvSpPr>
+          <p:cNvPr id="2" name="Title 1">
+            <a:extLst>
+              <a:ext uri="{FF2B5EF4-FFF2-40B4-BE49-F238E27FC236}">
+                <a16:creationId xmlns:a16="http://schemas.microsoft.com/office/drawing/2014/main" id="{B492B1C8-0764-DA79-1EBA-E5F3C143C9C3}"/>
+              </a:ext>
+            </a:extLst>
+          </p:cNvPr>
+          <p:cNvSpPr>
+            <a:spLocks noGrp="1"/>
+          </p:cNvSpPr>
+          <p:nvPr>
+            <p:ph type="title"/>
+          </p:nvPr>
+        </p:nvSpPr>
+        <p:spPr/>
+        <p:txBody>
+          <a:bodyPr/>
+          <a:lstStyle/>
+          <a:p>
+            <a:endParaRPr lang="en-US"/>
+          </a:p>
+        </p:txBody>
+      </p:sp>
+      <p:sp>
+        <p:nvSpPr>
+          <p:cNvPr id="3" name="Text Placeholder 2">
+            <a:extLst>
+              <a:ext uri="{FF2B5EF4-FFF2-40B4-BE49-F238E27FC236}">
+                <a16:creationId xmlns:a16="http://schemas.microsoft.com/office/drawing/2014/main" id="{CC2B7FE6-0EE5-9DC6-FF68-39267F2AA686}"/>
+              </a:ext>
+            </a:extLst>
+          </p:cNvPr>
+          <p:cNvSpPr>
+            <a:spLocks noGrp="1"/>
+          </p:cNvSpPr>
+          <p:nvPr>
+            <p:ph type="body" idx="1"/>
+          </p:nvPr>
+        </p:nvSpPr>
+        <p:spPr/>
+        <p:txBody>
+          <a:bodyPr/>
+          <a:lstStyle/>
+          <a:p>
+            <a:endParaRPr lang="en-US"/>
+          </a:p>
+        </p:txBody>
+      </p:sp>
+      <p:sp>
+        <p:nvSpPr>
+          <p:cNvPr id="5" name="Text Placeholder 4">
+            <a:extLst>
+              <a:ext uri="{FF2B5EF4-FFF2-40B4-BE49-F238E27FC236}">
+                <a16:creationId xmlns:a16="http://schemas.microsoft.com/office/drawing/2014/main" id="{09243543-9934-5955-9327-94346A526408}"/>
+              </a:ext>
+            </a:extLst>
+          </p:cNvPr>
+          <p:cNvSpPr>
+            <a:spLocks noGrp="1"/>
+          </p:cNvSpPr>
+          <p:nvPr>
+            <p:ph type="body" sz="quarter" idx="3"/>
+          </p:nvPr>
+        </p:nvSpPr>
+        <p:spPr/>
+        <p:txBody>
+          <a:bodyPr/>
+          <a:lstStyle/>
+          <a:p>
+            <a:endParaRPr lang="en-US"/>
+          </a:p>
+        </p:txBody>
+      </p:sp>
+      <p:pic>
+        <p:nvPicPr>
+          <p:cNvPr id="10" name="Content Placeholder 9">
+            <a:extLst>
+              <a:ext uri="{FF2B5EF4-FFF2-40B4-BE49-F238E27FC236}">
+                <a16:creationId xmlns:a16="http://schemas.microsoft.com/office/drawing/2014/main" id="{45728895-7085-6F73-9740-C651FFDB0F80}"/>
+              </a:ext>
+            </a:extLst>
+          </p:cNvPr>
+          <p:cNvPicPr>
+            <a:picLocks noGrp="1" noChangeAspect="1"/>
+          </p:cNvPicPr>
+          <p:nvPr>
+            <p:ph sz="quarter" idx="4"/>
+          </p:nvPr>
+        </p:nvPicPr>
+        <p:blipFill>
+          <a:blip r:embed="rId2"/>
+          <a:stretch>
+            <a:fillRect/>
+          </a:stretch>
+        </p:blipFill>
+        <p:spPr>
+          <a:xfrm>
+            <a:off x="6172200" y="2895470"/>
+            <a:ext cx="5183188" cy="2903797"/>
+          </a:xfrm>
+        </p:spPr>
+      </p:pic>
+      <p:pic>
+        <p:nvPicPr>
+          <p:cNvPr id="7" name="Content Placeholder 6">
+            <a:extLst>
+              <a:ext uri="{FF2B5EF4-FFF2-40B4-BE49-F238E27FC236}">
                 <a16:creationId xmlns:a16="http://schemas.microsoft.com/office/drawing/2014/main" id="{51A6710E-6B2E-B558-8F82-D51467D68CB9}"/>
               </a:ext>
             </a:extLst>
@@ -6119,7 +7006,7 @@
 </p:sld>
 </file>
 
-<file path=ppt/slides/slide21.xml><?xml version="1.0" encoding="utf-8"?>
+<file path=ppt/slides/slide23.xml><?xml version="1.0" encoding="utf-8"?>
 <p:sld xmlns:a="http://schemas.openxmlformats.org/drawingml/2006/main" xmlns:r="http://schemas.openxmlformats.org/officeDocument/2006/relationships" xmlns:p="http://schemas.openxmlformats.org/presentationml/2006/main">
   <p:cSld>
     <p:spTree>
@@ -6288,7 +7175,7 @@
 </p:sld>
 </file>
 
-<file path=ppt/slides/slide22.xml><?xml version="1.0" encoding="utf-8"?>
+<file path=ppt/slides/slide24.xml><?xml version="1.0" encoding="utf-8"?>
 <p:sld xmlns:a="http://schemas.openxmlformats.org/drawingml/2006/main" xmlns:r="http://schemas.openxmlformats.org/officeDocument/2006/relationships" xmlns:p="http://schemas.openxmlformats.org/presentationml/2006/main">
   <p:cSld>
     <p:spTree>
@@ -6375,7 +7262,7 @@
 </p:sld>
 </file>
 
-<file path=ppt/slides/slide23.xml><?xml version="1.0" encoding="utf-8"?>
+<file path=ppt/slides/slide25.xml><?xml version="1.0" encoding="utf-8"?>
 <p:sld xmlns:a="http://schemas.openxmlformats.org/drawingml/2006/main" xmlns:r="http://schemas.openxmlformats.org/officeDocument/2006/relationships" xmlns:p="http://schemas.openxmlformats.org/presentationml/2006/main">
   <p:cSld>
     <p:spTree>
@@ -6464,7 +7351,592 @@
 </p:sld>
 </file>
 
-<file path=ppt/slides/slide24.xml><?xml version="1.0" encoding="utf-8"?>
+<file path=ppt/slides/slide26.xml><?xml version="1.0" encoding="utf-8"?>
+<p:sld xmlns:a="http://schemas.openxmlformats.org/drawingml/2006/main" xmlns:r="http://schemas.openxmlformats.org/officeDocument/2006/relationships" xmlns:p="http://schemas.openxmlformats.org/presentationml/2006/main">
+  <p:cSld>
+    <p:bg>
+      <p:bgPr>
+        <a:solidFill>
+          <a:schemeClr val="bg1"/>
+        </a:solidFill>
+        <a:effectLst/>
+      </p:bgPr>
+    </p:bg>
+    <p:spTree>
+      <p:nvGrpSpPr>
+        <p:cNvPr id="1" name=""/>
+        <p:cNvGrpSpPr/>
+        <p:nvPr/>
+      </p:nvGrpSpPr>
+      <p:grpSpPr>
+        <a:xfrm>
+          <a:off x="0" y="0"/>
+          <a:ext cx="0" cy="0"/>
+          <a:chOff x="0" y="0"/>
+          <a:chExt cx="0" cy="0"/>
+        </a:xfrm>
+      </p:grpSpPr>
+      <p:sp useBgFill="1">
+        <p:nvSpPr>
+          <p:cNvPr id="10" name="Rectangle 9">
+            <a:extLst>
+              <a:ext uri="{FF2B5EF4-FFF2-40B4-BE49-F238E27FC236}">
+                <a16:creationId xmlns:a16="http://schemas.microsoft.com/office/drawing/2014/main" id="{74B0B678-CD10-4371-96E5-2706F4579FAD}"/>
+              </a:ext>
+              <a:ext uri="{C183D7F6-B498-43B3-948B-1728B52AA6E4}">
+                <adec:decorative xmlns:adec="http://schemas.microsoft.com/office/drawing/2017/decorative" val="1"/>
+              </a:ext>
+            </a:extLst>
+          </p:cNvPr>
+          <p:cNvSpPr>
+            <a:spLocks noGrp="1" noRot="1" noChangeAspect="1" noMove="1" noResize="1" noEditPoints="1" noAdjustHandles="1" noChangeArrowheads="1" noChangeShapeType="1" noTextEdit="1"/>
+          </p:cNvSpPr>
+          <p:nvPr>
+            <p:extLst>
+              <p:ext uri="{386F3935-93C4-4BCD-93E2-E3B085C9AB24}">
+                <p16:designElem xmlns:p16="http://schemas.microsoft.com/office/powerpoint/2015/main" val="1"/>
+              </p:ext>
+            </p:extLst>
+          </p:nvPr>
+        </p:nvSpPr>
+        <p:spPr>
+          <a:xfrm>
+            <a:off x="0" y="0"/>
+            <a:ext cx="12191999" cy="6857365"/>
+          </a:xfrm>
+          <a:prstGeom prst="rect">
+            <a:avLst/>
+          </a:prstGeom>
+          <a:ln>
+            <a:noFill/>
+          </a:ln>
+        </p:spPr>
+        <p:style>
+          <a:lnRef idx="2">
+            <a:schemeClr val="accent1">
+              <a:shade val="50000"/>
+            </a:schemeClr>
+          </a:lnRef>
+          <a:fillRef idx="1">
+            <a:schemeClr val="accent1"/>
+          </a:fillRef>
+          <a:effectRef idx="0">
+            <a:schemeClr val="accent1"/>
+          </a:effectRef>
+          <a:fontRef idx="minor">
+            <a:schemeClr val="lt1"/>
+          </a:fontRef>
+        </p:style>
+        <p:txBody>
+          <a:bodyPr rtlCol="0" anchor="ctr"/>
+          <a:lstStyle/>
+          <a:p>
+            <a:pPr algn="ctr"/>
+            <a:endParaRPr lang="en-US"/>
+          </a:p>
+        </p:txBody>
+      </p:sp>
+      <p:grpSp>
+        <p:nvGrpSpPr>
+          <p:cNvPr id="15" name="Group 14">
+            <a:extLst>
+              <a:ext uri="{FF2B5EF4-FFF2-40B4-BE49-F238E27FC236}">
+                <a16:creationId xmlns:a16="http://schemas.microsoft.com/office/drawing/2014/main" id="{A9270323-9616-4384-857D-E86B78272EFE}"/>
+              </a:ext>
+              <a:ext uri="{C183D7F6-B498-43B3-948B-1728B52AA6E4}">
+                <adec:decorative xmlns:adec="http://schemas.microsoft.com/office/drawing/2017/decorative" val="1"/>
+              </a:ext>
+            </a:extLst>
+          </p:cNvPr>
+          <p:cNvGrpSpPr>
+            <a:grpSpLocks noGrp="1" noUngrp="1" noRot="1" noChangeAspect="1" noMove="1" noResize="1"/>
+          </p:cNvGrpSpPr>
+          <p:nvPr>
+            <p:extLst>
+              <p:ext uri="{386F3935-93C4-4BCD-93E2-E3B085C9AB24}">
+                <p16:designElem xmlns:p16="http://schemas.microsoft.com/office/powerpoint/2015/main" val="1"/>
+              </p:ext>
+            </p:extLst>
+          </p:nvPr>
+        </p:nvGrpSpPr>
+        <p:grpSpPr>
+          <a:xfrm rot="5400000">
+            <a:off x="-2340441" y="2666183"/>
+            <a:ext cx="5860051" cy="527712"/>
+            <a:chOff x="6081624" y="1998368"/>
+            <a:chExt cx="5613457" cy="782175"/>
+          </a:xfrm>
+          <a:solidFill>
+            <a:schemeClr val="accent4"/>
+          </a:solidFill>
+        </p:grpSpPr>
+        <p:sp>
+          <p:nvSpPr>
+            <p:cNvPr id="16" name="Rectangle 15">
+              <a:extLst>
+                <a:ext uri="{FF2B5EF4-FFF2-40B4-BE49-F238E27FC236}">
+                  <a16:creationId xmlns:a16="http://schemas.microsoft.com/office/drawing/2014/main" id="{8A3838D5-9565-4601-BAC3-D1B5BDB803ED}"/>
+                </a:ext>
+                <a:ext uri="{C183D7F6-B498-43B3-948B-1728B52AA6E4}">
+                  <adec:decorative xmlns:adec="http://schemas.microsoft.com/office/drawing/2017/decorative" val="1"/>
+                </a:ext>
+              </a:extLst>
+            </p:cNvPr>
+            <p:cNvSpPr/>
+            <p:nvPr>
+              <p:extLst>
+                <p:ext uri="{386F3935-93C4-4BCD-93E2-E3B085C9AB24}">
+                  <p16:designElem xmlns:p16="http://schemas.microsoft.com/office/powerpoint/2015/main" val="1"/>
+                </p:ext>
+              </p:extLst>
+            </p:nvPr>
+          </p:nvSpPr>
+          <p:spPr>
+            <a:xfrm rot="5400000">
+              <a:off x="11228040" y="2313027"/>
+              <a:ext cx="781700" cy="152382"/>
+            </a:xfrm>
+            <a:prstGeom prst="rect">
+              <a:avLst/>
+            </a:prstGeom>
+            <a:grpFill/>
+            <a:ln>
+              <a:noFill/>
+            </a:ln>
+          </p:spPr>
+          <p:style>
+            <a:lnRef idx="2">
+              <a:schemeClr val="accent1">
+                <a:shade val="50000"/>
+              </a:schemeClr>
+            </a:lnRef>
+            <a:fillRef idx="1">
+              <a:schemeClr val="accent1"/>
+            </a:fillRef>
+            <a:effectRef idx="0">
+              <a:schemeClr val="accent1"/>
+            </a:effectRef>
+            <a:fontRef idx="minor">
+              <a:schemeClr val="lt1"/>
+            </a:fontRef>
+          </p:style>
+          <p:txBody>
+            <a:bodyPr rtlCol="0" anchor="ctr"/>
+            <a:lstStyle/>
+            <a:p>
+              <a:pPr algn="ctr"/>
+              <a:endParaRPr lang="en-US"/>
+            </a:p>
+          </p:txBody>
+        </p:sp>
+        <p:sp>
+          <p:nvSpPr>
+            <p:cNvPr id="17" name="Rectangle 16">
+              <a:extLst>
+                <a:ext uri="{FF2B5EF4-FFF2-40B4-BE49-F238E27FC236}">
+                  <a16:creationId xmlns:a16="http://schemas.microsoft.com/office/drawing/2014/main" id="{3349A4B8-3246-4579-922E-FE1155C7F08C}"/>
+                </a:ext>
+                <a:ext uri="{C183D7F6-B498-43B3-948B-1728B52AA6E4}">
+                  <adec:decorative xmlns:adec="http://schemas.microsoft.com/office/drawing/2017/decorative" val="1"/>
+                </a:ext>
+              </a:extLst>
+            </p:cNvPr>
+            <p:cNvSpPr/>
+            <p:nvPr>
+              <p:extLst>
+                <p:ext uri="{386F3935-93C4-4BCD-93E2-E3B085C9AB24}">
+                  <p16:designElem xmlns:p16="http://schemas.microsoft.com/office/powerpoint/2015/main" val="1"/>
+                </p:ext>
+              </p:extLst>
+            </p:nvPr>
+          </p:nvSpPr>
+          <p:spPr>
+            <a:xfrm flipH="1" flipV="1">
+              <a:off x="6081624" y="1998844"/>
+              <a:ext cx="5372968" cy="781699"/>
+            </a:xfrm>
+            <a:prstGeom prst="rect">
+              <a:avLst/>
+            </a:prstGeom>
+            <a:grpFill/>
+            <a:ln>
+              <a:noFill/>
+            </a:ln>
+          </p:spPr>
+          <p:style>
+            <a:lnRef idx="2">
+              <a:schemeClr val="accent1">
+                <a:shade val="50000"/>
+              </a:schemeClr>
+            </a:lnRef>
+            <a:fillRef idx="1">
+              <a:schemeClr val="accent1"/>
+            </a:fillRef>
+            <a:effectRef idx="0">
+              <a:schemeClr val="accent1"/>
+            </a:effectRef>
+            <a:fontRef idx="minor">
+              <a:schemeClr val="lt1"/>
+            </a:fontRef>
+          </p:style>
+          <p:txBody>
+            <a:bodyPr rtlCol="0" anchor="ctr"/>
+            <a:lstStyle/>
+            <a:p>
+              <a:pPr algn="ctr"/>
+              <a:endParaRPr lang="en-US"/>
+            </a:p>
+          </p:txBody>
+        </p:sp>
+      </p:grpSp>
+      <p:sp>
+        <p:nvSpPr>
+          <p:cNvPr id="19" name="Rectangle 18">
+            <a:extLst>
+              <a:ext uri="{FF2B5EF4-FFF2-40B4-BE49-F238E27FC236}">
+                <a16:creationId xmlns:a16="http://schemas.microsoft.com/office/drawing/2014/main" id="{CBC4F608-B4B8-48C3-9572-C0F061B1CD99}"/>
+              </a:ext>
+              <a:ext uri="{C183D7F6-B498-43B3-948B-1728B52AA6E4}">
+                <adec:decorative xmlns:adec="http://schemas.microsoft.com/office/drawing/2017/decorative" val="1"/>
+              </a:ext>
+            </a:extLst>
+          </p:cNvPr>
+          <p:cNvSpPr>
+            <a:spLocks noGrp="1" noRot="1" noChangeAspect="1" noMove="1" noResize="1" noEditPoints="1" noAdjustHandles="1" noChangeArrowheads="1" noChangeShapeType="1" noTextEdit="1"/>
+          </p:cNvSpPr>
+          <p:nvPr>
+            <p:extLst>
+              <p:ext uri="{386F3935-93C4-4BCD-93E2-E3B085C9AB24}">
+                <p16:designElem xmlns:p16="http://schemas.microsoft.com/office/powerpoint/2015/main" val="1"/>
+              </p:ext>
+            </p:extLst>
+          </p:nvPr>
+        </p:nvSpPr>
+        <p:spPr>
+          <a:xfrm>
+            <a:off x="579528" y="517897"/>
+            <a:ext cx="11111729" cy="5857966"/>
+          </a:xfrm>
+          <a:prstGeom prst="rect">
+            <a:avLst/>
+          </a:prstGeom>
+          <a:solidFill>
+            <a:schemeClr val="bg1"/>
+          </a:solidFill>
+          <a:ln>
+            <a:noFill/>
+          </a:ln>
+          <a:effectLst>
+            <a:outerShdw blurRad="139700" dist="127000" dir="5400000" algn="t" rotWithShape="0">
+              <a:prstClr val="black">
+                <a:alpha val="15000"/>
+              </a:prstClr>
+            </a:outerShdw>
+          </a:effectLst>
+        </p:spPr>
+        <p:style>
+          <a:lnRef idx="2">
+            <a:schemeClr val="accent1">
+              <a:shade val="50000"/>
+            </a:schemeClr>
+          </a:lnRef>
+          <a:fillRef idx="1">
+            <a:schemeClr val="accent1"/>
+          </a:fillRef>
+          <a:effectRef idx="0">
+            <a:schemeClr val="accent1"/>
+          </a:effectRef>
+          <a:fontRef idx="minor">
+            <a:schemeClr val="lt1"/>
+          </a:fontRef>
+        </p:style>
+        <p:txBody>
+          <a:bodyPr rtlCol="0" anchor="ctr"/>
+          <a:lstStyle/>
+          <a:p>
+            <a:pPr algn="ctr"/>
+            <a:endParaRPr lang="en-US"/>
+          </a:p>
+        </p:txBody>
+      </p:sp>
+      <p:sp>
+        <p:nvSpPr>
+          <p:cNvPr id="2" name="Title 1">
+            <a:extLst>
+              <a:ext uri="{FF2B5EF4-FFF2-40B4-BE49-F238E27FC236}">
+                <a16:creationId xmlns:a16="http://schemas.microsoft.com/office/drawing/2014/main" id="{330766FE-F8B8-777B-2219-9940145F8FA9}"/>
+              </a:ext>
+            </a:extLst>
+          </p:cNvPr>
+          <p:cNvSpPr>
+            <a:spLocks noGrp="1"/>
+          </p:cNvSpPr>
+          <p:nvPr>
+            <p:ph type="title"/>
+          </p:nvPr>
+        </p:nvSpPr>
+        <p:spPr>
+          <a:xfrm>
+            <a:off x="5867475" y="847827"/>
+            <a:ext cx="5408813" cy="1169585"/>
+          </a:xfrm>
+        </p:spPr>
+        <p:txBody>
+          <a:bodyPr anchor="b">
+            <a:noAutofit/>
+          </a:bodyPr>
+          <a:lstStyle/>
+          <a:p>
+            <a:r>
+              <a:rPr lang="en-US" sz="2400" b="0" i="0" dirty="0">
+                <a:effectLst/>
+                <a:latin typeface="Roboto" panose="02000000000000000000" pitchFamily="2" charset="0"/>
+                <a:ea typeface="Roboto" panose="02000000000000000000" pitchFamily="2" charset="0"/>
+                <a:cs typeface="Roboto" panose="02000000000000000000" pitchFamily="2" charset="0"/>
+              </a:rPr>
+              <a:t>What trends can be observed in the relationship between agricultural production and population growth?</a:t>
+            </a:r>
+            <a:endParaRPr lang="en-US" sz="2400" dirty="0"/>
+          </a:p>
+        </p:txBody>
+      </p:sp>
+      <p:pic>
+        <p:nvPicPr>
+          <p:cNvPr id="7" name="Content Placeholder 4">
+            <a:extLst>
+              <a:ext uri="{FF2B5EF4-FFF2-40B4-BE49-F238E27FC236}">
+                <a16:creationId xmlns:a16="http://schemas.microsoft.com/office/drawing/2014/main" id="{DBD22DD2-1143-E726-DD96-8A6B4C0A74B9}"/>
+              </a:ext>
+            </a:extLst>
+          </p:cNvPr>
+          <p:cNvPicPr>
+            <a:picLocks noChangeAspect="1"/>
+          </p:cNvPicPr>
+          <p:nvPr/>
+        </p:nvPicPr>
+        <p:blipFill>
+          <a:blip r:embed="rId3"/>
+          <a:stretch>
+            <a:fillRect/>
+          </a:stretch>
+        </p:blipFill>
+        <p:spPr>
+          <a:xfrm>
+            <a:off x="914401" y="813973"/>
+            <a:ext cx="4389120" cy="2501797"/>
+          </a:xfrm>
+          <a:prstGeom prst="rect">
+            <a:avLst/>
+          </a:prstGeom>
+        </p:spPr>
+      </p:pic>
+      <p:sp>
+        <p:nvSpPr>
+          <p:cNvPr id="21" name="Rectangle 20">
+            <a:extLst>
+              <a:ext uri="{FF2B5EF4-FFF2-40B4-BE49-F238E27FC236}">
+                <a16:creationId xmlns:a16="http://schemas.microsoft.com/office/drawing/2014/main" id="{1382A32C-5B0C-4B1C-A074-76C6DBCC9F87}"/>
+              </a:ext>
+              <a:ext uri="{C183D7F6-B498-43B3-948B-1728B52AA6E4}">
+                <adec:decorative xmlns:adec="http://schemas.microsoft.com/office/drawing/2017/decorative" val="1"/>
+              </a:ext>
+            </a:extLst>
+          </p:cNvPr>
+          <p:cNvSpPr>
+            <a:spLocks noGrp="1" noRot="1" noChangeAspect="1" noMove="1" noResize="1" noEditPoints="1" noAdjustHandles="1" noChangeArrowheads="1" noChangeShapeType="1" noTextEdit="1"/>
+          </p:cNvSpPr>
+          <p:nvPr>
+            <p:extLst>
+              <p:ext uri="{386F3935-93C4-4BCD-93E2-E3B085C9AB24}">
+                <p16:designElem xmlns:p16="http://schemas.microsoft.com/office/powerpoint/2015/main" val="1"/>
+              </p:ext>
+            </p:extLst>
+          </p:nvPr>
+        </p:nvSpPr>
+        <p:spPr>
+          <a:xfrm flipH="1">
+            <a:off x="5957331" y="2188548"/>
+            <a:ext cx="5041025" cy="27432"/>
+          </a:xfrm>
+          <a:prstGeom prst="rect">
+            <a:avLst/>
+          </a:prstGeom>
+          <a:solidFill>
+            <a:schemeClr val="accent4"/>
+          </a:solidFill>
+          <a:ln>
+            <a:noFill/>
+          </a:ln>
+        </p:spPr>
+        <p:style>
+          <a:lnRef idx="2">
+            <a:schemeClr val="accent1">
+              <a:shade val="50000"/>
+            </a:schemeClr>
+          </a:lnRef>
+          <a:fillRef idx="1">
+            <a:schemeClr val="accent1"/>
+          </a:fillRef>
+          <a:effectRef idx="0">
+            <a:schemeClr val="accent1"/>
+          </a:effectRef>
+          <a:fontRef idx="minor">
+            <a:schemeClr val="lt1"/>
+          </a:fontRef>
+        </p:style>
+        <p:txBody>
+          <a:bodyPr rtlCol="0" anchor="ctr"/>
+          <a:lstStyle/>
+          <a:p>
+            <a:pPr algn="ctr"/>
+            <a:endParaRPr lang="en-US"/>
+          </a:p>
+        </p:txBody>
+      </p:sp>
+      <p:pic>
+        <p:nvPicPr>
+          <p:cNvPr id="8" name="Picture 7">
+            <a:extLst>
+              <a:ext uri="{FF2B5EF4-FFF2-40B4-BE49-F238E27FC236}">
+                <a16:creationId xmlns:a16="http://schemas.microsoft.com/office/drawing/2014/main" id="{C73A8913-1944-F302-E275-02CAA66D00EA}"/>
+              </a:ext>
+            </a:extLst>
+          </p:cNvPr>
+          <p:cNvPicPr>
+            <a:picLocks noChangeAspect="1"/>
+          </p:cNvPicPr>
+          <p:nvPr/>
+        </p:nvPicPr>
+        <p:blipFill>
+          <a:blip r:embed="rId4"/>
+          <a:stretch>
+            <a:fillRect/>
+          </a:stretch>
+        </p:blipFill>
+        <p:spPr>
+          <a:xfrm>
+            <a:off x="914401" y="4157915"/>
+            <a:ext cx="4389120" cy="1415490"/>
+          </a:xfrm>
+          <a:prstGeom prst="rect">
+            <a:avLst/>
+          </a:prstGeom>
+        </p:spPr>
+      </p:pic>
+      <p:sp>
+        <p:nvSpPr>
+          <p:cNvPr id="3" name="Content Placeholder 2">
+            <a:extLst>
+              <a:ext uri="{FF2B5EF4-FFF2-40B4-BE49-F238E27FC236}">
+                <a16:creationId xmlns:a16="http://schemas.microsoft.com/office/drawing/2014/main" id="{827A2BFE-FADC-18E7-01C0-305BD9A9B7D8}"/>
+              </a:ext>
+            </a:extLst>
+          </p:cNvPr>
+          <p:cNvSpPr>
+            <a:spLocks noGrp="1"/>
+          </p:cNvSpPr>
+          <p:nvPr>
+            <p:ph idx="1"/>
+          </p:nvPr>
+        </p:nvSpPr>
+        <p:spPr>
+          <a:xfrm>
+            <a:off x="5868786" y="2508105"/>
+            <a:ext cx="5408813" cy="3632493"/>
+          </a:xfrm>
+        </p:spPr>
+        <p:txBody>
+          <a:bodyPr anchor="ctr">
+            <a:normAutofit/>
+          </a:bodyPr>
+          <a:lstStyle/>
+          <a:p>
+            <a:pPr marL="0" indent="0">
+              <a:buNone/>
+            </a:pPr>
+            <a:r>
+              <a:rPr lang="en-US" sz="1900"/>
+              <a:t>Upon reviewing the data a strong linear relationship was observed in the data between agricultural production and population growth. Population growth from the 1960’s till current has been been at almost a constant growth, this is a bias in our dataset as world population pre-1960 was much flatter and future predictions expect population growth to decline. Agricultural production started in the 1960’s with an almost 1:1 with population but lagged until 2017 when it surpassed population then abruptly declined to pace with population demands as observed on the graph.</a:t>
+            </a:r>
+          </a:p>
+        </p:txBody>
+      </p:sp>
+      <p:sp>
+        <p:nvSpPr>
+          <p:cNvPr id="12" name="TextBox 11">
+            <a:extLst>
+              <a:ext uri="{FF2B5EF4-FFF2-40B4-BE49-F238E27FC236}">
+                <a16:creationId xmlns:a16="http://schemas.microsoft.com/office/drawing/2014/main" id="{BABD0260-2875-430A-1395-F36DE310EE8B}"/>
+              </a:ext>
+            </a:extLst>
+          </p:cNvPr>
+          <p:cNvSpPr txBox="1"/>
+          <p:nvPr/>
+        </p:nvSpPr>
+        <p:spPr>
+          <a:xfrm>
+            <a:off x="914401" y="5807595"/>
+            <a:ext cx="3676969" cy="646331"/>
+          </a:xfrm>
+          <a:prstGeom prst="rect">
+            <a:avLst/>
+          </a:prstGeom>
+          <a:noFill/>
+        </p:spPr>
+        <p:txBody>
+          <a:bodyPr wrap="none" rtlCol="0">
+            <a:spAutoFit/>
+          </a:bodyPr>
+          <a:lstStyle/>
+          <a:p>
+            <a:r>
+              <a:rPr kumimoji="0" lang="en-US" altLang="en-US" sz="1200" b="0" i="0" u="none" strike="noStrike" cap="none" normalizeH="0" baseline="0" dirty="0">
+                <a:ln>
+                  <a:noFill/>
+                </a:ln>
+                <a:solidFill>
+                  <a:schemeClr val="tx1"/>
+                </a:solidFill>
+                <a:effectLst/>
+                <a:latin typeface="var(--jp-code-font-family)"/>
+              </a:rPr>
+              <a:t>Pearson correlation coefficient: 0.9867722599767363</a:t>
+            </a:r>
+          </a:p>
+          <a:p>
+            <a:r>
+              <a:rPr kumimoji="0" lang="en-US" altLang="en-US" sz="1200" b="0" i="0" u="none" strike="noStrike" cap="none" normalizeH="0" baseline="0" dirty="0">
+                <a:ln>
+                  <a:noFill/>
+                </a:ln>
+                <a:solidFill>
+                  <a:schemeClr val="tx1"/>
+                </a:solidFill>
+                <a:effectLst/>
+                <a:latin typeface="var(--jp-code-font-family)"/>
+              </a:rPr>
+              <a:t>Spearman correlation coefficient: 0.9996474528468182</a:t>
+            </a:r>
+          </a:p>
+          <a:p>
+            <a:endParaRPr lang="en-US" sz="1200" dirty="0"/>
+          </a:p>
+        </p:txBody>
+      </p:sp>
+    </p:spTree>
+    <p:extLst>
+      <p:ext uri="{BB962C8B-B14F-4D97-AF65-F5344CB8AC3E}">
+        <p14:creationId xmlns:p14="http://schemas.microsoft.com/office/powerpoint/2010/main" val="243150552"/>
+      </p:ext>
+    </p:extLst>
+  </p:cSld>
+  <p:clrMapOvr>
+    <a:masterClrMapping/>
+  </p:clrMapOvr>
+</p:sld>
+</file>
+
+<file path=ppt/slides/slide27.xml><?xml version="1.0" encoding="utf-8"?>
 <p:sld xmlns:a="http://schemas.openxmlformats.org/drawingml/2006/main" xmlns:r="http://schemas.openxmlformats.org/officeDocument/2006/relationships" xmlns:p="http://schemas.openxmlformats.org/presentationml/2006/main">
   <p:cSld>
     <p:spTree>
@@ -6486,7 +7958,7 @@
           <p:cNvPr id="2" name="Title 1">
             <a:extLst>
               <a:ext uri="{FF2B5EF4-FFF2-40B4-BE49-F238E27FC236}">
-                <a16:creationId xmlns:a16="http://schemas.microsoft.com/office/drawing/2014/main" id="{330766FE-F8B8-777B-2219-9940145F8FA9}"/>
+                <a16:creationId xmlns:a16="http://schemas.microsoft.com/office/drawing/2014/main" id="{560158CA-AF9D-02D9-3AAE-7B1B2C68BC5B}"/>
               </a:ext>
             </a:extLst>
           </p:cNvPr>
@@ -6499,115 +7971,13 @@
         </p:nvSpPr>
         <p:spPr/>
         <p:txBody>
-          <a:bodyPr>
-            <a:normAutofit fontScale="90000"/>
-          </a:bodyPr>
-          <a:lstStyle/>
-          <a:p>
-            <a:r>
-              <a:rPr lang="en-US" sz="4400" b="0" i="0" dirty="0">
-                <a:solidFill>
-                  <a:srgbClr val="1D1C1D"/>
-                </a:solidFill>
-                <a:effectLst/>
-                <a:latin typeface="Roboto" panose="02000000000000000000" pitchFamily="2" charset="0"/>
-                <a:ea typeface="Roboto" panose="02000000000000000000" pitchFamily="2" charset="0"/>
-                <a:cs typeface="Roboto" panose="02000000000000000000" pitchFamily="2" charset="0"/>
-              </a:rPr>
-              <a:t>What trends can be observed in the relationship between agricultural production and population growth?</a:t>
-            </a:r>
-            <a:br>
-              <a:rPr lang="en-US" sz="4400" b="0" i="0" dirty="0">
-                <a:solidFill>
-                  <a:srgbClr val="1D1C1D"/>
-                </a:solidFill>
-                <a:effectLst/>
-                <a:latin typeface="Roboto" panose="02000000000000000000" pitchFamily="2" charset="0"/>
-                <a:ea typeface="Roboto" panose="02000000000000000000" pitchFamily="2" charset="0"/>
-                <a:cs typeface="Roboto" panose="02000000000000000000" pitchFamily="2" charset="0"/>
-              </a:rPr>
-            </a:br>
-            <a:endParaRPr lang="en-US" dirty="0"/>
-          </a:p>
-        </p:txBody>
-      </p:sp>
-      <p:sp>
-        <p:nvSpPr>
-          <p:cNvPr id="3" name="Content Placeholder 2">
-            <a:extLst>
-              <a:ext uri="{FF2B5EF4-FFF2-40B4-BE49-F238E27FC236}">
-                <a16:creationId xmlns:a16="http://schemas.microsoft.com/office/drawing/2014/main" id="{827A2BFE-FADC-18E7-01C0-305BD9A9B7D8}"/>
-              </a:ext>
-            </a:extLst>
-          </p:cNvPr>
-          <p:cNvSpPr>
-            <a:spLocks noGrp="1"/>
-          </p:cNvSpPr>
-          <p:nvPr>
-            <p:ph idx="1"/>
-          </p:nvPr>
-        </p:nvSpPr>
-        <p:spPr/>
-        <p:txBody>
           <a:bodyPr/>
           <a:lstStyle/>
           <a:p>
-            <a:endParaRPr lang="en-US"/>
-          </a:p>
-        </p:txBody>
-      </p:sp>
-    </p:spTree>
-    <p:extLst>
-      <p:ext uri="{BB962C8B-B14F-4D97-AF65-F5344CB8AC3E}">
-        <p14:creationId xmlns:p14="http://schemas.microsoft.com/office/powerpoint/2010/main" val="243150552"/>
-      </p:ext>
-    </p:extLst>
-  </p:cSld>
-  <p:clrMapOvr>
-    <a:masterClrMapping/>
-  </p:clrMapOvr>
-</p:sld>
-</file>
-
-<file path=ppt/slides/slide25.xml><?xml version="1.0" encoding="utf-8"?>
-<p:sld xmlns:a="http://schemas.openxmlformats.org/drawingml/2006/main" xmlns:r="http://schemas.openxmlformats.org/officeDocument/2006/relationships" xmlns:p="http://schemas.openxmlformats.org/presentationml/2006/main">
-  <p:cSld>
-    <p:spTree>
-      <p:nvGrpSpPr>
-        <p:cNvPr id="1" name=""/>
-        <p:cNvGrpSpPr/>
-        <p:nvPr/>
-      </p:nvGrpSpPr>
-      <p:grpSpPr>
-        <a:xfrm>
-          <a:off x="0" y="0"/>
-          <a:ext cx="0" cy="0"/>
-          <a:chOff x="0" y="0"/>
-          <a:chExt cx="0" cy="0"/>
-        </a:xfrm>
-      </p:grpSpPr>
-      <p:sp>
-        <p:nvSpPr>
-          <p:cNvPr id="2" name="Title 1">
-            <a:extLst>
-              <a:ext uri="{FF2B5EF4-FFF2-40B4-BE49-F238E27FC236}">
-                <a16:creationId xmlns:a16="http://schemas.microsoft.com/office/drawing/2014/main" id="{560158CA-AF9D-02D9-3AAE-7B1B2C68BC5B}"/>
-              </a:ext>
-            </a:extLst>
-          </p:cNvPr>
-          <p:cNvSpPr>
-            <a:spLocks noGrp="1"/>
-          </p:cNvSpPr>
-          <p:nvPr>
-            <p:ph type="title"/>
-          </p:nvPr>
-        </p:nvSpPr>
-        <p:spPr/>
-        <p:txBody>
-          <a:bodyPr/>
-          <a:lstStyle/>
-          <a:p>
-            <a:endParaRPr lang="en-US"/>
+            <a:r>
+              <a:rPr lang="en-US" dirty="0"/>
+              <a:t>World Population vs Total Food Production</a:t>
+            </a:r>
           </a:p>
         </p:txBody>
       </p:sp>
@@ -6675,7 +8045,7 @@
           <p:cNvPr id="2" name="Title 1">
             <a:extLst>
               <a:ext uri="{FF2B5EF4-FFF2-40B4-BE49-F238E27FC236}">
-                <a16:creationId xmlns:a16="http://schemas.microsoft.com/office/drawing/2014/main" id="{765BC33D-204E-1A86-35A3-63FD766BC097}"/>
+                <a16:creationId xmlns:a16="http://schemas.microsoft.com/office/drawing/2014/main" id="{729CFCDA-656E-17F2-BA1D-BF7A93638159}"/>
               </a:ext>
             </a:extLst>
           </p:cNvPr>
@@ -6688,146 +8058,76 @@
         </p:nvSpPr>
         <p:spPr/>
         <p:txBody>
-          <a:bodyPr/>
-          <a:lstStyle/>
-          <a:p>
-            <a:r>
-              <a:rPr lang="en-US" b="1" i="0" dirty="0">
-                <a:effectLst/>
-                <a:latin typeface="Roboto" panose="02000000000000000000" pitchFamily="2" charset="0"/>
-              </a:rPr>
-              <a:t>Analysis and Conclusion</a:t>
-            </a:r>
-            <a:br>
-              <a:rPr lang="en-US" b="1" i="0" dirty="0">
-                <a:effectLst/>
-                <a:latin typeface="Roboto" panose="02000000000000000000" pitchFamily="2" charset="0"/>
-              </a:rPr>
-            </a:br>
-            <a:endParaRPr lang="en-US" dirty="0"/>
-          </a:p>
-        </p:txBody>
-      </p:sp>
-      <p:sp>
-        <p:nvSpPr>
-          <p:cNvPr id="3" name="Content Placeholder 2">
-            <a:extLst>
-              <a:ext uri="{FF2B5EF4-FFF2-40B4-BE49-F238E27FC236}">
-                <a16:creationId xmlns:a16="http://schemas.microsoft.com/office/drawing/2014/main" id="{5D509172-7413-2898-93C1-5177DAA0029C}"/>
-              </a:ext>
-            </a:extLst>
-          </p:cNvPr>
-          <p:cNvSpPr>
-            <a:spLocks noGrp="1"/>
-          </p:cNvSpPr>
-          <p:nvPr>
-            <p:ph idx="1"/>
-          </p:nvPr>
-        </p:nvSpPr>
-        <p:spPr/>
-        <p:txBody>
           <a:bodyPr>
-            <a:normAutofit/>
+            <a:normAutofit fontScale="90000"/>
           </a:bodyPr>
           <a:lstStyle/>
           <a:p>
-            <a:pPr algn="l">
-              <a:buFont typeface="Arial" panose="020B0604020202020204" pitchFamily="34" charset="0"/>
-              <a:buChar char="•"/>
-            </a:pPr>
-            <a:r>
-              <a:rPr lang="en-US" sz="1400" b="0" i="0" dirty="0">
+            <a:r>
+              <a:rPr lang="en-US" sz="4400" b="0" i="0" dirty="0">
                 <a:solidFill>
                   <a:srgbClr val="2B2B2B"/>
                 </a:solidFill>
                 <a:effectLst/>
                 <a:latin typeface="Roboto" panose="02000000000000000000" pitchFamily="2" charset="0"/>
               </a:rPr>
-              <a:t>Findings are strongly supported with numbers and visualizations (10 points).</a:t>
-            </a:r>
-          </a:p>
-          <a:p>
-            <a:pPr algn="l">
-              <a:buFont typeface="Arial" panose="020B0604020202020204" pitchFamily="34" charset="0"/>
-              <a:buChar char="•"/>
-            </a:pPr>
-            <a:r>
-              <a:rPr lang="en-US" sz="1400" b="0" i="0" dirty="0">
+              <a:t>An overview of the data collection, cleanup, and exploration processes (5 points).</a:t>
+            </a:r>
+            <a:br>
+              <a:rPr lang="en-US" sz="4400" b="0" i="0" dirty="0">
                 <a:solidFill>
                   <a:srgbClr val="2B2B2B"/>
                 </a:solidFill>
                 <a:effectLst/>
                 <a:latin typeface="Roboto" panose="02000000000000000000" pitchFamily="2" charset="0"/>
               </a:rPr>
-              <a:t>Write-up summarizes major findings and implications at a professional level (10 points).</a:t>
-            </a:r>
-          </a:p>
-          <a:p>
-            <a:pPr algn="l">
-              <a:buFont typeface="Arial" panose="020B0604020202020204" pitchFamily="34" charset="0"/>
-              <a:buChar char="•"/>
-            </a:pPr>
-            <a:r>
-              <a:rPr lang="en-US" sz="1400" b="0" i="0" dirty="0">
-                <a:solidFill>
-                  <a:srgbClr val="2B2B2B"/>
-                </a:solidFill>
-                <a:effectLst/>
-                <a:latin typeface="Roboto" panose="02000000000000000000" pitchFamily="2" charset="0"/>
-              </a:rPr>
-              <a:t>Each question in the project proposal is answered with precise descriptions and findings (5 points).</a:t>
-            </a:r>
-          </a:p>
-          <a:p>
-            <a:pPr algn="l">
-              <a:buFont typeface="Arial" panose="020B0604020202020204" pitchFamily="34" charset="0"/>
-              <a:buChar char="•"/>
-            </a:pPr>
-            <a:r>
-              <a:rPr lang="en-US" sz="1400" b="0" i="0" dirty="0">
-                <a:solidFill>
-                  <a:srgbClr val="2B2B2B"/>
-                </a:solidFill>
-                <a:effectLst/>
-                <a:latin typeface="Roboto" panose="02000000000000000000" pitchFamily="2" charset="0"/>
-              </a:rPr>
-              <a:t>Each question response is supported with a well-discerned statistical analysis from lessons, such as aggregation, correlation, comparison, summary statistics, sentiment analysis, and time series analysis (5 points).</a:t>
-            </a:r>
-          </a:p>
-          <a:p>
-            <a:pPr algn="l">
-              <a:buFont typeface="Arial" panose="020B0604020202020204" pitchFamily="34" charset="0"/>
-              <a:buChar char="•"/>
-            </a:pPr>
-            <a:endParaRPr lang="en-US" sz="1400" dirty="0">
-              <a:solidFill>
-                <a:srgbClr val="2B2B2B"/>
-              </a:solidFill>
-              <a:latin typeface="Roboto" panose="02000000000000000000" pitchFamily="2" charset="0"/>
-            </a:endParaRPr>
-          </a:p>
-          <a:p>
-            <a:pPr algn="l">
-              <a:buFont typeface="Arial" panose="020B0604020202020204" pitchFamily="34" charset="0"/>
-              <a:buChar char="•"/>
-            </a:pPr>
-            <a:endParaRPr lang="en-US" sz="1400" b="0" i="0" dirty="0">
-              <a:solidFill>
-                <a:srgbClr val="2B2B2B"/>
-              </a:solidFill>
-              <a:effectLst/>
-              <a:latin typeface="Roboto" panose="02000000000000000000" pitchFamily="2" charset="0"/>
-            </a:endParaRPr>
-          </a:p>
-          <a:p>
-            <a:endParaRPr lang="en-US" sz="1400" dirty="0"/>
+            </a:br>
+            <a:endParaRPr lang="en-US" dirty="0"/>
+          </a:p>
+        </p:txBody>
+      </p:sp>
+      <p:sp>
+        <p:nvSpPr>
+          <p:cNvPr id="3" name="Content Placeholder 2">
+            <a:extLst>
+              <a:ext uri="{FF2B5EF4-FFF2-40B4-BE49-F238E27FC236}">
+                <a16:creationId xmlns:a16="http://schemas.microsoft.com/office/drawing/2014/main" id="{3A194D55-8F49-301D-DFF4-5CEDF97D8DBB}"/>
+              </a:ext>
+            </a:extLst>
+          </p:cNvPr>
+          <p:cNvSpPr>
+            <a:spLocks noGrp="1"/>
+          </p:cNvSpPr>
+          <p:nvPr>
+            <p:ph idx="1"/>
+          </p:nvPr>
+        </p:nvSpPr>
+        <p:spPr/>
+        <p:txBody>
+          <a:bodyPr>
+            <a:normAutofit fontScale="92500" lnSpcReduction="10000"/>
+          </a:bodyPr>
+          <a:lstStyle/>
+          <a:p>
+            <a:r>
+              <a:rPr lang="en-US" dirty="0"/>
+              <a:t>After deciding on an area of focus a day was spent searching for available dataset for both Agricultural data and World Population data. After we had access to the datasets, we imported them into our notebook and started viewing the data, we quickly realized we had too much data for the agricultural side and were missing many years on the World Population data, so we retrieved another dataset and merged the second with the first to get population by year that matched the Agricultural data set time frame. We dropped a lot of columns that did not pertain to our analysis and did several restructures. </a:t>
+            </a:r>
+            <a:r>
+              <a:rPr lang="en-US" dirty="0" err="1"/>
+              <a:t>Perfomed</a:t>
+            </a:r>
+            <a:r>
+              <a:rPr lang="en-US" dirty="0"/>
+              <a:t> several merges so we could focus on production by continents as there were too many countries to plot for graphs. We did the same with items by assigning them to categories that we defined. From there we converted the dataset to time series to plot and do statistical analysis.</a:t>
+            </a:r>
           </a:p>
         </p:txBody>
       </p:sp>
     </p:spTree>
     <p:extLst>
       <p:ext uri="{BB962C8B-B14F-4D97-AF65-F5344CB8AC3E}">
-        <p14:creationId xmlns:p14="http://schemas.microsoft.com/office/powerpoint/2010/main" val="3327765573"/>
+        <p14:creationId xmlns:p14="http://schemas.microsoft.com/office/powerpoint/2010/main" val="2077041568"/>
       </p:ext>
     </p:extLst>
   </p:cSld>
@@ -6859,7 +8159,7 @@
           <p:cNvPr id="2" name="Title 1">
             <a:extLst>
               <a:ext uri="{FF2B5EF4-FFF2-40B4-BE49-F238E27FC236}">
-                <a16:creationId xmlns:a16="http://schemas.microsoft.com/office/drawing/2014/main" id="{8CBABE18-E0F5-C4A0-A609-54F2DA70C7D9}"/>
+                <a16:creationId xmlns:a16="http://schemas.microsoft.com/office/drawing/2014/main" id="{FD705E39-A393-C435-2034-D48922C906E7}"/>
               </a:ext>
             </a:extLst>
           </p:cNvPr>
@@ -6872,105 +8172,100 @@
         </p:nvSpPr>
         <p:spPr/>
         <p:txBody>
-          <a:bodyPr/>
-          <a:lstStyle/>
-          <a:p>
-            <a:r>
-              <a:rPr lang="en-US" b="1" i="0" dirty="0">
-                <a:effectLst/>
-                <a:latin typeface="Roboto" panose="02000000000000000000" pitchFamily="2" charset="0"/>
-              </a:rPr>
-              <a:t>Visualizations</a:t>
-            </a:r>
-            <a:br>
-              <a:rPr lang="en-US" b="1" i="0" dirty="0">
-                <a:effectLst/>
-                <a:latin typeface="Roboto" panose="02000000000000000000" pitchFamily="2" charset="0"/>
-              </a:rPr>
-            </a:br>
-            <a:endParaRPr lang="en-US" dirty="0"/>
-          </a:p>
-        </p:txBody>
-      </p:sp>
-      <p:sp>
-        <p:nvSpPr>
-          <p:cNvPr id="3" name="Content Placeholder 2">
-            <a:extLst>
-              <a:ext uri="{FF2B5EF4-FFF2-40B4-BE49-F238E27FC236}">
-                <a16:creationId xmlns:a16="http://schemas.microsoft.com/office/drawing/2014/main" id="{5E095AB0-E778-139C-2D4D-60F4C700501E}"/>
-              </a:ext>
-            </a:extLst>
-          </p:cNvPr>
-          <p:cNvSpPr>
-            <a:spLocks noGrp="1"/>
-          </p:cNvSpPr>
-          <p:nvPr>
-            <p:ph idx="1"/>
-          </p:nvPr>
-        </p:nvSpPr>
-        <p:spPr/>
-        <p:txBody>
           <a:bodyPr>
-            <a:normAutofit/>
+            <a:normAutofit fontScale="90000"/>
           </a:bodyPr>
           <a:lstStyle/>
           <a:p>
-            <a:pPr algn="l">
-              <a:buFont typeface="Arial" panose="020B0604020202020204" pitchFamily="34" charset="0"/>
-              <a:buChar char="•"/>
-            </a:pPr>
-            <a:r>
-              <a:rPr lang="en-US" sz="1400" b="0" i="0" dirty="0">
+            <a:r>
+              <a:rPr lang="en-US" sz="4400" b="0" i="0" dirty="0">
                 <a:solidFill>
                   <a:srgbClr val="2B2B2B"/>
                 </a:solidFill>
                 <a:effectLst/>
                 <a:latin typeface="Roboto" panose="02000000000000000000" pitchFamily="2" charset="0"/>
               </a:rPr>
-              <a:t>6–8 visualizations of data (at least two per question) (10 points).</a:t>
-            </a:r>
-          </a:p>
-          <a:p>
-            <a:pPr algn="l">
-              <a:buFont typeface="Arial" panose="020B0604020202020204" pitchFamily="34" charset="0"/>
-              <a:buChar char="•"/>
-            </a:pPr>
-            <a:r>
-              <a:rPr lang="en-US" sz="1400" b="0" i="0" dirty="0">
+              <a:t>The approach that your group took in achieving the project goals (5 points).</a:t>
+            </a:r>
+            <a:br>
+              <a:rPr lang="en-US" sz="4400" b="0" i="0" dirty="0">
                 <a:solidFill>
                   <a:srgbClr val="2B2B2B"/>
                 </a:solidFill>
                 <a:effectLst/>
                 <a:latin typeface="Roboto" panose="02000000000000000000" pitchFamily="2" charset="0"/>
               </a:rPr>
-              <a:t>Clear and accurate labeling of images (5 points).</a:t>
-            </a:r>
-          </a:p>
-          <a:p>
-            <a:pPr algn="l">
-              <a:buFont typeface="Arial" panose="020B0604020202020204" pitchFamily="34" charset="0"/>
-              <a:buChar char="•"/>
-            </a:pPr>
-            <a:r>
-              <a:rPr lang="en-US" sz="1400" b="0" i="0" dirty="0">
-                <a:solidFill>
-                  <a:srgbClr val="2B2B2B"/>
-                </a:solidFill>
-                <a:effectLst/>
-                <a:latin typeface="Roboto" panose="02000000000000000000" pitchFamily="2" charset="0"/>
-              </a:rPr>
-              <a:t>Visualizations supported with ample and precise explanation (5 points).</a:t>
-            </a:r>
-          </a:p>
-          <a:p>
-            <a:endParaRPr lang="en-US" sz="1400" dirty="0"/>
+            </a:br>
+            <a:endParaRPr lang="en-US" dirty="0"/>
+          </a:p>
+        </p:txBody>
+      </p:sp>
+      <p:sp>
+        <p:nvSpPr>
+          <p:cNvPr id="3" name="Content Placeholder 2">
+            <a:extLst>
+              <a:ext uri="{FF2B5EF4-FFF2-40B4-BE49-F238E27FC236}">
+                <a16:creationId xmlns:a16="http://schemas.microsoft.com/office/drawing/2014/main" id="{A8F6E35D-7CEA-237F-4230-668FE833C23D}"/>
+              </a:ext>
+            </a:extLst>
+          </p:cNvPr>
+          <p:cNvSpPr>
+            <a:spLocks noGrp="1"/>
+          </p:cNvSpPr>
+          <p:nvPr>
+            <p:ph idx="1"/>
+          </p:nvPr>
+        </p:nvSpPr>
+        <p:spPr/>
+        <p:txBody>
+          <a:bodyPr>
+            <a:normAutofit fontScale="92500" lnSpcReduction="20000"/>
+          </a:bodyPr>
+          <a:lstStyle/>
+          <a:p>
+            <a:r>
+              <a:rPr lang="en-US" dirty="0"/>
+              <a:t>Our main goal was to stay on task, be diligent and make progress daily until the </a:t>
+            </a:r>
+            <a:r>
+              <a:rPr lang="en-US"/>
+              <a:t>tasks were </a:t>
+            </a:r>
+            <a:r>
+              <a:rPr lang="en-US" dirty="0"/>
+              <a:t>finished</a:t>
+            </a:r>
+          </a:p>
+          <a:p>
+            <a:r>
+              <a:rPr lang="en-US" dirty="0"/>
+              <a:t>Task were outlined in detail so that we knew what had to be done</a:t>
+            </a:r>
+          </a:p>
+          <a:p>
+            <a:r>
+              <a:rPr lang="en-US" dirty="0"/>
+              <a:t>To answer our questions, we started by preparing the data so that we could do the analysis. Once the datasets were prepared, we started making different graphs based on the questions we had. Some observations aroused our curiosity and led us to do further exploration of the data.</a:t>
+            </a:r>
+          </a:p>
+          <a:p>
+            <a:r>
+              <a:rPr lang="en-US" dirty="0"/>
+              <a:t>The next goal was to work on the readme file which was assembled in short time</a:t>
+            </a:r>
+          </a:p>
+          <a:p>
+            <a:r>
+              <a:rPr lang="en-US" dirty="0"/>
+              <a:t>Lastly, we made an outline of the presentation and added necessary graphs so that would help guide us to complete this portion of the task</a:t>
+            </a:r>
           </a:p>
         </p:txBody>
       </p:sp>
     </p:spTree>
     <p:extLst>
       <p:ext uri="{BB962C8B-B14F-4D97-AF65-F5344CB8AC3E}">
-        <p14:creationId xmlns:p14="http://schemas.microsoft.com/office/powerpoint/2010/main" val="4195663498"/>
+        <p14:creationId xmlns:p14="http://schemas.microsoft.com/office/powerpoint/2010/main" val="3233134659"/>
       </p:ext>
     </p:extLst>
   </p:cSld>
@@ -7002,7 +8297,7 @@
           <p:cNvPr id="2" name="Title 1">
             <a:extLst>
               <a:ext uri="{FF2B5EF4-FFF2-40B4-BE49-F238E27FC236}">
-                <a16:creationId xmlns:a16="http://schemas.microsoft.com/office/drawing/2014/main" id="{518CEDE2-18F2-6196-02B0-E9074A8932D9}"/>
+                <a16:creationId xmlns:a16="http://schemas.microsoft.com/office/drawing/2014/main" id="{765BC33D-204E-1A86-35A3-63FD766BC097}"/>
               </a:ext>
             </a:extLst>
           </p:cNvPr>
@@ -7023,7 +8318,7 @@
                 <a:effectLst/>
                 <a:latin typeface="Roboto" panose="02000000000000000000" pitchFamily="2" charset="0"/>
               </a:rPr>
-              <a:t>Presentation Requirements</a:t>
+              <a:t>Analysis and Conclusion</a:t>
             </a:r>
             <a:br>
               <a:rPr lang="en-US" b="1" i="0" dirty="0">
@@ -7040,7 +8335,7 @@
           <p:cNvPr id="3" name="Content Placeholder 2">
             <a:extLst>
               <a:ext uri="{FF2B5EF4-FFF2-40B4-BE49-F238E27FC236}">
-                <a16:creationId xmlns:a16="http://schemas.microsoft.com/office/drawing/2014/main" id="{6B010F1D-F98F-0145-BA31-DD922551682E}"/>
+                <a16:creationId xmlns:a16="http://schemas.microsoft.com/office/drawing/2014/main" id="{5D509172-7413-2898-93C1-5177DAA0029C}"/>
               </a:ext>
             </a:extLst>
           </p:cNvPr>
@@ -7058,8 +8353,9 @@
           </a:bodyPr>
           <a:lstStyle/>
           <a:p>
-            <a:pPr marL="0" indent="0" algn="l">
-              <a:buNone/>
+            <a:pPr algn="l">
+              <a:buFont typeface="Arial" panose="020B0604020202020204" pitchFamily="34" charset="0"/>
+              <a:buChar char="•"/>
             </a:pPr>
             <a:r>
               <a:rPr lang="en-US" sz="1400" b="0" i="0" dirty="0">
@@ -7069,7 +8365,7 @@
                 <a:effectLst/>
                 <a:latin typeface="Roboto" panose="02000000000000000000" pitchFamily="2" charset="0"/>
               </a:rPr>
-              <a:t>Your presentation should cover the following:</a:t>
+              <a:t>Findings are strongly supported with numbers and visualizations (10 points).</a:t>
             </a:r>
           </a:p>
           <a:p>
@@ -7085,7 +8381,7 @@
                 <a:effectLst/>
                 <a:latin typeface="Roboto" panose="02000000000000000000" pitchFamily="2" charset="0"/>
               </a:rPr>
-              <a:t>An executive summary or overview of the project and project goals (5 points).</a:t>
+              <a:t>Write-up summarizes major findings and implications at a professional level (10 points).</a:t>
             </a:r>
           </a:p>
           <a:p>
@@ -7101,7 +8397,7 @@
                 <a:effectLst/>
                 <a:latin typeface="Roboto" panose="02000000000000000000" pitchFamily="2" charset="0"/>
               </a:rPr>
-              <a:t>An overview of the data collection, cleanup, and exploration processes (5 points).</a:t>
+              <a:t>Each question in the project proposal is answered with precise descriptions and findings (5 points).</a:t>
             </a:r>
           </a:p>
           <a:p>
@@ -7117,7 +8413,7 @@
                 <a:effectLst/>
                 <a:latin typeface="Roboto" panose="02000000000000000000" pitchFamily="2" charset="0"/>
               </a:rPr>
-              <a:t>The approach that your group took in achieving the project goals (5 points).</a:t>
+              <a:t>Each question response is supported with a well-discerned statistical analysis from lessons, such as aggregation, correlation, comparison, summary statistics, sentiment analysis, and time series analysis (5 points).</a:t>
             </a:r>
           </a:p>
           <a:p>
@@ -7125,71 +8421,35 @@
               <a:buFont typeface="Arial" panose="020B0604020202020204" pitchFamily="34" charset="0"/>
               <a:buChar char="•"/>
             </a:pPr>
-            <a:r>
-              <a:rPr lang="en-US" sz="1400" b="0" i="0" dirty="0">
-                <a:solidFill>
-                  <a:srgbClr val="2B2B2B"/>
-                </a:solidFill>
-                <a:effectLst/>
-                <a:latin typeface="Roboto" panose="02000000000000000000" pitchFamily="2" charset="0"/>
-              </a:rPr>
-              <a:t>Any additional questions that surfaced, what your group might research next if more time was available or share a plan for future development (5 points).</a:t>
-            </a:r>
+            <a:endParaRPr lang="en-US" sz="1400" dirty="0">
+              <a:solidFill>
+                <a:srgbClr val="2B2B2B"/>
+              </a:solidFill>
+              <a:latin typeface="Roboto" panose="02000000000000000000" pitchFamily="2" charset="0"/>
+            </a:endParaRPr>
           </a:p>
           <a:p>
             <a:pPr algn="l">
               <a:buFont typeface="Arial" panose="020B0604020202020204" pitchFamily="34" charset="0"/>
               <a:buChar char="•"/>
             </a:pPr>
-            <a:r>
-              <a:rPr lang="en-US" sz="1400" b="0" i="0" dirty="0">
-                <a:solidFill>
-                  <a:srgbClr val="2B2B2B"/>
-                </a:solidFill>
-                <a:effectLst/>
-                <a:latin typeface="Roboto" panose="02000000000000000000" pitchFamily="2" charset="0"/>
-              </a:rPr>
-              <a:t>The results and conclusions of the application or analysis (5 points).</a:t>
-            </a:r>
-          </a:p>
-          <a:p>
-            <a:pPr algn="l">
-              <a:buFont typeface="Arial" panose="020B0604020202020204" pitchFamily="34" charset="0"/>
-              <a:buChar char="•"/>
-            </a:pPr>
-            <a:r>
-              <a:rPr lang="en-US" sz="1400" b="0" i="0" dirty="0">
-                <a:solidFill>
-                  <a:srgbClr val="2B2B2B"/>
-                </a:solidFill>
-                <a:effectLst/>
-                <a:latin typeface="Roboto" panose="02000000000000000000" pitchFamily="2" charset="0"/>
-              </a:rPr>
-              <a:t>Slides effectively demonstrate the project (3 points).</a:t>
-            </a:r>
-          </a:p>
-          <a:p>
-            <a:pPr algn="l">
-              <a:buFont typeface="Arial" panose="020B0604020202020204" pitchFamily="34" charset="0"/>
-              <a:buChar char="•"/>
-            </a:pPr>
-            <a:r>
-              <a:rPr lang="en-US" sz="1400" b="0" i="0" dirty="0">
-                <a:solidFill>
-                  <a:srgbClr val="2B2B2B"/>
-                </a:solidFill>
-                <a:effectLst/>
-                <a:latin typeface="Roboto" panose="02000000000000000000" pitchFamily="2" charset="0"/>
-              </a:rPr>
-              <a:t>Slides are visually clean and professional (2 points).</a:t>
-            </a:r>
+            <a:endParaRPr lang="en-US" sz="1400" b="0" i="0" dirty="0">
+              <a:solidFill>
+                <a:srgbClr val="2B2B2B"/>
+              </a:solidFill>
+              <a:effectLst/>
+              <a:latin typeface="Roboto" panose="02000000000000000000" pitchFamily="2" charset="0"/>
+            </a:endParaRPr>
+          </a:p>
+          <a:p>
+            <a:endParaRPr lang="en-US" sz="1400" dirty="0"/>
           </a:p>
         </p:txBody>
       </p:sp>
     </p:spTree>
     <p:extLst>
       <p:ext uri="{BB962C8B-B14F-4D97-AF65-F5344CB8AC3E}">
-        <p14:creationId xmlns:p14="http://schemas.microsoft.com/office/powerpoint/2010/main" val="793010627"/>
+        <p14:creationId xmlns:p14="http://schemas.microsoft.com/office/powerpoint/2010/main" val="3327765573"/>
       </p:ext>
     </p:extLst>
   </p:cSld>
@@ -7221,7 +8481,7 @@
           <p:cNvPr id="2" name="Title 1">
             <a:extLst>
               <a:ext uri="{FF2B5EF4-FFF2-40B4-BE49-F238E27FC236}">
-                <a16:creationId xmlns:a16="http://schemas.microsoft.com/office/drawing/2014/main" id="{91F8720F-A42E-DD9F-7531-23208260DB65}"/>
+                <a16:creationId xmlns:a16="http://schemas.microsoft.com/office/drawing/2014/main" id="{8CBABE18-E0F5-C4A0-A609-54F2DA70C7D9}"/>
               </a:ext>
             </a:extLst>
           </p:cNvPr>
@@ -7234,67 +8494,105 @@
         </p:nvSpPr>
         <p:spPr/>
         <p:txBody>
+          <a:bodyPr/>
+          <a:lstStyle/>
+          <a:p>
+            <a:r>
+              <a:rPr lang="en-US" b="1" i="0" dirty="0">
+                <a:effectLst/>
+                <a:latin typeface="Roboto" panose="02000000000000000000" pitchFamily="2" charset="0"/>
+              </a:rPr>
+              <a:t>Visualizations</a:t>
+            </a:r>
+            <a:br>
+              <a:rPr lang="en-US" b="1" i="0" dirty="0">
+                <a:effectLst/>
+                <a:latin typeface="Roboto" panose="02000000000000000000" pitchFamily="2" charset="0"/>
+              </a:rPr>
+            </a:br>
+            <a:endParaRPr lang="en-US" dirty="0"/>
+          </a:p>
+        </p:txBody>
+      </p:sp>
+      <p:sp>
+        <p:nvSpPr>
+          <p:cNvPr id="3" name="Content Placeholder 2">
+            <a:extLst>
+              <a:ext uri="{FF2B5EF4-FFF2-40B4-BE49-F238E27FC236}">
+                <a16:creationId xmlns:a16="http://schemas.microsoft.com/office/drawing/2014/main" id="{5E095AB0-E778-139C-2D4D-60F4C700501E}"/>
+              </a:ext>
+            </a:extLst>
+          </p:cNvPr>
+          <p:cNvSpPr>
+            <a:spLocks noGrp="1"/>
+          </p:cNvSpPr>
+          <p:nvPr>
+            <p:ph idx="1"/>
+          </p:nvPr>
+        </p:nvSpPr>
+        <p:spPr/>
+        <p:txBody>
           <a:bodyPr>
-            <a:normAutofit fontScale="90000"/>
+            <a:normAutofit/>
           </a:bodyPr>
           <a:lstStyle/>
           <a:p>
-            <a:r>
-              <a:rPr lang="en-US" sz="4400" b="0" i="0" dirty="0">
+            <a:pPr algn="l">
+              <a:buFont typeface="Arial" panose="020B0604020202020204" pitchFamily="34" charset="0"/>
+              <a:buChar char="•"/>
+            </a:pPr>
+            <a:r>
+              <a:rPr lang="en-US" sz="1400" b="0" i="0" dirty="0">
                 <a:solidFill>
-                  <a:srgbClr val="1D1C1D"/>
+                  <a:srgbClr val="2B2B2B"/>
                 </a:solidFill>
                 <a:effectLst/>
                 <a:latin typeface="Roboto" panose="02000000000000000000" pitchFamily="2" charset="0"/>
-                <a:ea typeface="Roboto" panose="02000000000000000000" pitchFamily="2" charset="0"/>
-                <a:cs typeface="Roboto" panose="02000000000000000000" pitchFamily="2" charset="0"/>
               </a:rPr>
-              <a:t>How has the production of major agricultural products (e.g., meat, vegetables, grains) evolved over time?</a:t>
-            </a:r>
-            <a:br>
-              <a:rPr lang="en-US" sz="4400" b="0" i="0" dirty="0">
+              <a:t>6–8 visualizations of data (at least two per question) (10 points).</a:t>
+            </a:r>
+          </a:p>
+          <a:p>
+            <a:pPr algn="l">
+              <a:buFont typeface="Arial" panose="020B0604020202020204" pitchFamily="34" charset="0"/>
+              <a:buChar char="•"/>
+            </a:pPr>
+            <a:r>
+              <a:rPr lang="en-US" sz="1400" b="0" i="0" dirty="0">
                 <a:solidFill>
-                  <a:srgbClr val="1D1C1D"/>
+                  <a:srgbClr val="2B2B2B"/>
                 </a:solidFill>
                 <a:effectLst/>
                 <a:latin typeface="Roboto" panose="02000000000000000000" pitchFamily="2" charset="0"/>
-                <a:ea typeface="Roboto" panose="02000000000000000000" pitchFamily="2" charset="0"/>
-                <a:cs typeface="Roboto" panose="02000000000000000000" pitchFamily="2" charset="0"/>
               </a:rPr>
-            </a:br>
-            <a:endParaRPr lang="en-US" dirty="0"/>
-          </a:p>
-        </p:txBody>
-      </p:sp>
-      <p:sp>
-        <p:nvSpPr>
-          <p:cNvPr id="7" name="Content Placeholder 6">
-            <a:extLst>
-              <a:ext uri="{FF2B5EF4-FFF2-40B4-BE49-F238E27FC236}">
-                <a16:creationId xmlns:a16="http://schemas.microsoft.com/office/drawing/2014/main" id="{FF837CD6-1E96-72BF-BA91-85872A959457}"/>
-              </a:ext>
-            </a:extLst>
-          </p:cNvPr>
-          <p:cNvSpPr>
-            <a:spLocks noGrp="1"/>
-          </p:cNvSpPr>
-          <p:nvPr>
-            <p:ph idx="1"/>
-          </p:nvPr>
-        </p:nvSpPr>
-        <p:spPr/>
-        <p:txBody>
-          <a:bodyPr/>
-          <a:lstStyle/>
-          <a:p>
-            <a:endParaRPr lang="en-US"/>
+              <a:t>Clear and accurate labeling of images (5 points).</a:t>
+            </a:r>
+          </a:p>
+          <a:p>
+            <a:pPr algn="l">
+              <a:buFont typeface="Arial" panose="020B0604020202020204" pitchFamily="34" charset="0"/>
+              <a:buChar char="•"/>
+            </a:pPr>
+            <a:r>
+              <a:rPr lang="en-US" sz="1400" b="0" i="0" dirty="0">
+                <a:solidFill>
+                  <a:srgbClr val="2B2B2B"/>
+                </a:solidFill>
+                <a:effectLst/>
+                <a:latin typeface="Roboto" panose="02000000000000000000" pitchFamily="2" charset="0"/>
+              </a:rPr>
+              <a:t>Visualizations supported with ample and precise explanation (5 points).</a:t>
+            </a:r>
+          </a:p>
+          <a:p>
+            <a:endParaRPr lang="en-US" sz="1400" dirty="0"/>
           </a:p>
         </p:txBody>
       </p:sp>
     </p:spTree>
     <p:extLst>
       <p:ext uri="{BB962C8B-B14F-4D97-AF65-F5344CB8AC3E}">
-        <p14:creationId xmlns:p14="http://schemas.microsoft.com/office/powerpoint/2010/main" val="51798875"/>
+        <p14:creationId xmlns:p14="http://schemas.microsoft.com/office/powerpoint/2010/main" val="4195663498"/>
       </p:ext>
     </p:extLst>
   </p:cSld>
@@ -7326,7 +8624,7 @@
           <p:cNvPr id="2" name="Title 1">
             <a:extLst>
               <a:ext uri="{FF2B5EF4-FFF2-40B4-BE49-F238E27FC236}">
-                <a16:creationId xmlns:a16="http://schemas.microsoft.com/office/drawing/2014/main" id="{7D872286-6229-CCEC-D7EB-E6397D805D86}"/>
+                <a16:creationId xmlns:a16="http://schemas.microsoft.com/office/drawing/2014/main" id="{518CEDE2-18F2-6196-02B0-E9074A8932D9}"/>
               </a:ext>
             </a:extLst>
           </p:cNvPr>
@@ -7342,43 +8640,187 @@
           <a:bodyPr/>
           <a:lstStyle/>
           <a:p>
-            <a:endParaRPr lang="en-US"/>
-          </a:p>
-        </p:txBody>
-      </p:sp>
-      <p:pic>
-        <p:nvPicPr>
-          <p:cNvPr id="4" name="Content Placeholder 4">
-            <a:extLst>
-              <a:ext uri="{FF2B5EF4-FFF2-40B4-BE49-F238E27FC236}">
-                <a16:creationId xmlns:a16="http://schemas.microsoft.com/office/drawing/2014/main" id="{059F4A58-5BA2-C662-A794-DCC180F59EC3}"/>
-              </a:ext>
-            </a:extLst>
-          </p:cNvPr>
-          <p:cNvPicPr>
-            <a:picLocks noGrp="1" noChangeAspect="1"/>
-          </p:cNvPicPr>
+            <a:r>
+              <a:rPr lang="en-US" b="1" i="0" dirty="0">
+                <a:effectLst/>
+                <a:latin typeface="Roboto" panose="02000000000000000000" pitchFamily="2" charset="0"/>
+              </a:rPr>
+              <a:t>Presentation Requirements</a:t>
+            </a:r>
+            <a:br>
+              <a:rPr lang="en-US" b="1" i="0" dirty="0">
+                <a:effectLst/>
+                <a:latin typeface="Roboto" panose="02000000000000000000" pitchFamily="2" charset="0"/>
+              </a:rPr>
+            </a:br>
+            <a:endParaRPr lang="en-US" dirty="0"/>
+          </a:p>
+        </p:txBody>
+      </p:sp>
+      <p:sp>
+        <p:nvSpPr>
+          <p:cNvPr id="3" name="Content Placeholder 2">
+            <a:extLst>
+              <a:ext uri="{FF2B5EF4-FFF2-40B4-BE49-F238E27FC236}">
+                <a16:creationId xmlns:a16="http://schemas.microsoft.com/office/drawing/2014/main" id="{6B010F1D-F98F-0145-BA31-DD922551682E}"/>
+              </a:ext>
+            </a:extLst>
+          </p:cNvPr>
+          <p:cNvSpPr>
+            <a:spLocks noGrp="1"/>
+          </p:cNvSpPr>
           <p:nvPr>
             <p:ph idx="1"/>
           </p:nvPr>
-        </p:nvPicPr>
-        <p:blipFill>
-          <a:blip r:embed="rId2"/>
-          <a:stretch>
-            <a:fillRect/>
-          </a:stretch>
-        </p:blipFill>
-        <p:spPr>
-          <a:xfrm>
-            <a:off x="2417571" y="1825625"/>
-            <a:ext cx="7356857" cy="4351338"/>
-          </a:xfrm>
-        </p:spPr>
-      </p:pic>
+        </p:nvSpPr>
+        <p:spPr/>
+        <p:txBody>
+          <a:bodyPr>
+            <a:normAutofit/>
+          </a:bodyPr>
+          <a:lstStyle/>
+          <a:p>
+            <a:pPr marL="0" indent="0" algn="l">
+              <a:buNone/>
+            </a:pPr>
+            <a:r>
+              <a:rPr lang="en-US" sz="1400" b="0" i="0" dirty="0">
+                <a:solidFill>
+                  <a:srgbClr val="2B2B2B"/>
+                </a:solidFill>
+                <a:effectLst/>
+                <a:latin typeface="Roboto" panose="02000000000000000000" pitchFamily="2" charset="0"/>
+              </a:rPr>
+              <a:t>Your presentation should cover the following:</a:t>
+            </a:r>
+          </a:p>
+          <a:p>
+            <a:pPr algn="l">
+              <a:buFont typeface="Arial" panose="020B0604020202020204" pitchFamily="34" charset="0"/>
+              <a:buChar char="•"/>
+            </a:pPr>
+            <a:r>
+              <a:rPr lang="en-US" sz="1400" b="0" i="0" dirty="0">
+                <a:solidFill>
+                  <a:srgbClr val="2B2B2B"/>
+                </a:solidFill>
+                <a:effectLst/>
+                <a:highlight>
+                  <a:srgbClr val="FFFF00"/>
+                </a:highlight>
+                <a:latin typeface="Roboto" panose="02000000000000000000" pitchFamily="2" charset="0"/>
+              </a:rPr>
+              <a:t>An executive summary or overview of the project and project goals (5 points).</a:t>
+            </a:r>
+          </a:p>
+          <a:p>
+            <a:pPr algn="l">
+              <a:buFont typeface="Arial" panose="020B0604020202020204" pitchFamily="34" charset="0"/>
+              <a:buChar char="•"/>
+            </a:pPr>
+            <a:r>
+              <a:rPr lang="en-US" sz="1400" b="0" i="0" dirty="0">
+                <a:solidFill>
+                  <a:srgbClr val="2B2B2B"/>
+                </a:solidFill>
+                <a:effectLst/>
+                <a:highlight>
+                  <a:srgbClr val="FFFF00"/>
+                </a:highlight>
+                <a:latin typeface="Roboto" panose="02000000000000000000" pitchFamily="2" charset="0"/>
+              </a:rPr>
+              <a:t>An overview of the data collection, cleanup, and exploration processes (5 points).</a:t>
+            </a:r>
+          </a:p>
+          <a:p>
+            <a:pPr algn="l">
+              <a:buFont typeface="Arial" panose="020B0604020202020204" pitchFamily="34" charset="0"/>
+              <a:buChar char="•"/>
+            </a:pPr>
+            <a:r>
+              <a:rPr lang="en-US" sz="1400" b="0" i="0" dirty="0">
+                <a:solidFill>
+                  <a:srgbClr val="2B2B2B"/>
+                </a:solidFill>
+                <a:effectLst/>
+                <a:highlight>
+                  <a:srgbClr val="FFFF00"/>
+                </a:highlight>
+                <a:latin typeface="Roboto" panose="02000000000000000000" pitchFamily="2" charset="0"/>
+              </a:rPr>
+              <a:t>The approach that your group took in achieving the project goals (5 points).</a:t>
+            </a:r>
+          </a:p>
+          <a:p>
+            <a:pPr algn="l">
+              <a:buFont typeface="Arial" panose="020B0604020202020204" pitchFamily="34" charset="0"/>
+              <a:buChar char="•"/>
+            </a:pPr>
+            <a:r>
+              <a:rPr lang="en-US" sz="1400" b="0" i="0" dirty="0">
+                <a:solidFill>
+                  <a:srgbClr val="2B2B2B"/>
+                </a:solidFill>
+                <a:effectLst/>
+                <a:latin typeface="Roboto" panose="02000000000000000000" pitchFamily="2" charset="0"/>
+              </a:rPr>
+              <a:t>Any additional questions that surfaced, what your group might research next if more time was available or share a plan for future development (5 points).</a:t>
+            </a:r>
+          </a:p>
+          <a:p>
+            <a:pPr algn="l">
+              <a:buFont typeface="Arial" panose="020B0604020202020204" pitchFamily="34" charset="0"/>
+              <a:buChar char="•"/>
+            </a:pPr>
+            <a:r>
+              <a:rPr lang="en-US" sz="1400" b="0" i="0" dirty="0">
+                <a:solidFill>
+                  <a:srgbClr val="2B2B2B"/>
+                </a:solidFill>
+                <a:effectLst/>
+                <a:latin typeface="Roboto" panose="02000000000000000000" pitchFamily="2" charset="0"/>
+              </a:rPr>
+              <a:t>The results and conclusions of the application or analysis (5 points).</a:t>
+            </a:r>
+          </a:p>
+          <a:p>
+            <a:pPr algn="l">
+              <a:buFont typeface="Arial" panose="020B0604020202020204" pitchFamily="34" charset="0"/>
+              <a:buChar char="•"/>
+            </a:pPr>
+            <a:r>
+              <a:rPr lang="en-US" sz="1400" b="0" i="0" dirty="0">
+                <a:solidFill>
+                  <a:srgbClr val="2B2B2B"/>
+                </a:solidFill>
+                <a:effectLst/>
+                <a:latin typeface="Roboto" panose="02000000000000000000" pitchFamily="2" charset="0"/>
+              </a:rPr>
+              <a:t>Slides effectively demonstrate the project (3 points).</a:t>
+            </a:r>
+          </a:p>
+          <a:p>
+            <a:pPr algn="l">
+              <a:buFont typeface="Arial" panose="020B0604020202020204" pitchFamily="34" charset="0"/>
+              <a:buChar char="•"/>
+            </a:pPr>
+            <a:r>
+              <a:rPr lang="en-US" sz="1400" b="0" i="0" dirty="0">
+                <a:solidFill>
+                  <a:srgbClr val="2B2B2B"/>
+                </a:solidFill>
+                <a:effectLst/>
+                <a:latin typeface="Roboto" panose="02000000000000000000" pitchFamily="2" charset="0"/>
+              </a:rPr>
+              <a:t>Slides are visually clean and professional (2 points).</a:t>
+            </a:r>
+          </a:p>
+        </p:txBody>
+      </p:sp>
     </p:spTree>
     <p:extLst>
       <p:ext uri="{BB962C8B-B14F-4D97-AF65-F5344CB8AC3E}">
-        <p14:creationId xmlns:p14="http://schemas.microsoft.com/office/powerpoint/2010/main" val="180679254"/>
+        <p14:creationId xmlns:p14="http://schemas.microsoft.com/office/powerpoint/2010/main" val="793010627"/>
       </p:ext>
     </p:extLst>
   </p:cSld>
@@ -7410,7 +8852,7 @@
           <p:cNvPr id="2" name="Title 1">
             <a:extLst>
               <a:ext uri="{FF2B5EF4-FFF2-40B4-BE49-F238E27FC236}">
-                <a16:creationId xmlns:a16="http://schemas.microsoft.com/office/drawing/2014/main" id="{A7CD5B46-7A47-B00C-F0D6-4A92111125D1}"/>
+                <a16:creationId xmlns:a16="http://schemas.microsoft.com/office/drawing/2014/main" id="{91F8720F-A42E-DD9F-7531-23208260DB65}"/>
               </a:ext>
             </a:extLst>
           </p:cNvPr>
@@ -7423,6 +8865,56 @@
         </p:nvSpPr>
         <p:spPr/>
         <p:txBody>
+          <a:bodyPr>
+            <a:normAutofit fontScale="90000"/>
+          </a:bodyPr>
+          <a:lstStyle/>
+          <a:p>
+            <a:r>
+              <a:rPr lang="en-US" sz="4400" b="0" i="0" dirty="0">
+                <a:solidFill>
+                  <a:srgbClr val="1D1C1D"/>
+                </a:solidFill>
+                <a:effectLst/>
+                <a:latin typeface="Roboto" panose="02000000000000000000" pitchFamily="2" charset="0"/>
+                <a:ea typeface="Roboto" panose="02000000000000000000" pitchFamily="2" charset="0"/>
+                <a:cs typeface="Roboto" panose="02000000000000000000" pitchFamily="2" charset="0"/>
+              </a:rPr>
+              <a:t>How has the production of major agricultural products (e.g., meat, vegetables, grains) evolved over time?</a:t>
+            </a:r>
+            <a:br>
+              <a:rPr lang="en-US" sz="4400" b="0" i="0" dirty="0">
+                <a:solidFill>
+                  <a:srgbClr val="1D1C1D"/>
+                </a:solidFill>
+                <a:effectLst/>
+                <a:latin typeface="Roboto" panose="02000000000000000000" pitchFamily="2" charset="0"/>
+                <a:ea typeface="Roboto" panose="02000000000000000000" pitchFamily="2" charset="0"/>
+                <a:cs typeface="Roboto" panose="02000000000000000000" pitchFamily="2" charset="0"/>
+              </a:rPr>
+            </a:br>
+            <a:endParaRPr lang="en-US" dirty="0"/>
+          </a:p>
+        </p:txBody>
+      </p:sp>
+      <p:sp>
+        <p:nvSpPr>
+          <p:cNvPr id="7" name="Content Placeholder 6">
+            <a:extLst>
+              <a:ext uri="{FF2B5EF4-FFF2-40B4-BE49-F238E27FC236}">
+                <a16:creationId xmlns:a16="http://schemas.microsoft.com/office/drawing/2014/main" id="{FF837CD6-1E96-72BF-BA91-85872A959457}"/>
+              </a:ext>
+            </a:extLst>
+          </p:cNvPr>
+          <p:cNvSpPr>
+            <a:spLocks noGrp="1"/>
+          </p:cNvSpPr>
+          <p:nvPr>
+            <p:ph idx="1"/>
+          </p:nvPr>
+        </p:nvSpPr>
+        <p:spPr/>
+        <p:txBody>
           <a:bodyPr/>
           <a:lstStyle/>
           <a:p>
@@ -7430,39 +8922,10 @@
           </a:p>
         </p:txBody>
       </p:sp>
-      <p:pic>
-        <p:nvPicPr>
-          <p:cNvPr id="5" name="Content Placeholder 4">
-            <a:extLst>
-              <a:ext uri="{FF2B5EF4-FFF2-40B4-BE49-F238E27FC236}">
-                <a16:creationId xmlns:a16="http://schemas.microsoft.com/office/drawing/2014/main" id="{614F5800-CD03-5016-1B47-99594F19D684}"/>
-              </a:ext>
-            </a:extLst>
-          </p:cNvPr>
-          <p:cNvPicPr>
-            <a:picLocks noGrp="1" noChangeAspect="1"/>
-          </p:cNvPicPr>
-          <p:nvPr>
-            <p:ph idx="1"/>
-          </p:nvPr>
-        </p:nvPicPr>
-        <p:blipFill>
-          <a:blip r:embed="rId2"/>
-          <a:stretch>
-            <a:fillRect/>
-          </a:stretch>
-        </p:blipFill>
-        <p:spPr>
-          <a:xfrm>
-            <a:off x="2360584" y="1825625"/>
-            <a:ext cx="7470831" cy="4351338"/>
-          </a:xfrm>
-        </p:spPr>
-      </p:pic>
     </p:spTree>
     <p:extLst>
       <p:ext uri="{BB962C8B-B14F-4D97-AF65-F5344CB8AC3E}">
-        <p14:creationId xmlns:p14="http://schemas.microsoft.com/office/powerpoint/2010/main" val="3043303598"/>
+        <p14:creationId xmlns:p14="http://schemas.microsoft.com/office/powerpoint/2010/main" val="51798875"/>
       </p:ext>
     </p:extLst>
   </p:cSld>
@@ -7494,7 +8957,7 @@
           <p:cNvPr id="2" name="Title 1">
             <a:extLst>
               <a:ext uri="{FF2B5EF4-FFF2-40B4-BE49-F238E27FC236}">
-                <a16:creationId xmlns:a16="http://schemas.microsoft.com/office/drawing/2014/main" id="{539EAE2D-6F05-29FC-24CF-F2FDCCA541CB}"/>
+                <a16:creationId xmlns:a16="http://schemas.microsoft.com/office/drawing/2014/main" id="{7D872286-6229-CCEC-D7EB-E6397D805D86}"/>
               </a:ext>
             </a:extLst>
           </p:cNvPr>
@@ -7507,67 +8970,46 @@
         </p:nvSpPr>
         <p:spPr/>
         <p:txBody>
-          <a:bodyPr>
-            <a:normAutofit fontScale="90000"/>
-          </a:bodyPr>
-          <a:lstStyle/>
-          <a:p>
-            <a:r>
-              <a:rPr lang="en-US" sz="4400" b="0" i="0" dirty="0">
-                <a:solidFill>
-                  <a:srgbClr val="1D1C1D"/>
-                </a:solidFill>
-                <a:effectLst/>
-                <a:latin typeface="Roboto" panose="02000000000000000000" pitchFamily="2" charset="0"/>
-                <a:ea typeface="Roboto" panose="02000000000000000000" pitchFamily="2" charset="0"/>
-                <a:cs typeface="Roboto" panose="02000000000000000000" pitchFamily="2" charset="0"/>
-              </a:rPr>
-              <a:t>How does agricultural production vary across different countries and continents?</a:t>
-            </a:r>
-            <a:br>
-              <a:rPr lang="en-US" sz="4400" b="0" i="0" dirty="0">
-                <a:solidFill>
-                  <a:srgbClr val="1D1C1D"/>
-                </a:solidFill>
-                <a:effectLst/>
-                <a:latin typeface="Roboto" panose="02000000000000000000" pitchFamily="2" charset="0"/>
-                <a:ea typeface="Roboto" panose="02000000000000000000" pitchFamily="2" charset="0"/>
-                <a:cs typeface="Roboto" panose="02000000000000000000" pitchFamily="2" charset="0"/>
-              </a:rPr>
-            </a:br>
-            <a:endParaRPr lang="en-US" dirty="0"/>
-          </a:p>
-        </p:txBody>
-      </p:sp>
-      <p:sp>
-        <p:nvSpPr>
-          <p:cNvPr id="3" name="Content Placeholder 2">
-            <a:extLst>
-              <a:ext uri="{FF2B5EF4-FFF2-40B4-BE49-F238E27FC236}">
-                <a16:creationId xmlns:a16="http://schemas.microsoft.com/office/drawing/2014/main" id="{D6F543D4-D6C9-E508-8342-FD2252C206E0}"/>
-              </a:ext>
-            </a:extLst>
-          </p:cNvPr>
-          <p:cNvSpPr>
-            <a:spLocks noGrp="1"/>
-          </p:cNvSpPr>
+          <a:bodyPr/>
+          <a:lstStyle/>
+          <a:p>
+            <a:endParaRPr lang="en-US"/>
+          </a:p>
+        </p:txBody>
+      </p:sp>
+      <p:pic>
+        <p:nvPicPr>
+          <p:cNvPr id="4" name="Content Placeholder 4">
+            <a:extLst>
+              <a:ext uri="{FF2B5EF4-FFF2-40B4-BE49-F238E27FC236}">
+                <a16:creationId xmlns:a16="http://schemas.microsoft.com/office/drawing/2014/main" id="{059F4A58-5BA2-C662-A794-DCC180F59EC3}"/>
+              </a:ext>
+            </a:extLst>
+          </p:cNvPr>
+          <p:cNvPicPr>
+            <a:picLocks noGrp="1" noChangeAspect="1"/>
+          </p:cNvPicPr>
           <p:nvPr>
             <p:ph idx="1"/>
           </p:nvPr>
-        </p:nvSpPr>
-        <p:spPr/>
-        <p:txBody>
-          <a:bodyPr/>
-          <a:lstStyle/>
-          <a:p>
-            <a:endParaRPr lang="en-US"/>
-          </a:p>
-        </p:txBody>
-      </p:sp>
+        </p:nvPicPr>
+        <p:blipFill>
+          <a:blip r:embed="rId2"/>
+          <a:stretch>
+            <a:fillRect/>
+          </a:stretch>
+        </p:blipFill>
+        <p:spPr>
+          <a:xfrm>
+            <a:off x="2417571" y="1825625"/>
+            <a:ext cx="7356857" cy="4351338"/>
+          </a:xfrm>
+        </p:spPr>
+      </p:pic>
     </p:spTree>
     <p:extLst>
       <p:ext uri="{BB962C8B-B14F-4D97-AF65-F5344CB8AC3E}">
-        <p14:creationId xmlns:p14="http://schemas.microsoft.com/office/powerpoint/2010/main" val="2083879834"/>
+        <p14:creationId xmlns:p14="http://schemas.microsoft.com/office/powerpoint/2010/main" val="180679254"/>
       </p:ext>
     </p:extLst>
   </p:cSld>
@@ -7890,4 +9332,319 @@
     </a:ext>
   </a:extLst>
 </a:theme>
+</file>
+
+<file path=ppt/theme/theme2.xml><?xml version="1.0" encoding="utf-8"?>
+<a:theme xmlns:a="http://schemas.openxmlformats.org/drawingml/2006/main" name="Office Theme">
+  <a:themeElements>
+    <a:clrScheme name="Office">
+      <a:dk1>
+        <a:sysClr val="windowText" lastClr="000000"/>
+      </a:dk1>
+      <a:lt1>
+        <a:sysClr val="window" lastClr="FFFFFF"/>
+      </a:lt1>
+      <a:dk2>
+        <a:srgbClr val="0E2841"/>
+      </a:dk2>
+      <a:lt2>
+        <a:srgbClr val="E8E8E8"/>
+      </a:lt2>
+      <a:accent1>
+        <a:srgbClr val="156082"/>
+      </a:accent1>
+      <a:accent2>
+        <a:srgbClr val="E97132"/>
+      </a:accent2>
+      <a:accent3>
+        <a:srgbClr val="196B24"/>
+      </a:accent3>
+      <a:accent4>
+        <a:srgbClr val="0F9ED5"/>
+      </a:accent4>
+      <a:accent5>
+        <a:srgbClr val="A02B93"/>
+      </a:accent5>
+      <a:accent6>
+        <a:srgbClr val="4EA72E"/>
+      </a:accent6>
+      <a:hlink>
+        <a:srgbClr val="467886"/>
+      </a:hlink>
+      <a:folHlink>
+        <a:srgbClr val="96607D"/>
+      </a:folHlink>
+    </a:clrScheme>
+    <a:fontScheme name="Office">
+      <a:majorFont>
+        <a:latin typeface="Aptos Display" panose="02110004020202020204"/>
+        <a:ea typeface=""/>
+        <a:cs typeface=""/>
+        <a:font script="Jpan" typeface="游ゴシック Light"/>
+        <a:font script="Hang" typeface="맑은 고딕"/>
+        <a:font script="Hans" typeface="等线 Light"/>
+        <a:font script="Hant" typeface="新細明體"/>
+        <a:font script="Arab" typeface="Times New Roman"/>
+        <a:font script="Hebr" typeface="Times New Roman"/>
+        <a:font script="Thai" typeface="Angsana New"/>
+        <a:font script="Ethi" typeface="Nyala"/>
+        <a:font script="Beng" typeface="Vrinda"/>
+        <a:font script="Gujr" typeface="Shruti"/>
+        <a:font script="Khmr" typeface="MoolBoran"/>
+        <a:font script="Knda" typeface="Tunga"/>
+        <a:font script="Guru" typeface="Raavi"/>
+        <a:font script="Cans" typeface="Euphemia"/>
+        <a:font script="Cher" typeface="Plantagenet Cherokee"/>
+        <a:font script="Yiii" typeface="Microsoft Yi Baiti"/>
+        <a:font script="Tibt" typeface="Microsoft Himalaya"/>
+        <a:font script="Thaa" typeface="MV Boli"/>
+        <a:font script="Deva" typeface="Mangal"/>
+        <a:font script="Telu" typeface="Gautami"/>
+        <a:font script="Taml" typeface="Latha"/>
+        <a:font script="Syrc" typeface="Estrangelo Edessa"/>
+        <a:font script="Orya" typeface="Kalinga"/>
+        <a:font script="Mlym" typeface="Kartika"/>
+        <a:font script="Laoo" typeface="DokChampa"/>
+        <a:font script="Sinh" typeface="Iskoola Pota"/>
+        <a:font script="Mong" typeface="Mongolian Baiti"/>
+        <a:font script="Viet" typeface="Times New Roman"/>
+        <a:font script="Uigh" typeface="Microsoft Uighur"/>
+        <a:font script="Geor" typeface="Sylfaen"/>
+        <a:font script="Armn" typeface="Arial"/>
+        <a:font script="Bugi" typeface="Leelawadee UI"/>
+        <a:font script="Bopo" typeface="Microsoft JhengHei"/>
+        <a:font script="Java" typeface="Javanese Text"/>
+        <a:font script="Lisu" typeface="Segoe UI"/>
+        <a:font script="Mymr" typeface="Myanmar Text"/>
+        <a:font script="Nkoo" typeface="Ebrima"/>
+        <a:font script="Olck" typeface="Nirmala UI"/>
+        <a:font script="Osma" typeface="Ebrima"/>
+        <a:font script="Phag" typeface="Phagspa"/>
+        <a:font script="Syrn" typeface="Estrangelo Edessa"/>
+        <a:font script="Syrj" typeface="Estrangelo Edessa"/>
+        <a:font script="Syre" typeface="Estrangelo Edessa"/>
+        <a:font script="Sora" typeface="Nirmala UI"/>
+        <a:font script="Tale" typeface="Microsoft Tai Le"/>
+        <a:font script="Talu" typeface="Microsoft New Tai Lue"/>
+        <a:font script="Tfng" typeface="Ebrima"/>
+      </a:majorFont>
+      <a:minorFont>
+        <a:latin typeface="Aptos" panose="02110004020202020204"/>
+        <a:ea typeface=""/>
+        <a:cs typeface=""/>
+        <a:font script="Jpan" typeface="游ゴシック"/>
+        <a:font script="Hang" typeface="맑은 고딕"/>
+        <a:font script="Hans" typeface="等线"/>
+        <a:font script="Hant" typeface="新細明體"/>
+        <a:font script="Arab" typeface="Arial"/>
+        <a:font script="Hebr" typeface="Arial"/>
+        <a:font script="Thai" typeface="Cordia New"/>
+        <a:font script="Ethi" typeface="Nyala"/>
+        <a:font script="Beng" typeface="Vrinda"/>
+        <a:font script="Gujr" typeface="Shruti"/>
+        <a:font script="Khmr" typeface="DaunPenh"/>
+        <a:font script="Knda" typeface="Tunga"/>
+        <a:font script="Guru" typeface="Raavi"/>
+        <a:font script="Cans" typeface="Euphemia"/>
+        <a:font script="Cher" typeface="Plantagenet Cherokee"/>
+        <a:font script="Yiii" typeface="Microsoft Yi Baiti"/>
+        <a:font script="Tibt" typeface="Microsoft Himalaya"/>
+        <a:font script="Thaa" typeface="MV Boli"/>
+        <a:font script="Deva" typeface="Mangal"/>
+        <a:font script="Telu" typeface="Gautami"/>
+        <a:font script="Taml" typeface="Latha"/>
+        <a:font script="Syrc" typeface="Estrangelo Edessa"/>
+        <a:font script="Orya" typeface="Kalinga"/>
+        <a:font script="Mlym" typeface="Kartika"/>
+        <a:font script="Laoo" typeface="DokChampa"/>
+        <a:font script="Sinh" typeface="Iskoola Pota"/>
+        <a:font script="Mong" typeface="Mongolian Baiti"/>
+        <a:font script="Viet" typeface="Arial"/>
+        <a:font script="Uigh" typeface="Microsoft Uighur"/>
+        <a:font script="Geor" typeface="Sylfaen"/>
+        <a:font script="Armn" typeface="Arial"/>
+        <a:font script="Bugi" typeface="Leelawadee UI"/>
+        <a:font script="Bopo" typeface="Microsoft JhengHei"/>
+        <a:font script="Java" typeface="Javanese Text"/>
+        <a:font script="Lisu" typeface="Segoe UI"/>
+        <a:font script="Mymr" typeface="Myanmar Text"/>
+        <a:font script="Nkoo" typeface="Ebrima"/>
+        <a:font script="Olck" typeface="Nirmala UI"/>
+        <a:font script="Osma" typeface="Ebrima"/>
+        <a:font script="Phag" typeface="Phagspa"/>
+        <a:font script="Syrn" typeface="Estrangelo Edessa"/>
+        <a:font script="Syrj" typeface="Estrangelo Edessa"/>
+        <a:font script="Syre" typeface="Estrangelo Edessa"/>
+        <a:font script="Sora" typeface="Nirmala UI"/>
+        <a:font script="Tale" typeface="Microsoft Tai Le"/>
+        <a:font script="Talu" typeface="Microsoft New Tai Lue"/>
+        <a:font script="Tfng" typeface="Ebrima"/>
+      </a:minorFont>
+    </a:fontScheme>
+    <a:fmtScheme name="Office">
+      <a:fillStyleLst>
+        <a:solidFill>
+          <a:schemeClr val="phClr"/>
+        </a:solidFill>
+        <a:gradFill rotWithShape="1">
+          <a:gsLst>
+            <a:gs pos="0">
+              <a:schemeClr val="phClr">
+                <a:lumMod val="110000"/>
+                <a:satMod val="105000"/>
+                <a:tint val="67000"/>
+              </a:schemeClr>
+            </a:gs>
+            <a:gs pos="50000">
+              <a:schemeClr val="phClr">
+                <a:lumMod val="105000"/>
+                <a:satMod val="103000"/>
+                <a:tint val="73000"/>
+              </a:schemeClr>
+            </a:gs>
+            <a:gs pos="100000">
+              <a:schemeClr val="phClr">
+                <a:lumMod val="105000"/>
+                <a:satMod val="109000"/>
+                <a:tint val="81000"/>
+              </a:schemeClr>
+            </a:gs>
+          </a:gsLst>
+          <a:lin ang="5400000" scaled="0"/>
+        </a:gradFill>
+        <a:gradFill rotWithShape="1">
+          <a:gsLst>
+            <a:gs pos="0">
+              <a:schemeClr val="phClr">
+                <a:satMod val="103000"/>
+                <a:lumMod val="102000"/>
+                <a:tint val="94000"/>
+              </a:schemeClr>
+            </a:gs>
+            <a:gs pos="50000">
+              <a:schemeClr val="phClr">
+                <a:satMod val="110000"/>
+                <a:lumMod val="100000"/>
+                <a:shade val="100000"/>
+              </a:schemeClr>
+            </a:gs>
+            <a:gs pos="100000">
+              <a:schemeClr val="phClr">
+                <a:lumMod val="99000"/>
+                <a:satMod val="120000"/>
+                <a:shade val="78000"/>
+              </a:schemeClr>
+            </a:gs>
+          </a:gsLst>
+          <a:lin ang="5400000" scaled="0"/>
+        </a:gradFill>
+      </a:fillStyleLst>
+      <a:lnStyleLst>
+        <a:ln w="12700" cap="flat" cmpd="sng" algn="ctr">
+          <a:solidFill>
+            <a:schemeClr val="phClr"/>
+          </a:solidFill>
+          <a:prstDash val="solid"/>
+          <a:miter lim="800000"/>
+        </a:ln>
+        <a:ln w="19050" cap="flat" cmpd="sng" algn="ctr">
+          <a:solidFill>
+            <a:schemeClr val="phClr"/>
+          </a:solidFill>
+          <a:prstDash val="solid"/>
+          <a:miter lim="800000"/>
+        </a:ln>
+        <a:ln w="25400" cap="flat" cmpd="sng" algn="ctr">
+          <a:solidFill>
+            <a:schemeClr val="phClr"/>
+          </a:solidFill>
+          <a:prstDash val="solid"/>
+          <a:miter lim="800000"/>
+        </a:ln>
+      </a:lnStyleLst>
+      <a:effectStyleLst>
+        <a:effectStyle>
+          <a:effectLst/>
+        </a:effectStyle>
+        <a:effectStyle>
+          <a:effectLst/>
+        </a:effectStyle>
+        <a:effectStyle>
+          <a:effectLst>
+            <a:outerShdw blurRad="57150" dist="19050" dir="5400000" algn="ctr" rotWithShape="0">
+              <a:srgbClr val="000000">
+                <a:alpha val="63000"/>
+              </a:srgbClr>
+            </a:outerShdw>
+          </a:effectLst>
+        </a:effectStyle>
+      </a:effectStyleLst>
+      <a:bgFillStyleLst>
+        <a:solidFill>
+          <a:schemeClr val="phClr"/>
+        </a:solidFill>
+        <a:solidFill>
+          <a:schemeClr val="phClr">
+            <a:tint val="95000"/>
+            <a:satMod val="170000"/>
+          </a:schemeClr>
+        </a:solidFill>
+        <a:gradFill rotWithShape="1">
+          <a:gsLst>
+            <a:gs pos="0">
+              <a:schemeClr val="phClr">
+                <a:tint val="93000"/>
+                <a:satMod val="150000"/>
+                <a:shade val="98000"/>
+                <a:lumMod val="102000"/>
+              </a:schemeClr>
+            </a:gs>
+            <a:gs pos="50000">
+              <a:schemeClr val="phClr">
+                <a:tint val="98000"/>
+                <a:satMod val="130000"/>
+                <a:shade val="90000"/>
+                <a:lumMod val="103000"/>
+              </a:schemeClr>
+            </a:gs>
+            <a:gs pos="100000">
+              <a:schemeClr val="phClr">
+                <a:shade val="63000"/>
+                <a:satMod val="120000"/>
+              </a:schemeClr>
+            </a:gs>
+          </a:gsLst>
+          <a:lin ang="5400000" scaled="0"/>
+        </a:gradFill>
+      </a:bgFillStyleLst>
+    </a:fmtScheme>
+  </a:themeElements>
+  <a:objectDefaults>
+    <a:lnDef>
+      <a:spPr/>
+      <a:bodyPr/>
+      <a:lstStyle/>
+      <a:style>
+        <a:lnRef idx="2">
+          <a:schemeClr val="accent1"/>
+        </a:lnRef>
+        <a:fillRef idx="0">
+          <a:schemeClr val="accent1"/>
+        </a:fillRef>
+        <a:effectRef idx="1">
+          <a:schemeClr val="accent1"/>
+        </a:effectRef>
+        <a:fontRef idx="minor">
+          <a:schemeClr val="tx1"/>
+        </a:fontRef>
+      </a:style>
+    </a:lnDef>
+  </a:objectDefaults>
+  <a:extraClrSchemeLst/>
+  <a:extLst>
+    <a:ext uri="{05A4C25C-085E-4340-85A3-A5531E510DB2}">
+      <thm15:themeFamily xmlns:thm15="http://schemas.microsoft.com/office/thememl/2012/main" name="Office Theme" id="{2E142A2C-CD16-42D6-873A-C26D2A0506FA}" vid="{1BDDFF52-6CD6-40A5-AB3C-68EB2F1E4D0A}"/>
+    </a:ext>
+  </a:extLst>
+</a:theme>
 </file>
</xml_diff>

<commit_message>
Updated ppt with data cleanup and exploration slides
</commit_message>
<xml_diff>
--- a/Corey/Group Project.pptx
+++ b/Corey/Group Project.pptx
@@ -11,7 +11,7 @@
     <p:sldId id="256" r:id="rId2"/>
     <p:sldId id="268" r:id="rId3"/>
     <p:sldId id="282" r:id="rId4"/>
-    <p:sldId id="285" r:id="rId5"/>
+    <p:sldId id="297" r:id="rId5"/>
     <p:sldId id="270" r:id="rId6"/>
     <p:sldId id="283" r:id="rId7"/>
     <p:sldId id="289" r:id="rId8"/>
@@ -145,9 +145,7 @@
   <p1510:revLst>
     <p1510:client id="{12277D38-336B-4937-BC6C-03D48A5E58FC}" v="210" dt="2024-09-01T02:16:17.447"/>
     <p1510:client id="{855C75D5-899F-4E0A-A37C-6C0BD1A71F73}" v="84" dt="2024-09-01T02:59:28.279"/>
-    <p1510:client id="{BB9CCC36-FE4F-4974-A4FB-35164B2E3531}" v="1" dt="2024-08-31T18:22:36.510"/>
     <p1510:client id="{C951E7E2-DF73-498A-9B5C-67E1A1DDAFBB}" v="185" dt="2024-09-01T14:14:21.874"/>
-    <p1510:client id="{EBC5146E-18C7-45C9-82A7-CCF297C2A46B}" v="1" dt="2024-08-31T16:15:22.215"/>
   </p1510:revLst>
 </p1510:revInfo>
 </file>
@@ -560,7 +558,7 @@
   <pc:docChgLst>
     <pc:chgData name="Corey Holton" userId="dfccdeabb580c92e" providerId="LiveId" clId="{C951E7E2-DF73-498A-9B5C-67E1A1DDAFBB}"/>
     <pc:docChg chg="undo custSel addSld delSld modSld sldOrd">
-      <pc:chgData name="Corey Holton" userId="dfccdeabb580c92e" providerId="LiveId" clId="{C951E7E2-DF73-498A-9B5C-67E1A1DDAFBB}" dt="2024-09-01T14:27:36.542" v="7686" actId="47"/>
+      <pc:chgData name="Corey Holton" userId="dfccdeabb580c92e" providerId="LiveId" clId="{C951E7E2-DF73-498A-9B5C-67E1A1DDAFBB}" dt="2024-09-01T19:58:35.855" v="7778" actId="47"/>
       <pc:docMkLst>
         <pc:docMk/>
       </pc:docMkLst>
@@ -950,7 +948,7 @@
         </pc:picChg>
       </pc:sldChg>
       <pc:sldChg chg="modSp new mod">
-        <pc:chgData name="Corey Holton" userId="dfccdeabb580c92e" providerId="LiveId" clId="{C951E7E2-DF73-498A-9B5C-67E1A1DDAFBB}" dt="2024-09-01T04:01:44.799" v="5174" actId="27636"/>
+        <pc:chgData name="Corey Holton" userId="dfccdeabb580c92e" providerId="LiveId" clId="{C951E7E2-DF73-498A-9B5C-67E1A1DDAFBB}" dt="2024-09-01T19:28:50.501" v="7777" actId="2711"/>
         <pc:sldMkLst>
           <pc:docMk/>
           <pc:sldMk cId="2077041568" sldId="282"/>
@@ -964,7 +962,7 @@
           </ac:spMkLst>
         </pc:spChg>
         <pc:spChg chg="mod">
-          <ac:chgData name="Corey Holton" userId="dfccdeabb580c92e" providerId="LiveId" clId="{C951E7E2-DF73-498A-9B5C-67E1A1DDAFBB}" dt="2024-09-01T04:01:44.799" v="5174" actId="27636"/>
+          <ac:chgData name="Corey Holton" userId="dfccdeabb580c92e" providerId="LiveId" clId="{C951E7E2-DF73-498A-9B5C-67E1A1DDAFBB}" dt="2024-09-01T19:28:50.501" v="7777" actId="2711"/>
           <ac:spMkLst>
             <pc:docMk/>
             <pc:sldMk cId="2077041568" sldId="282"/>
@@ -1026,8 +1024,8 @@
           </ac:spMkLst>
         </pc:spChg>
       </pc:sldChg>
-      <pc:sldChg chg="modSp add mod">
-        <pc:chgData name="Corey Holton" userId="dfccdeabb580c92e" providerId="LiveId" clId="{C951E7E2-DF73-498A-9B5C-67E1A1DDAFBB}" dt="2024-09-01T00:34:36.283" v="4684" actId="27636"/>
+      <pc:sldChg chg="modSp add del mod">
+        <pc:chgData name="Corey Holton" userId="dfccdeabb580c92e" providerId="LiveId" clId="{C951E7E2-DF73-498A-9B5C-67E1A1DDAFBB}" dt="2024-09-01T19:58:35.855" v="7778" actId="47"/>
         <pc:sldMkLst>
           <pc:docMk/>
           <pc:sldMk cId="457172529" sldId="285"/>
@@ -2515,6 +2513,36 @@
             <pc:docMk/>
             <pc:sldMk cId="1850561051" sldId="296"/>
             <ac:spMk id="3" creationId="{EEE60394-EE95-6BD9-F92E-FF8515CD1064}"/>
+          </ac:spMkLst>
+        </pc:spChg>
+      </pc:sldChg>
+      <pc:sldChg chg="modSp add mod">
+        <pc:chgData name="Corey Holton" userId="dfccdeabb580c92e" providerId="LiveId" clId="{C951E7E2-DF73-498A-9B5C-67E1A1DDAFBB}" dt="2024-09-01T19:24:19.599" v="7773" actId="20577"/>
+        <pc:sldMkLst>
+          <pc:docMk/>
+          <pc:sldMk cId="667294800" sldId="297"/>
+        </pc:sldMkLst>
+        <pc:spChg chg="mod">
+          <ac:chgData name="Corey Holton" userId="dfccdeabb580c92e" providerId="LiveId" clId="{C951E7E2-DF73-498A-9B5C-67E1A1DDAFBB}" dt="2024-09-01T19:24:19.599" v="7773" actId="20577"/>
+          <ac:spMkLst>
+            <pc:docMk/>
+            <pc:sldMk cId="667294800" sldId="297"/>
+            <ac:spMk id="3" creationId="{3A194D55-8F49-301D-DFF4-5CEDF97D8DBB}"/>
+          </ac:spMkLst>
+        </pc:spChg>
+      </pc:sldChg>
+      <pc:sldChg chg="modSp add del mod">
+        <pc:chgData name="Corey Holton" userId="dfccdeabb580c92e" providerId="LiveId" clId="{C951E7E2-DF73-498A-9B5C-67E1A1DDAFBB}" dt="2024-09-01T19:19:54.639" v="7698" actId="2890"/>
+        <pc:sldMkLst>
+          <pc:docMk/>
+          <pc:sldMk cId="1816007313" sldId="297"/>
+        </pc:sldMkLst>
+        <pc:spChg chg="mod">
+          <ac:chgData name="Corey Holton" userId="dfccdeabb580c92e" providerId="LiveId" clId="{C951E7E2-DF73-498A-9B5C-67E1A1DDAFBB}" dt="2024-09-01T19:19:54.025" v="7697" actId="6549"/>
+          <ac:spMkLst>
+            <pc:docMk/>
+            <pc:sldMk cId="1816007313" sldId="297"/>
+            <ac:spMk id="3" creationId="{3A194D55-8F49-301D-DFF4-5CEDF97D8DBB}"/>
           </ac:spMkLst>
         </pc:spChg>
       </pc:sldChg>
@@ -11425,27 +11453,69 @@
         </p:spPr>
         <p:txBody>
           <a:bodyPr vert="horz" lIns="91440" tIns="45720" rIns="91440" bIns="45720" rtlCol="0" anchor="t">
-            <a:normAutofit/>
+            <a:normAutofit fontScale="62500" lnSpcReduction="20000"/>
           </a:bodyPr>
           <a:lstStyle/>
           <a:p>
-            <a:r>
-              <a:rPr lang="en-US" sz="2000" dirty="0">
+            <a:pPr>
+              <a:lnSpc>
+                <a:spcPct val="120000"/>
+              </a:lnSpc>
+            </a:pPr>
+            <a:r>
+              <a:rPr lang="en-US" dirty="0">
                 <a:latin typeface="Roboto" panose="02000000000000000000" pitchFamily="2" charset="0"/>
                 <a:ea typeface="Roboto" panose="02000000000000000000" pitchFamily="2" charset="0"/>
                 <a:cs typeface="Roboto" panose="02000000000000000000" pitchFamily="2" charset="0"/>
               </a:rPr>
-              <a:t>Following the selection of an area of focus, an extensive search was conducted to identify suitable datasets for agricultural production and global population data. Upon acquiring the datasets, they were imported into a notebook for initial examination. It was quickly identified that the agricultural data contained an excess of information, while the population data lacked complete yearly records. To address this gap, an additional population dataset was obtained and merged with the initial set to ensure alignment of time frames.</a:t>
-            </a:r>
-          </a:p>
-          <a:p>
-            <a:r>
-              <a:rPr lang="en-US" sz="2000" dirty="0">
+              <a:t>Following the selection of the project’s focus, a comprehensive search was conducted to identify suitable datasets on agricultural production and global population. After acquiring the relevant datasets, they were imported into a notebook for initial review. It was quickly observed that the agricultural dataset contained an abundance of data, while the population dataset lacked complete records for all years. To address this gap, an additional population dataset was sourced and merged with the initial data to ensure consistency in the time frames.</a:t>
+            </a:r>
+          </a:p>
+          <a:p>
+            <a:pPr>
+              <a:lnSpc>
+                <a:spcPct val="120000"/>
+              </a:lnSpc>
+            </a:pPr>
+            <a:r>
+              <a:rPr lang="en-US" dirty="0">
                 <a:latin typeface="Roboto" panose="02000000000000000000" pitchFamily="2" charset="0"/>
                 <a:ea typeface="Roboto" panose="02000000000000000000" pitchFamily="2" charset="0"/>
                 <a:cs typeface="Roboto" panose="02000000000000000000" pitchFamily="2" charset="0"/>
               </a:rPr>
-              <a:t>The datasets were then refined by removing non-essential columns and restructuring the data to fit the analysis objectives. To streamline the visualization process, data was aggregated at the continental level, given the large number of countries involved. Agricultural items were categorized according to predefined classifications. The final dataset was transformed into a time series format, facilitating statistical analysis and the creation of visual plots to illustrate trends.</a:t>
+              <a:t>The data underwent a thorough cleanup process, which involved removing non-essential columns and restructuring it to align with the analysis objectives. To simplify visualization and manage the extensive data, agricultural production was aggregated at the continental level, and items were categorized according to predefined classifications. It was noted that meat production was reported in a different unit (An, representing individual animals) compared to other data, which was primarily in metric </a:t>
+            </a:r>
+            <a:r>
+              <a:rPr lang="en-US" dirty="0" err="1">
+                <a:latin typeface="Roboto" panose="02000000000000000000" pitchFamily="2" charset="0"/>
+                <a:ea typeface="Roboto" panose="02000000000000000000" pitchFamily="2" charset="0"/>
+                <a:cs typeface="Roboto" panose="02000000000000000000" pitchFamily="2" charset="0"/>
+              </a:rPr>
+              <a:t>tonnes</a:t>
+            </a:r>
+            <a:r>
+              <a:rPr lang="en-US" dirty="0">
+                <a:latin typeface="Roboto" panose="02000000000000000000" pitchFamily="2" charset="0"/>
+                <a:ea typeface="Roboto" panose="02000000000000000000" pitchFamily="2" charset="0"/>
+                <a:cs typeface="Roboto" panose="02000000000000000000" pitchFamily="2" charset="0"/>
+              </a:rPr>
+              <a:t>. Additionally, egg production was reported in metric </a:t>
+            </a:r>
+            <a:r>
+              <a:rPr lang="en-US" dirty="0" err="1">
+                <a:latin typeface="Roboto" panose="02000000000000000000" pitchFamily="2" charset="0"/>
+                <a:ea typeface="Roboto" panose="02000000000000000000" pitchFamily="2" charset="0"/>
+                <a:cs typeface="Roboto" panose="02000000000000000000" pitchFamily="2" charset="0"/>
+              </a:rPr>
+              <a:t>tonnes</a:t>
+            </a:r>
+            <a:r>
+              <a:rPr lang="en-US" dirty="0">
+                <a:latin typeface="Roboto" panose="02000000000000000000" pitchFamily="2" charset="0"/>
+                <a:ea typeface="Roboto" panose="02000000000000000000" pitchFamily="2" charset="0"/>
+                <a:cs typeface="Roboto" panose="02000000000000000000" pitchFamily="2" charset="0"/>
+              </a:rPr>
+              <a:t>, resulting in unexpectedly high values compared to many grains—an observation that, while potentially inaccurate, aligns with the large number of chickens produced globally. The final dataset was transformed into a time series format, facilitating statistical analysis and visualizations to highlight key trends.</a:t>
             </a:r>
           </a:p>
         </p:txBody>
@@ -11511,7 +11581,7 @@
                 <a:effectLst/>
                 <a:latin typeface="Roboto" panose="02000000000000000000" pitchFamily="2" charset="0"/>
               </a:rPr>
-              <a:t>Exploration of data</a:t>
+              <a:t>Data collection, cleanup, and exploration</a:t>
             </a:r>
             <a:br>
               <a:rPr lang="en-US" sz="4400" b="0" i="0" dirty="0">
@@ -11544,560 +11614,100 @@
         </p:nvSpPr>
         <p:spPr>
           <a:xfrm>
-            <a:off x="838200" y="1338044"/>
-            <a:ext cx="10515600" cy="5154831"/>
+            <a:off x="838200" y="1304488"/>
+            <a:ext cx="10515600" cy="4872475"/>
           </a:xfrm>
         </p:spPr>
         <p:txBody>
-          <a:bodyPr>
-            <a:normAutofit fontScale="40000" lnSpcReduction="20000"/>
+          <a:bodyPr vert="horz" lIns="91440" tIns="45720" rIns="91440" bIns="45720" rtlCol="0" anchor="t">
+            <a:normAutofit fontScale="55000" lnSpcReduction="20000"/>
           </a:bodyPr>
           <a:lstStyle/>
           <a:p>
-            <a:pPr marL="0" marR="0">
+            <a:pPr marL="0" indent="0">
+              <a:buNone/>
+            </a:pPr>
+            <a:r>
+              <a:rPr lang="en-US" sz="4400" dirty="0"/>
+              <a:t>Data Analysis and Exploration: Several analytical methods were employed to explore and visualize the data:</a:t>
+            </a:r>
+          </a:p>
+          <a:p>
+            <a:pPr>
+              <a:buFont typeface="+mj-lt"/>
+              <a:buAutoNum type="arabicPeriod"/>
+            </a:pPr>
+            <a:r>
+              <a:rPr lang="en-US" sz="2900" dirty="0"/>
+              <a:t>Aggregation: Data was aggregated to assess production totals by category and continent, including averages, maximums, minimums, and sums. Additionally, top-producing items were identified at the country level to highlight significant contributors.</a:t>
+            </a:r>
+          </a:p>
+          <a:p>
+            <a:pPr>
+              <a:buFont typeface="+mj-lt"/>
+              <a:buAutoNum type="arabicPeriod"/>
+            </a:pPr>
+            <a:r>
+              <a:rPr lang="en-US" sz="2900" dirty="0"/>
+              <a:t>Correlation Analysis: Correlation coefficients (Pearson and Spearman) were calculated to examine the relationship between agricultural production and population growth, as well as correlations between different production categories within continents.</a:t>
+            </a:r>
+          </a:p>
+          <a:p>
+            <a:pPr>
+              <a:buFont typeface="+mj-lt"/>
+              <a:buAutoNum type="arabicPeriod"/>
+            </a:pPr>
+            <a:r>
+              <a:rPr lang="en-US" sz="2900" dirty="0"/>
+              <a:t>Comparison Analysis: Comparisons were made across continents and within countries to evaluate growth and decline in specific agricultural categories, revealing how production contributions vary over time.</a:t>
+            </a:r>
+          </a:p>
+          <a:p>
+            <a:pPr>
+              <a:buFont typeface="+mj-lt"/>
+              <a:buAutoNum type="arabicPeriod"/>
+            </a:pPr>
+            <a:r>
+              <a:rPr lang="en-US" sz="2900" dirty="0"/>
+              <a:t>Summary Statistics: Key statistical metrics, such as mean, median, and standard deviation, were used to summarize yearly production data, helping to identify trends and outliers.</a:t>
+            </a:r>
+          </a:p>
+          <a:p>
+            <a:pPr>
+              <a:buFont typeface="+mj-lt"/>
+              <a:buAutoNum type="arabicPeriod"/>
+            </a:pPr>
+            <a:r>
+              <a:rPr lang="en-US" sz="2900" dirty="0"/>
+              <a:t>Sentiment Analysis: The impact of public perception on agricultural production was explored, particularly noting Europe’s decline in agricultural production, which aligns with negative sentiments toward environmental impacts associated with farming.</a:t>
+            </a:r>
+          </a:p>
+          <a:p>
+            <a:pPr>
+              <a:buFont typeface="+mj-lt"/>
+              <a:buAutoNum type="arabicPeriod"/>
+            </a:pPr>
+            <a:r>
+              <a:rPr lang="en-US" sz="2900" dirty="0"/>
+              <a:t>Time Series Analysis: Time series plots were used to visualize the interaction between population growth and agricultural production globally, and forecasting techniques like Prophet were considered to predict future production trends.</a:t>
+            </a:r>
+          </a:p>
+          <a:p>
+            <a:pPr marL="0" indent="0">
+              <a:buNone/>
+            </a:pPr>
+            <a:r>
+              <a:rPr lang="en-US" sz="2900" dirty="0"/>
+              <a:t>These analyses provided a comprehensive understanding of global agricultural dynamics, highlighting regional disparities, production trends, and the evolving relationship between food supply and population growth.</a:t>
+            </a:r>
+          </a:p>
+          <a:p>
+            <a:pPr marL="0" indent="0">
               <a:lnSpc>
-                <a:spcPct val="107000"/>
+                <a:spcPct val="120000"/>
               </a:lnSpc>
-              <a:spcBef>
-                <a:spcPts val="0"/>
-              </a:spcBef>
-              <a:spcAft>
-                <a:spcPts val="800"/>
-              </a:spcAft>
+              <a:buNone/>
             </a:pPr>
-            <a:r>
-              <a:rPr lang="en-US" sz="2800" b="1" dirty="0">
-                <a:effectLst/>
-                <a:latin typeface="Aptos" panose="020B0004020202020204" pitchFamily="34" charset="0"/>
-                <a:ea typeface="Aptos" panose="020B0004020202020204" pitchFamily="34" charset="0"/>
-                <a:cs typeface="Times New Roman" panose="02020603050405020304" pitchFamily="18" charset="0"/>
-              </a:rPr>
-              <a:t>1. Aggregation</a:t>
-            </a:r>
-            <a:endParaRPr lang="en-US" sz="2800" dirty="0">
-              <a:effectLst/>
-              <a:latin typeface="Aptos" panose="020B0004020202020204" pitchFamily="34" charset="0"/>
-              <a:ea typeface="Aptos" panose="020B0004020202020204" pitchFamily="34" charset="0"/>
-              <a:cs typeface="Times New Roman" panose="02020603050405020304" pitchFamily="18" charset="0"/>
-            </a:endParaRPr>
-          </a:p>
-          <a:p>
-            <a:pPr marL="800100" lvl="1" indent="-342900">
-              <a:lnSpc>
-                <a:spcPct val="107000"/>
-              </a:lnSpc>
-              <a:spcBef>
-                <a:spcPts val="0"/>
-              </a:spcBef>
-              <a:spcAft>
-                <a:spcPts val="800"/>
-              </a:spcAft>
-              <a:buSzPts val="1000"/>
-              <a:buFont typeface="Symbol" panose="05050102010706020507" pitchFamily="18" charset="2"/>
-              <a:buChar char=""/>
-              <a:tabLst>
-                <a:tab pos="457200" algn="l"/>
-              </a:tabLst>
-            </a:pPr>
-            <a:r>
-              <a:rPr lang="en-US" b="1" dirty="0">
-                <a:effectLst/>
-                <a:latin typeface="Aptos" panose="020B0004020202020204" pitchFamily="34" charset="0"/>
-                <a:ea typeface="Aptos" panose="020B0004020202020204" pitchFamily="34" charset="0"/>
-                <a:cs typeface="Times New Roman" panose="02020603050405020304" pitchFamily="18" charset="0"/>
-              </a:rPr>
-              <a:t>Production by Category and Continent</a:t>
-            </a:r>
-            <a:r>
-              <a:rPr lang="en-US" dirty="0">
-                <a:effectLst/>
-                <a:latin typeface="Aptos" panose="020B0004020202020204" pitchFamily="34" charset="0"/>
-                <a:ea typeface="Aptos" panose="020B0004020202020204" pitchFamily="34" charset="0"/>
-                <a:cs typeface="Times New Roman" panose="02020603050405020304" pitchFamily="18" charset="0"/>
-              </a:rPr>
-              <a:t>: Aggregated production data at different granularities, such as yearly totals by category and continent. Explored averages, maximum, minimum, and sum statistics for different categories.</a:t>
-            </a:r>
-          </a:p>
-          <a:p>
-            <a:pPr marL="800100" lvl="1" indent="-342900">
-              <a:lnSpc>
-                <a:spcPct val="107000"/>
-              </a:lnSpc>
-              <a:spcBef>
-                <a:spcPts val="0"/>
-              </a:spcBef>
-              <a:spcAft>
-                <a:spcPts val="800"/>
-              </a:spcAft>
-              <a:buSzPts val="1000"/>
-              <a:buFont typeface="Symbol" panose="05050102010706020507" pitchFamily="18" charset="2"/>
-              <a:buChar char=""/>
-              <a:tabLst>
-                <a:tab pos="457200" algn="l"/>
-              </a:tabLst>
-            </a:pPr>
-            <a:r>
-              <a:rPr lang="en-US" b="1" dirty="0">
-                <a:effectLst/>
-                <a:latin typeface="Aptos" panose="020B0004020202020204" pitchFamily="34" charset="0"/>
-                <a:ea typeface="Aptos" panose="020B0004020202020204" pitchFamily="34" charset="0"/>
-                <a:cs typeface="Times New Roman" panose="02020603050405020304" pitchFamily="18" charset="0"/>
-              </a:rPr>
-              <a:t>Top 5 Items by Country</a:t>
-            </a:r>
-            <a:r>
-              <a:rPr lang="en-US" dirty="0">
-                <a:effectLst/>
-                <a:latin typeface="Aptos" panose="020B0004020202020204" pitchFamily="34" charset="0"/>
-                <a:ea typeface="Aptos" panose="020B0004020202020204" pitchFamily="34" charset="0"/>
-                <a:cs typeface="Times New Roman" panose="02020603050405020304" pitchFamily="18" charset="0"/>
-              </a:rPr>
-              <a:t>: Aggregate the data to identify the top-producing items for a given country (China example in slides).</a:t>
-            </a:r>
-          </a:p>
-          <a:p>
-            <a:pPr marL="0" marR="0">
-              <a:lnSpc>
-                <a:spcPct val="107000"/>
-              </a:lnSpc>
-              <a:spcBef>
-                <a:spcPts val="0"/>
-              </a:spcBef>
-              <a:spcAft>
-                <a:spcPts val="800"/>
-              </a:spcAft>
-            </a:pPr>
-            <a:r>
-              <a:rPr lang="en-US" sz="2800" b="1" dirty="0">
-                <a:effectLst/>
-                <a:latin typeface="Aptos" panose="020B0004020202020204" pitchFamily="34" charset="0"/>
-                <a:ea typeface="Aptos" panose="020B0004020202020204" pitchFamily="34" charset="0"/>
-                <a:cs typeface="Times New Roman" panose="02020603050405020304" pitchFamily="18" charset="0"/>
-              </a:rPr>
-              <a:t>2. Correlation Analysis</a:t>
-            </a:r>
-            <a:endParaRPr lang="en-US" sz="2800" dirty="0">
-              <a:effectLst/>
-              <a:latin typeface="Aptos" panose="020B0004020202020204" pitchFamily="34" charset="0"/>
-              <a:ea typeface="Aptos" panose="020B0004020202020204" pitchFamily="34" charset="0"/>
-              <a:cs typeface="Times New Roman" panose="02020603050405020304" pitchFamily="18" charset="0"/>
-            </a:endParaRPr>
-          </a:p>
-          <a:p>
-            <a:pPr marL="800100" lvl="1" indent="-342900">
-              <a:lnSpc>
-                <a:spcPct val="107000"/>
-              </a:lnSpc>
-              <a:spcBef>
-                <a:spcPts val="0"/>
-              </a:spcBef>
-              <a:spcAft>
-                <a:spcPts val="800"/>
-              </a:spcAft>
-              <a:buSzPts val="1000"/>
-              <a:buFont typeface="Symbol" panose="05050102010706020507" pitchFamily="18" charset="2"/>
-              <a:buChar char=""/>
-              <a:tabLst>
-                <a:tab pos="457200" algn="l"/>
-              </a:tabLst>
-            </a:pPr>
-            <a:r>
-              <a:rPr lang="en-US" b="1" dirty="0">
-                <a:effectLst/>
-                <a:latin typeface="Aptos" panose="020B0004020202020204" pitchFamily="34" charset="0"/>
-                <a:ea typeface="Aptos" panose="020B0004020202020204" pitchFamily="34" charset="0"/>
-                <a:cs typeface="Times New Roman" panose="02020603050405020304" pitchFamily="18" charset="0"/>
-              </a:rPr>
-              <a:t>Production vs. Population Growth</a:t>
-            </a:r>
-            <a:r>
-              <a:rPr lang="en-US" dirty="0">
-                <a:effectLst/>
-                <a:latin typeface="Aptos" panose="020B0004020202020204" pitchFamily="34" charset="0"/>
-                <a:ea typeface="Aptos" panose="020B0004020202020204" pitchFamily="34" charset="0"/>
-                <a:cs typeface="Times New Roman" panose="02020603050405020304" pitchFamily="18" charset="0"/>
-              </a:rPr>
-              <a:t>: Analyzed how the production of food changes with population growth. Used correlation coefficients (Pearson, Spearman) to assess the strength of these relationships.</a:t>
-            </a:r>
-          </a:p>
-          <a:p>
-            <a:pPr marL="800100" lvl="1" indent="-342900">
-              <a:lnSpc>
-                <a:spcPct val="107000"/>
-              </a:lnSpc>
-              <a:spcBef>
-                <a:spcPts val="0"/>
-              </a:spcBef>
-              <a:spcAft>
-                <a:spcPts val="800"/>
-              </a:spcAft>
-              <a:buSzPts val="1000"/>
-              <a:buFont typeface="Symbol" panose="05050102010706020507" pitchFamily="18" charset="2"/>
-              <a:buChar char=""/>
-              <a:tabLst>
-                <a:tab pos="457200" algn="l"/>
-              </a:tabLst>
-            </a:pPr>
-            <a:r>
-              <a:rPr lang="en-US" b="1" dirty="0">
-                <a:effectLst/>
-                <a:latin typeface="Aptos" panose="020B0004020202020204" pitchFamily="34" charset="0"/>
-                <a:ea typeface="Aptos" panose="020B0004020202020204" pitchFamily="34" charset="0"/>
-                <a:cs typeface="Times New Roman" panose="02020603050405020304" pitchFamily="18" charset="0"/>
-              </a:rPr>
-              <a:t>Category Comparisons</a:t>
-            </a:r>
-            <a:r>
-              <a:rPr lang="en-US" dirty="0">
-                <a:effectLst/>
-                <a:latin typeface="Aptos" panose="020B0004020202020204" pitchFamily="34" charset="0"/>
-                <a:ea typeface="Aptos" panose="020B0004020202020204" pitchFamily="34" charset="0"/>
-                <a:cs typeface="Times New Roman" panose="02020603050405020304" pitchFamily="18" charset="0"/>
-              </a:rPr>
-              <a:t>: Investigated correlations between different production categories within the same continent, e.g., if meat production increases with grain production.</a:t>
-            </a:r>
-          </a:p>
-          <a:p>
-            <a:pPr marL="0" marR="0">
-              <a:lnSpc>
-                <a:spcPct val="107000"/>
-              </a:lnSpc>
-              <a:spcBef>
-                <a:spcPts val="0"/>
-              </a:spcBef>
-              <a:spcAft>
-                <a:spcPts val="800"/>
-              </a:spcAft>
-            </a:pPr>
-            <a:r>
-              <a:rPr lang="en-US" sz="2800" b="1" dirty="0">
-                <a:effectLst/>
-                <a:latin typeface="Aptos" panose="020B0004020202020204" pitchFamily="34" charset="0"/>
-                <a:ea typeface="Aptos" panose="020B0004020202020204" pitchFamily="34" charset="0"/>
-                <a:cs typeface="Times New Roman" panose="02020603050405020304" pitchFamily="18" charset="0"/>
-              </a:rPr>
-              <a:t>3. Comparison Analysis</a:t>
-            </a:r>
-            <a:endParaRPr lang="en-US" sz="2800" dirty="0">
-              <a:effectLst/>
-              <a:latin typeface="Aptos" panose="020B0004020202020204" pitchFamily="34" charset="0"/>
-              <a:ea typeface="Aptos" panose="020B0004020202020204" pitchFamily="34" charset="0"/>
-              <a:cs typeface="Times New Roman" panose="02020603050405020304" pitchFamily="18" charset="0"/>
-            </a:endParaRPr>
-          </a:p>
-          <a:p>
-            <a:pPr marL="800100" lvl="1" indent="-342900">
-              <a:lnSpc>
-                <a:spcPct val="107000"/>
-              </a:lnSpc>
-              <a:spcBef>
-                <a:spcPts val="0"/>
-              </a:spcBef>
-              <a:spcAft>
-                <a:spcPts val="800"/>
-              </a:spcAft>
-              <a:buSzPts val="1000"/>
-              <a:buFont typeface="Symbol" panose="05050102010706020507" pitchFamily="18" charset="2"/>
-              <a:buChar char=""/>
-              <a:tabLst>
-                <a:tab pos="457200" algn="l"/>
-              </a:tabLst>
-            </a:pPr>
-            <a:r>
-              <a:rPr lang="en-US" b="1" dirty="0">
-                <a:effectLst/>
-                <a:latin typeface="Aptos" panose="020B0004020202020204" pitchFamily="34" charset="0"/>
-                <a:ea typeface="Aptos" panose="020B0004020202020204" pitchFamily="34" charset="0"/>
-                <a:cs typeface="Times New Roman" panose="02020603050405020304" pitchFamily="18" charset="0"/>
-              </a:rPr>
-              <a:t>Continent Comparisons</a:t>
-            </a:r>
-            <a:r>
-              <a:rPr lang="en-US" dirty="0">
-                <a:effectLst/>
-                <a:latin typeface="Aptos" panose="020B0004020202020204" pitchFamily="34" charset="0"/>
-                <a:ea typeface="Aptos" panose="020B0004020202020204" pitchFamily="34" charset="0"/>
-                <a:cs typeface="Times New Roman" panose="02020603050405020304" pitchFamily="18" charset="0"/>
-              </a:rPr>
-              <a:t>: Compare production trends across continents to see which continents have experienced the most growth or decline in specific agricultural categories.</a:t>
-            </a:r>
-          </a:p>
-          <a:p>
-            <a:pPr marL="800100" lvl="1" indent="-342900">
-              <a:lnSpc>
-                <a:spcPct val="107000"/>
-              </a:lnSpc>
-              <a:spcBef>
-                <a:spcPts val="0"/>
-              </a:spcBef>
-              <a:spcAft>
-                <a:spcPts val="800"/>
-              </a:spcAft>
-              <a:buSzPts val="1000"/>
-              <a:buFont typeface="Symbol" panose="05050102010706020507" pitchFamily="18" charset="2"/>
-              <a:buChar char=""/>
-              <a:tabLst>
-                <a:tab pos="457200" algn="l"/>
-              </a:tabLst>
-            </a:pPr>
-            <a:r>
-              <a:rPr lang="en-US" b="1" dirty="0">
-                <a:effectLst/>
-                <a:latin typeface="Aptos" panose="020B0004020202020204" pitchFamily="34" charset="0"/>
-                <a:ea typeface="Aptos" panose="020B0004020202020204" pitchFamily="34" charset="0"/>
-                <a:cs typeface="Times New Roman" panose="02020603050405020304" pitchFamily="18" charset="0"/>
-              </a:rPr>
-              <a:t>Category Comparisons within Countries</a:t>
-            </a:r>
-            <a:r>
-              <a:rPr lang="en-US" dirty="0">
-                <a:effectLst/>
-                <a:latin typeface="Aptos" panose="020B0004020202020204" pitchFamily="34" charset="0"/>
-                <a:ea typeface="Aptos" panose="020B0004020202020204" pitchFamily="34" charset="0"/>
-                <a:cs typeface="Times New Roman" panose="02020603050405020304" pitchFamily="18" charset="0"/>
-              </a:rPr>
-              <a:t>: Compared how different agricultural categories contribute to a country’s total production and how these have changed over time.</a:t>
-            </a:r>
-          </a:p>
-          <a:p>
-            <a:pPr marL="0" marR="0">
-              <a:lnSpc>
-                <a:spcPct val="107000"/>
-              </a:lnSpc>
-              <a:spcBef>
-                <a:spcPts val="0"/>
-              </a:spcBef>
-              <a:spcAft>
-                <a:spcPts val="800"/>
-              </a:spcAft>
-            </a:pPr>
-            <a:r>
-              <a:rPr lang="en-US" sz="2800" b="1" dirty="0">
-                <a:effectLst/>
-                <a:latin typeface="Aptos" panose="020B0004020202020204" pitchFamily="34" charset="0"/>
-                <a:ea typeface="Aptos" panose="020B0004020202020204" pitchFamily="34" charset="0"/>
-                <a:cs typeface="Times New Roman" panose="02020603050405020304" pitchFamily="18" charset="0"/>
-              </a:rPr>
-              <a:t>4. Summary Statistics</a:t>
-            </a:r>
-            <a:endParaRPr lang="en-US" sz="2800" dirty="0">
-              <a:effectLst/>
-              <a:latin typeface="Aptos" panose="020B0004020202020204" pitchFamily="34" charset="0"/>
-              <a:ea typeface="Aptos" panose="020B0004020202020204" pitchFamily="34" charset="0"/>
-              <a:cs typeface="Times New Roman" panose="02020603050405020304" pitchFamily="18" charset="0"/>
-            </a:endParaRPr>
-          </a:p>
-          <a:p>
-            <a:pPr marL="800100" lvl="1" indent="-342900">
-              <a:lnSpc>
-                <a:spcPct val="107000"/>
-              </a:lnSpc>
-              <a:spcBef>
-                <a:spcPts val="0"/>
-              </a:spcBef>
-              <a:spcAft>
-                <a:spcPts val="800"/>
-              </a:spcAft>
-              <a:buSzPts val="1000"/>
-              <a:buFont typeface="Symbol" panose="05050102010706020507" pitchFamily="18" charset="2"/>
-              <a:buChar char=""/>
-              <a:tabLst>
-                <a:tab pos="457200" algn="l"/>
-              </a:tabLst>
-            </a:pPr>
-            <a:r>
-              <a:rPr lang="en-US" b="1" dirty="0">
-                <a:effectLst/>
-                <a:latin typeface="Aptos" panose="020B0004020202020204" pitchFamily="34" charset="0"/>
-                <a:ea typeface="Aptos" panose="020B0004020202020204" pitchFamily="34" charset="0"/>
-                <a:cs typeface="Times New Roman" panose="02020603050405020304" pitchFamily="18" charset="0"/>
-              </a:rPr>
-              <a:t>Yearly Production Summaries</a:t>
-            </a:r>
-            <a:r>
-              <a:rPr lang="en-US" dirty="0">
-                <a:effectLst/>
-                <a:latin typeface="Aptos" panose="020B0004020202020204" pitchFamily="34" charset="0"/>
-                <a:ea typeface="Aptos" panose="020B0004020202020204" pitchFamily="34" charset="0"/>
-                <a:cs typeface="Times New Roman" panose="02020603050405020304" pitchFamily="18" charset="0"/>
-              </a:rPr>
-              <a:t>: Calculate mean, median, standard deviation, and quartiles for production data by category, to identify trends and anomalies.</a:t>
-            </a:r>
-          </a:p>
-          <a:p>
-            <a:pPr marL="0" marR="0">
-              <a:lnSpc>
-                <a:spcPct val="107000"/>
-              </a:lnSpc>
-              <a:spcBef>
-                <a:spcPts val="0"/>
-              </a:spcBef>
-              <a:spcAft>
-                <a:spcPts val="800"/>
-              </a:spcAft>
-            </a:pPr>
-            <a:r>
-              <a:rPr lang="en-US" sz="2800" b="1" dirty="0">
-                <a:effectLst/>
-                <a:latin typeface="Aptos" panose="020B0004020202020204" pitchFamily="34" charset="0"/>
-                <a:ea typeface="Aptos" panose="020B0004020202020204" pitchFamily="34" charset="0"/>
-                <a:cs typeface="Times New Roman" panose="02020603050405020304" pitchFamily="18" charset="0"/>
-              </a:rPr>
-              <a:t>5. Sentiment Analysis</a:t>
-            </a:r>
-            <a:endParaRPr lang="en-US" sz="2800" dirty="0">
-              <a:effectLst/>
-              <a:latin typeface="Aptos" panose="020B0004020202020204" pitchFamily="34" charset="0"/>
-              <a:ea typeface="Aptos" panose="020B0004020202020204" pitchFamily="34" charset="0"/>
-              <a:cs typeface="Times New Roman" panose="02020603050405020304" pitchFamily="18" charset="0"/>
-            </a:endParaRPr>
-          </a:p>
-          <a:p>
-            <a:pPr marL="800100" lvl="1" indent="-342900">
-              <a:lnSpc>
-                <a:spcPct val="107000"/>
-              </a:lnSpc>
-              <a:spcBef>
-                <a:spcPts val="0"/>
-              </a:spcBef>
-              <a:spcAft>
-                <a:spcPts val="800"/>
-              </a:spcAft>
-              <a:buSzPts val="1000"/>
-              <a:buFont typeface="Symbol" panose="05050102010706020507" pitchFamily="18" charset="2"/>
-              <a:buChar char=""/>
-              <a:tabLst>
-                <a:tab pos="457200" algn="l"/>
-              </a:tabLst>
-            </a:pPr>
-            <a:r>
-              <a:rPr lang="en-US" b="1" dirty="0">
-                <a:effectLst/>
-                <a:latin typeface="Aptos" panose="020B0004020202020204" pitchFamily="34" charset="0"/>
-                <a:ea typeface="Aptos" panose="020B0004020202020204" pitchFamily="34" charset="0"/>
-                <a:cs typeface="Times New Roman" panose="02020603050405020304" pitchFamily="18" charset="0"/>
-              </a:rPr>
-              <a:t>Public Perception of Agriculture</a:t>
-            </a:r>
-            <a:r>
-              <a:rPr lang="en-US" dirty="0">
-                <a:effectLst/>
-                <a:latin typeface="Aptos" panose="020B0004020202020204" pitchFamily="34" charset="0"/>
-                <a:ea typeface="Aptos" panose="020B0004020202020204" pitchFamily="34" charset="0"/>
-                <a:cs typeface="Times New Roman" panose="02020603050405020304" pitchFamily="18" charset="0"/>
-              </a:rPr>
-              <a:t>: We could see a  fall in Europe’s agricultural production which makes since given the negative perception farmers impose to the environment in Europe have received over the past decade.</a:t>
-            </a:r>
-          </a:p>
-          <a:p>
-            <a:pPr marL="0" marR="0">
-              <a:lnSpc>
-                <a:spcPct val="107000"/>
-              </a:lnSpc>
-              <a:spcBef>
-                <a:spcPts val="0"/>
-              </a:spcBef>
-              <a:spcAft>
-                <a:spcPts val="800"/>
-              </a:spcAft>
-            </a:pPr>
-            <a:r>
-              <a:rPr lang="en-US" sz="2800" b="1" dirty="0">
-                <a:effectLst/>
-                <a:latin typeface="Aptos" panose="020B0004020202020204" pitchFamily="34" charset="0"/>
-                <a:ea typeface="Aptos" panose="020B0004020202020204" pitchFamily="34" charset="0"/>
-                <a:cs typeface="Times New Roman" panose="02020603050405020304" pitchFamily="18" charset="0"/>
-              </a:rPr>
-              <a:t>6. Time Series Analysis</a:t>
-            </a:r>
-            <a:endParaRPr lang="en-US" sz="2800" dirty="0">
-              <a:effectLst/>
-              <a:latin typeface="Aptos" panose="020B0004020202020204" pitchFamily="34" charset="0"/>
-              <a:ea typeface="Aptos" panose="020B0004020202020204" pitchFamily="34" charset="0"/>
-              <a:cs typeface="Times New Roman" panose="02020603050405020304" pitchFamily="18" charset="0"/>
-            </a:endParaRPr>
-          </a:p>
-          <a:p>
-            <a:pPr marL="800100" lvl="1" indent="-342900">
-              <a:lnSpc>
-                <a:spcPct val="107000"/>
-              </a:lnSpc>
-              <a:spcBef>
-                <a:spcPts val="0"/>
-              </a:spcBef>
-              <a:spcAft>
-                <a:spcPts val="800"/>
-              </a:spcAft>
-              <a:buSzPts val="1000"/>
-              <a:buFont typeface="Symbol" panose="05050102010706020507" pitchFamily="18" charset="2"/>
-              <a:buChar char=""/>
-              <a:tabLst>
-                <a:tab pos="457200" algn="l"/>
-              </a:tabLst>
-            </a:pPr>
-            <a:r>
-              <a:rPr lang="en-US" b="1" dirty="0">
-                <a:effectLst/>
-                <a:highlight>
-                  <a:srgbClr val="FFFF00"/>
-                </a:highlight>
-                <a:latin typeface="Aptos" panose="020B0004020202020204" pitchFamily="34" charset="0"/>
-                <a:ea typeface="Aptos" panose="020B0004020202020204" pitchFamily="34" charset="0"/>
-                <a:cs typeface="Times New Roman" panose="02020603050405020304" pitchFamily="18" charset="0"/>
-              </a:rPr>
-              <a:t>Forecasting Production Trends</a:t>
-            </a:r>
-            <a:r>
-              <a:rPr lang="en-US" dirty="0">
-                <a:effectLst/>
-                <a:highlight>
-                  <a:srgbClr val="FFFF00"/>
-                </a:highlight>
-                <a:latin typeface="Aptos" panose="020B0004020202020204" pitchFamily="34" charset="0"/>
-                <a:ea typeface="Aptos" panose="020B0004020202020204" pitchFamily="34" charset="0"/>
-                <a:cs typeface="Times New Roman" panose="02020603050405020304" pitchFamily="18" charset="0"/>
-              </a:rPr>
-              <a:t>: Utilize time series analysis with Prophet to forecast future production levels for specific categories, continents, or countries (if we have time)</a:t>
-            </a:r>
-          </a:p>
-          <a:p>
-            <a:pPr marL="800100" lvl="1" indent="-342900">
-              <a:lnSpc>
-                <a:spcPct val="107000"/>
-              </a:lnSpc>
-              <a:spcBef>
-                <a:spcPts val="0"/>
-              </a:spcBef>
-              <a:spcAft>
-                <a:spcPts val="800"/>
-              </a:spcAft>
-              <a:buSzPts val="1000"/>
-              <a:buFont typeface="Symbol" panose="05050102010706020507" pitchFamily="18" charset="2"/>
-              <a:buChar char=""/>
-              <a:tabLst>
-                <a:tab pos="457200" algn="l"/>
-              </a:tabLst>
-            </a:pPr>
-            <a:r>
-              <a:rPr lang="en-US" b="1" dirty="0">
-                <a:effectLst/>
-                <a:latin typeface="Aptos" panose="020B0004020202020204" pitchFamily="34" charset="0"/>
-                <a:ea typeface="Aptos" panose="020B0004020202020204" pitchFamily="34" charset="0"/>
-                <a:cs typeface="Times New Roman" panose="02020603050405020304" pitchFamily="18" charset="0"/>
-              </a:rPr>
-              <a:t>Population vs. Production Over Time</a:t>
-            </a:r>
-            <a:r>
-              <a:rPr lang="en-US" dirty="0">
-                <a:effectLst/>
-                <a:latin typeface="Aptos" panose="020B0004020202020204" pitchFamily="34" charset="0"/>
-                <a:ea typeface="Aptos" panose="020B0004020202020204" pitchFamily="34" charset="0"/>
-                <a:cs typeface="Times New Roman" panose="02020603050405020304" pitchFamily="18" charset="0"/>
-              </a:rPr>
-              <a:t>: Time series was plotted to show population vs agricultural production on a global scale to see how the trends interact over time. This data could be used to predict the future of both population growth and agricultural supply for the future, although it does lack the availability of predicting yields and available farmland.</a:t>
-            </a:r>
-          </a:p>
-          <a:p>
             <a:endParaRPr lang="en-US" dirty="0"/>
           </a:p>
         </p:txBody>
@@ -12105,7 +11715,7 @@
     </p:spTree>
     <p:extLst>
       <p:ext uri="{BB962C8B-B14F-4D97-AF65-F5344CB8AC3E}">
-        <p14:creationId xmlns:p14="http://schemas.microsoft.com/office/powerpoint/2010/main" val="457172529"/>
+        <p14:creationId xmlns:p14="http://schemas.microsoft.com/office/powerpoint/2010/main" val="667294800"/>
       </p:ext>
     </p:extLst>
   </p:cSld>

</xml_diff>